<commit_message>
draw hbonds and numwater together
</commit_message>
<xml_diff>
--- a/Paper/Graphs.pptx
+++ b/Paper/Graphs.pptx
@@ -3329,66 +3329,6 @@
       </p:grpSpPr>
       <p:pic>
         <p:nvPicPr>
-          <p:cNvPr id="35" name="图片 34">
-            <a:extLst>
-              <a:ext uri="{FF2B5EF4-FFF2-40B4-BE49-F238E27FC236}">
-                <a16:creationId xmlns:a16="http://schemas.microsoft.com/office/drawing/2014/main" id="{39136D02-D17A-6BDB-05C3-8F6D9C86C2B9}"/>
-              </a:ext>
-            </a:extLst>
-          </p:cNvPr>
-          <p:cNvPicPr>
-            <a:picLocks noChangeAspect="1"/>
-          </p:cNvPicPr>
-          <p:nvPr/>
-        </p:nvPicPr>
-        <p:blipFill>
-          <a:blip r:embed="rId2"/>
-          <a:stretch>
-            <a:fillRect/>
-          </a:stretch>
-        </p:blipFill>
-        <p:spPr>
-          <a:xfrm>
-            <a:off x="477855" y="644589"/>
-            <a:ext cx="2848312" cy="1795507"/>
-          </a:xfrm>
-          <a:prstGeom prst="rect">
-            <a:avLst/>
-          </a:prstGeom>
-        </p:spPr>
-      </p:pic>
-      <p:pic>
-        <p:nvPicPr>
-          <p:cNvPr id="36" name="图片 35">
-            <a:extLst>
-              <a:ext uri="{FF2B5EF4-FFF2-40B4-BE49-F238E27FC236}">
-                <a16:creationId xmlns:a16="http://schemas.microsoft.com/office/drawing/2014/main" id="{47414278-5FC3-2801-220B-E430B0B42A3A}"/>
-              </a:ext>
-            </a:extLst>
-          </p:cNvPr>
-          <p:cNvPicPr>
-            <a:picLocks noChangeAspect="1"/>
-          </p:cNvPicPr>
-          <p:nvPr/>
-        </p:nvPicPr>
-        <p:blipFill>
-          <a:blip r:embed="rId2"/>
-          <a:stretch>
-            <a:fillRect/>
-          </a:stretch>
-        </p:blipFill>
-        <p:spPr>
-          <a:xfrm>
-            <a:off x="3315404" y="644589"/>
-            <a:ext cx="2848312" cy="1795507"/>
-          </a:xfrm>
-          <a:prstGeom prst="rect">
-            <a:avLst/>
-          </a:prstGeom>
-        </p:spPr>
-      </p:pic>
-      <p:pic>
-        <p:nvPicPr>
           <p:cNvPr id="43" name="图片 42" descr="图片包含 游戏机, 链, 项链, 装饰品&#10;&#10;AI 生成的内容可能不正确。">
             <a:extLst>
               <a:ext uri="{FF2B5EF4-FFF2-40B4-BE49-F238E27FC236}">
@@ -3402,7 +3342,7 @@
           <p:nvPr/>
         </p:nvPicPr>
         <p:blipFill>
-          <a:blip r:embed="rId3">
+          <a:blip r:embed="rId2">
             <a:clrChange>
               <a:clrFrom>
                 <a:srgbClr val="FFFFFF"/>
@@ -3425,7 +3365,7 @@
         </p:blipFill>
         <p:spPr>
           <a:xfrm>
-            <a:off x="703697" y="2570724"/>
+            <a:off x="784130" y="4001591"/>
             <a:ext cx="1476614" cy="2211417"/>
           </a:xfrm>
           <a:prstGeom prst="rect">
@@ -3448,7 +3388,7 @@
           <p:nvPr/>
         </p:nvPicPr>
         <p:blipFill>
-          <a:blip r:embed="rId3">
+          <a:blip r:embed="rId2">
             <a:clrChange>
               <a:clrFrom>
                 <a:srgbClr val="FFFFFF"/>
@@ -3471,8 +3411,100 @@
         </p:blipFill>
         <p:spPr>
           <a:xfrm>
-            <a:off x="3497066" y="2570723"/>
+            <a:off x="3577499" y="4001590"/>
             <a:ext cx="1476614" cy="2211417"/>
+          </a:xfrm>
+          <a:prstGeom prst="rect">
+            <a:avLst/>
+          </a:prstGeom>
+        </p:spPr>
+      </p:pic>
+      <p:pic>
+        <p:nvPicPr>
+          <p:cNvPr id="2" name="图片 1">
+            <a:extLst>
+              <a:ext uri="{FF2B5EF4-FFF2-40B4-BE49-F238E27FC236}">
+                <a16:creationId xmlns:a16="http://schemas.microsoft.com/office/drawing/2014/main" id="{515B0FF6-8D30-5ADA-F47C-8BDDF4C2788E}"/>
+              </a:ext>
+            </a:extLst>
+          </p:cNvPr>
+          <p:cNvPicPr>
+            <a:picLocks noChangeAspect="1"/>
+          </p:cNvPicPr>
+          <p:nvPr/>
+        </p:nvPicPr>
+        <p:blipFill>
+          <a:blip r:embed="rId3"/>
+          <a:stretch>
+            <a:fillRect/>
+          </a:stretch>
+        </p:blipFill>
+        <p:spPr>
+          <a:xfrm>
+            <a:off x="572578" y="705951"/>
+            <a:ext cx="2765918" cy="1793692"/>
+          </a:xfrm>
+          <a:prstGeom prst="rect">
+            <a:avLst/>
+          </a:prstGeom>
+        </p:spPr>
+      </p:pic>
+      <p:pic>
+        <p:nvPicPr>
+          <p:cNvPr id="3" name="图片 2">
+            <a:extLst>
+              <a:ext uri="{FF2B5EF4-FFF2-40B4-BE49-F238E27FC236}">
+                <a16:creationId xmlns:a16="http://schemas.microsoft.com/office/drawing/2014/main" id="{6E9D4F00-A570-A859-2D78-FD9C4E560276}"/>
+              </a:ext>
+            </a:extLst>
+          </p:cNvPr>
+          <p:cNvPicPr>
+            <a:picLocks noChangeAspect="1"/>
+          </p:cNvPicPr>
+          <p:nvPr/>
+        </p:nvPicPr>
+        <p:blipFill>
+          <a:blip r:embed="rId4">
+            <a:alphaModFix/>
+          </a:blip>
+          <a:stretch>
+            <a:fillRect/>
+          </a:stretch>
+        </p:blipFill>
+        <p:spPr>
+          <a:xfrm>
+            <a:off x="3412041" y="705983"/>
+            <a:ext cx="2778698" cy="1800149"/>
+          </a:xfrm>
+          <a:prstGeom prst="rect">
+            <a:avLst/>
+          </a:prstGeom>
+        </p:spPr>
+      </p:pic>
+      <p:pic>
+        <p:nvPicPr>
+          <p:cNvPr id="5" name="图片 4">
+            <a:extLst>
+              <a:ext uri="{FF2B5EF4-FFF2-40B4-BE49-F238E27FC236}">
+                <a16:creationId xmlns:a16="http://schemas.microsoft.com/office/drawing/2014/main" id="{0BDD8E4E-61EF-E540-3CE9-8FAC6F2574AA}"/>
+              </a:ext>
+            </a:extLst>
+          </p:cNvPr>
+          <p:cNvPicPr>
+            <a:picLocks noChangeAspect="1"/>
+          </p:cNvPicPr>
+          <p:nvPr/>
+        </p:nvPicPr>
+        <p:blipFill>
+          <a:blip r:embed="rId5"/>
+          <a:stretch>
+            <a:fillRect/>
+          </a:stretch>
+        </p:blipFill>
+        <p:spPr>
+          <a:xfrm>
+            <a:off x="1820331" y="2518831"/>
+            <a:ext cx="3357033" cy="185690"/>
           </a:xfrm>
           <a:prstGeom prst="rect">
             <a:avLst/>
@@ -4246,126 +4278,6 @@
       </p:sp>
       <p:pic>
         <p:nvPicPr>
-          <p:cNvPr id="39" name="图片 38">
-            <a:extLst>
-              <a:ext uri="{FF2B5EF4-FFF2-40B4-BE49-F238E27FC236}">
-                <a16:creationId xmlns:a16="http://schemas.microsoft.com/office/drawing/2014/main" id="{865D9D2A-AA05-57D1-A89B-712C88F4FAAA}"/>
-              </a:ext>
-            </a:extLst>
-          </p:cNvPr>
-          <p:cNvPicPr>
-            <a:picLocks noChangeAspect="1"/>
-          </p:cNvPicPr>
-          <p:nvPr/>
-        </p:nvPicPr>
-        <p:blipFill>
-          <a:blip r:embed="rId2"/>
-          <a:stretch>
-            <a:fillRect/>
-          </a:stretch>
-        </p:blipFill>
-        <p:spPr>
-          <a:xfrm>
-            <a:off x="424641" y="2404105"/>
-            <a:ext cx="3199394" cy="2264857"/>
-          </a:xfrm>
-          <a:prstGeom prst="rect">
-            <a:avLst/>
-          </a:prstGeom>
-        </p:spPr>
-      </p:pic>
-      <p:pic>
-        <p:nvPicPr>
-          <p:cNvPr id="40" name="图片 39">
-            <a:extLst>
-              <a:ext uri="{FF2B5EF4-FFF2-40B4-BE49-F238E27FC236}">
-                <a16:creationId xmlns:a16="http://schemas.microsoft.com/office/drawing/2014/main" id="{75E39918-A738-55AE-28BF-899AAF8C2B58}"/>
-              </a:ext>
-            </a:extLst>
-          </p:cNvPr>
-          <p:cNvPicPr>
-            <a:picLocks noChangeAspect="1"/>
-          </p:cNvPicPr>
-          <p:nvPr/>
-        </p:nvPicPr>
-        <p:blipFill>
-          <a:blip r:embed="rId2"/>
-          <a:stretch>
-            <a:fillRect/>
-          </a:stretch>
-        </p:blipFill>
-        <p:spPr>
-          <a:xfrm>
-            <a:off x="3264289" y="2380977"/>
-            <a:ext cx="3199394" cy="2264857"/>
-          </a:xfrm>
-          <a:prstGeom prst="rect">
-            <a:avLst/>
-          </a:prstGeom>
-        </p:spPr>
-      </p:pic>
-      <p:pic>
-        <p:nvPicPr>
-          <p:cNvPr id="41" name="图片 40">
-            <a:extLst>
-              <a:ext uri="{FF2B5EF4-FFF2-40B4-BE49-F238E27FC236}">
-                <a16:creationId xmlns:a16="http://schemas.microsoft.com/office/drawing/2014/main" id="{1A037EF1-9906-8AE8-8932-6922CAB5E078}"/>
-              </a:ext>
-            </a:extLst>
-          </p:cNvPr>
-          <p:cNvPicPr>
-            <a:picLocks noChangeAspect="1"/>
-          </p:cNvPicPr>
-          <p:nvPr/>
-        </p:nvPicPr>
-        <p:blipFill>
-          <a:blip r:embed="rId3"/>
-          <a:stretch>
-            <a:fillRect/>
-          </a:stretch>
-        </p:blipFill>
-        <p:spPr>
-          <a:xfrm>
-            <a:off x="361517" y="533723"/>
-            <a:ext cx="2828342" cy="1811978"/>
-          </a:xfrm>
-          <a:prstGeom prst="rect">
-            <a:avLst/>
-          </a:prstGeom>
-        </p:spPr>
-      </p:pic>
-      <p:pic>
-        <p:nvPicPr>
-          <p:cNvPr id="42" name="图片 41">
-            <a:extLst>
-              <a:ext uri="{FF2B5EF4-FFF2-40B4-BE49-F238E27FC236}">
-                <a16:creationId xmlns:a16="http://schemas.microsoft.com/office/drawing/2014/main" id="{7038A7C9-F915-EDF8-1C7D-120EE7EF7C51}"/>
-              </a:ext>
-            </a:extLst>
-          </p:cNvPr>
-          <p:cNvPicPr>
-            <a:picLocks noChangeAspect="1"/>
-          </p:cNvPicPr>
-          <p:nvPr/>
-        </p:nvPicPr>
-        <p:blipFill>
-          <a:blip r:embed="rId3"/>
-          <a:stretch>
-            <a:fillRect/>
-          </a:stretch>
-        </p:blipFill>
-        <p:spPr>
-          <a:xfrm>
-            <a:off x="3189859" y="507649"/>
-            <a:ext cx="2888002" cy="1850200"/>
-          </a:xfrm>
-          <a:prstGeom prst="rect">
-            <a:avLst/>
-          </a:prstGeom>
-        </p:spPr>
-      </p:pic>
-      <p:pic>
-        <p:nvPicPr>
           <p:cNvPr id="44" name="图片 43" descr="图片包含 游戏机, 链, 项链, 装饰品&#10;&#10;AI 生成的内容可能不正确。">
             <a:extLst>
               <a:ext uri="{FF2B5EF4-FFF2-40B4-BE49-F238E27FC236}">
@@ -4379,7 +4291,7 @@
           <p:nvPr/>
         </p:nvPicPr>
         <p:blipFill>
-          <a:blip r:embed="rId4">
+          <a:blip r:embed="rId2">
             <a:clrChange>
               <a:clrFrom>
                 <a:srgbClr val="FFFFFF"/>
@@ -4401,7 +4313,7 @@
         </p:blipFill>
         <p:spPr>
           <a:xfrm>
-            <a:off x="503392" y="5049616"/>
+            <a:off x="503392" y="5980347"/>
             <a:ext cx="2686467" cy="1535923"/>
           </a:xfrm>
           <a:prstGeom prst="rect">
@@ -4424,7 +4336,7 @@
           <p:nvPr/>
         </p:nvPicPr>
         <p:blipFill>
-          <a:blip r:embed="rId4">
+          <a:blip r:embed="rId2">
             <a:clrChange>
               <a:clrFrom>
                 <a:srgbClr val="FFFFFF"/>
@@ -4446,8 +4358,192 @@
         </p:blipFill>
         <p:spPr>
           <a:xfrm>
-            <a:off x="3429000" y="5049615"/>
+            <a:off x="3429000" y="5980346"/>
             <a:ext cx="2686467" cy="1535923"/>
+          </a:xfrm>
+          <a:prstGeom prst="rect">
+            <a:avLst/>
+          </a:prstGeom>
+        </p:spPr>
+      </p:pic>
+      <p:pic>
+        <p:nvPicPr>
+          <p:cNvPr id="6" name="图片 5">
+            <a:extLst>
+              <a:ext uri="{FF2B5EF4-FFF2-40B4-BE49-F238E27FC236}">
+                <a16:creationId xmlns:a16="http://schemas.microsoft.com/office/drawing/2014/main" id="{C0A1C0FB-159F-BDB4-1A50-64F2B404364D}"/>
+              </a:ext>
+            </a:extLst>
+          </p:cNvPr>
+          <p:cNvPicPr>
+            <a:picLocks noChangeAspect="1"/>
+          </p:cNvPicPr>
+          <p:nvPr/>
+        </p:nvPicPr>
+        <p:blipFill>
+          <a:blip r:embed="rId3">
+            <a:alphaModFix/>
+          </a:blip>
+          <a:stretch>
+            <a:fillRect/>
+          </a:stretch>
+        </p:blipFill>
+        <p:spPr>
+          <a:xfrm>
+            <a:off x="503392" y="655151"/>
+            <a:ext cx="2720654" cy="1661919"/>
+          </a:xfrm>
+          <a:prstGeom prst="rect">
+            <a:avLst/>
+          </a:prstGeom>
+        </p:spPr>
+      </p:pic>
+      <p:pic>
+        <p:nvPicPr>
+          <p:cNvPr id="4" name="图片 3">
+            <a:extLst>
+              <a:ext uri="{FF2B5EF4-FFF2-40B4-BE49-F238E27FC236}">
+                <a16:creationId xmlns:a16="http://schemas.microsoft.com/office/drawing/2014/main" id="{9484EFAC-FABB-0898-02EE-5C023C69EE26}"/>
+              </a:ext>
+            </a:extLst>
+          </p:cNvPr>
+          <p:cNvPicPr>
+            <a:picLocks noChangeAspect="1"/>
+          </p:cNvPicPr>
+          <p:nvPr/>
+        </p:nvPicPr>
+        <p:blipFill>
+          <a:blip r:embed="rId4">
+            <a:alphaModFix/>
+          </a:blip>
+          <a:stretch>
+            <a:fillRect/>
+          </a:stretch>
+        </p:blipFill>
+        <p:spPr>
+          <a:xfrm>
+            <a:off x="3264289" y="655150"/>
+            <a:ext cx="2729467" cy="1661919"/>
+          </a:xfrm>
+          <a:prstGeom prst="rect">
+            <a:avLst/>
+          </a:prstGeom>
+        </p:spPr>
+      </p:pic>
+      <p:pic>
+        <p:nvPicPr>
+          <p:cNvPr id="7" name="图片 6">
+            <a:extLst>
+              <a:ext uri="{FF2B5EF4-FFF2-40B4-BE49-F238E27FC236}">
+                <a16:creationId xmlns:a16="http://schemas.microsoft.com/office/drawing/2014/main" id="{7137D982-5201-FB3F-4052-FCC8234C0CA6}"/>
+              </a:ext>
+            </a:extLst>
+          </p:cNvPr>
+          <p:cNvPicPr>
+            <a:picLocks noChangeAspect="1"/>
+          </p:cNvPicPr>
+          <p:nvPr/>
+        </p:nvPicPr>
+        <p:blipFill>
+          <a:blip r:embed="rId5"/>
+          <a:stretch>
+            <a:fillRect/>
+          </a:stretch>
+        </p:blipFill>
+        <p:spPr>
+          <a:xfrm>
+            <a:off x="3167634" y="2590583"/>
+            <a:ext cx="2616494" cy="3007577"/>
+          </a:xfrm>
+          <a:prstGeom prst="rect">
+            <a:avLst/>
+          </a:prstGeom>
+        </p:spPr>
+      </p:pic>
+      <p:pic>
+        <p:nvPicPr>
+          <p:cNvPr id="8" name="图片 7">
+            <a:extLst>
+              <a:ext uri="{FF2B5EF4-FFF2-40B4-BE49-F238E27FC236}">
+                <a16:creationId xmlns:a16="http://schemas.microsoft.com/office/drawing/2014/main" id="{46896147-CBAD-A62A-46AF-FC3B9A7FE817}"/>
+              </a:ext>
+            </a:extLst>
+          </p:cNvPr>
+          <p:cNvPicPr>
+            <a:picLocks noChangeAspect="1"/>
+          </p:cNvPicPr>
+          <p:nvPr/>
+        </p:nvPicPr>
+        <p:blipFill>
+          <a:blip r:embed="rId6"/>
+          <a:stretch>
+            <a:fillRect/>
+          </a:stretch>
+        </p:blipFill>
+        <p:spPr>
+          <a:xfrm>
+            <a:off x="377293" y="2590583"/>
+            <a:ext cx="2610381" cy="3007577"/>
+          </a:xfrm>
+          <a:prstGeom prst="rect">
+            <a:avLst/>
+          </a:prstGeom>
+        </p:spPr>
+      </p:pic>
+      <p:pic>
+        <p:nvPicPr>
+          <p:cNvPr id="9" name="图片 8">
+            <a:extLst>
+              <a:ext uri="{FF2B5EF4-FFF2-40B4-BE49-F238E27FC236}">
+                <a16:creationId xmlns:a16="http://schemas.microsoft.com/office/drawing/2014/main" id="{18E25913-759B-A4A6-8D28-B1FF68C6B9DC}"/>
+              </a:ext>
+            </a:extLst>
+          </p:cNvPr>
+          <p:cNvPicPr>
+            <a:picLocks noChangeAspect="1"/>
+          </p:cNvPicPr>
+          <p:nvPr/>
+        </p:nvPicPr>
+        <p:blipFill>
+          <a:blip r:embed="rId7"/>
+          <a:stretch>
+            <a:fillRect/>
+          </a:stretch>
+        </p:blipFill>
+        <p:spPr>
+          <a:xfrm>
+            <a:off x="5766560" y="2590582"/>
+            <a:ext cx="430705" cy="2733258"/>
+          </a:xfrm>
+          <a:prstGeom prst="rect">
+            <a:avLst/>
+          </a:prstGeom>
+        </p:spPr>
+      </p:pic>
+      <p:pic>
+        <p:nvPicPr>
+          <p:cNvPr id="11" name="图片 10">
+            <a:extLst>
+              <a:ext uri="{FF2B5EF4-FFF2-40B4-BE49-F238E27FC236}">
+                <a16:creationId xmlns:a16="http://schemas.microsoft.com/office/drawing/2014/main" id="{7913CB78-F7C5-3D76-F502-66C8092B722C}"/>
+              </a:ext>
+            </a:extLst>
+          </p:cNvPr>
+          <p:cNvPicPr>
+            <a:picLocks noChangeAspect="1"/>
+          </p:cNvPicPr>
+          <p:nvPr/>
+        </p:nvPicPr>
+        <p:blipFill>
+          <a:blip r:embed="rId8"/>
+          <a:stretch>
+            <a:fillRect/>
+          </a:stretch>
+        </p:blipFill>
+        <p:spPr>
+          <a:xfrm>
+            <a:off x="985792" y="2335172"/>
+            <a:ext cx="4380373" cy="185690"/>
           </a:xfrm>
           <a:prstGeom prst="rect">
             <a:avLst/>

</xml_diff>

<commit_message>
Complete manuscript text. Add graphs.
</commit_message>
<xml_diff>
--- a/Paper/Graphs.pptx
+++ b/Paper/Graphs.pptx
@@ -3329,10 +3329,10 @@
       </p:grpSpPr>
       <p:pic>
         <p:nvPicPr>
-          <p:cNvPr id="43" name="图片 42" descr="图片包含 游戏机, 链, 项链, 装饰品&#10;&#10;AI 生成的内容可能不正确。">
+          <p:cNvPr id="7" name="图片 6" descr="卡通人物&#10;&#10;AI 生成的内容可能不正确。">
             <a:extLst>
               <a:ext uri="{FF2B5EF4-FFF2-40B4-BE49-F238E27FC236}">
-                <a16:creationId xmlns:a16="http://schemas.microsoft.com/office/drawing/2014/main" id="{31CA1143-D5A9-EABC-63DC-2158A209AA21}"/>
+                <a16:creationId xmlns:a16="http://schemas.microsoft.com/office/drawing/2014/main" id="{500015C3-1592-D2DD-157C-B3D5CBE688C7}"/>
               </a:ext>
             </a:extLst>
           </p:cNvPr>
@@ -3343,16 +3343,6 @@
         </p:nvPicPr>
         <p:blipFill>
           <a:blip r:embed="rId2">
-            <a:clrChange>
-              <a:clrFrom>
-                <a:srgbClr val="FFFFFF"/>
-              </a:clrFrom>
-              <a:clrTo>
-                <a:srgbClr val="FFFFFF">
-                  <a:alpha val="0"/>
-                </a:srgbClr>
-              </a:clrTo>
-            </a:clrChange>
             <a:extLst>
               <a:ext uri="{28A0092B-C50C-407E-A947-70E740481C1C}">
                 <a14:useLocalDpi xmlns:a14="http://schemas.microsoft.com/office/drawing/2010/main" val="0"/>
@@ -3365,8 +3355,8 @@
         </p:blipFill>
         <p:spPr>
           <a:xfrm>
-            <a:off x="784130" y="4001591"/>
-            <a:ext cx="1476614" cy="2211417"/>
+            <a:off x="4256998" y="2944033"/>
+            <a:ext cx="1253781" cy="2267192"/>
           </a:xfrm>
           <a:prstGeom prst="rect">
             <a:avLst/>
@@ -3375,10 +3365,10 @@
       </p:pic>
       <p:pic>
         <p:nvPicPr>
-          <p:cNvPr id="4" name="图片 3" descr="图片包含 游戏机, 链, 项链, 装饰品&#10;&#10;AI 生成的内容可能不正确。">
+          <p:cNvPr id="9" name="图片 8" descr="卡通人物&#10;&#10;AI 生成的内容可能不正确。">
             <a:extLst>
               <a:ext uri="{FF2B5EF4-FFF2-40B4-BE49-F238E27FC236}">
-                <a16:creationId xmlns:a16="http://schemas.microsoft.com/office/drawing/2014/main" id="{51C36C67-349E-83F6-9B4C-0969D4FB667B}"/>
+                <a16:creationId xmlns:a16="http://schemas.microsoft.com/office/drawing/2014/main" id="{3B3C240C-5C89-5DBF-8481-0B59C2BD1972}"/>
               </a:ext>
             </a:extLst>
           </p:cNvPr>
@@ -3388,17 +3378,7 @@
           <p:nvPr/>
         </p:nvPicPr>
         <p:blipFill>
-          <a:blip r:embed="rId2">
-            <a:clrChange>
-              <a:clrFrom>
-                <a:srgbClr val="FFFFFF"/>
-              </a:clrFrom>
-              <a:clrTo>
-                <a:srgbClr val="FFFFFF">
-                  <a:alpha val="0"/>
-                </a:srgbClr>
-              </a:clrTo>
-            </a:clrChange>
+          <a:blip r:embed="rId3">
             <a:extLst>
               <a:ext uri="{28A0092B-C50C-407E-A947-70E740481C1C}">
                 <a14:useLocalDpi xmlns:a14="http://schemas.microsoft.com/office/drawing/2010/main" val="0"/>
@@ -3410,21 +3390,830 @@
           </a:stretch>
         </p:blipFill>
         <p:spPr>
-          <a:xfrm>
-            <a:off x="3577499" y="4001590"/>
-            <a:ext cx="1476614" cy="2211417"/>
+          <a:xfrm rot="264740">
+            <a:off x="1358391" y="2944033"/>
+            <a:ext cx="1308501" cy="2267191"/>
           </a:xfrm>
           <a:prstGeom prst="rect">
             <a:avLst/>
           </a:prstGeom>
         </p:spPr>
       </p:pic>
+      <p:sp>
+        <p:nvSpPr>
+          <p:cNvPr id="10" name="文本框 9">
+            <a:extLst>
+              <a:ext uri="{FF2B5EF4-FFF2-40B4-BE49-F238E27FC236}">
+                <a16:creationId xmlns:a16="http://schemas.microsoft.com/office/drawing/2014/main" id="{4AD13B30-032D-B728-A4B2-2AC8A8ED79FB}"/>
+              </a:ext>
+            </a:extLst>
+          </p:cNvPr>
+          <p:cNvSpPr txBox="1"/>
+          <p:nvPr/>
+        </p:nvSpPr>
+        <p:spPr>
+          <a:xfrm>
+            <a:off x="502345" y="507856"/>
+            <a:ext cx="307792" cy="230832"/>
+          </a:xfrm>
+          <a:prstGeom prst="rect">
+            <a:avLst/>
+          </a:prstGeom>
+          <a:noFill/>
+        </p:spPr>
+        <p:txBody>
+          <a:bodyPr wrap="square" rtlCol="0">
+            <a:spAutoFit/>
+          </a:bodyPr>
+          <a:lstStyle/>
+          <a:p>
+            <a:r>
+              <a:rPr lang="en-US" sz="900" b="1" dirty="0">
+                <a:latin typeface="Calibri" panose="020F0502020204030204" pitchFamily="34" charset="0"/>
+                <a:ea typeface="Calibri" panose="020F0502020204030204" pitchFamily="34" charset="0"/>
+                <a:cs typeface="Calibri" panose="020F0502020204030204" pitchFamily="34" charset="0"/>
+              </a:rPr>
+              <a:t>a)</a:t>
+            </a:r>
+            <a:endParaRPr lang="en-US" sz="900" i="1" dirty="0">
+              <a:latin typeface="Calibri" panose="020F0502020204030204" pitchFamily="34" charset="0"/>
+              <a:ea typeface="Calibri" panose="020F0502020204030204" pitchFamily="34" charset="0"/>
+              <a:cs typeface="Calibri" panose="020F0502020204030204" pitchFamily="34" charset="0"/>
+            </a:endParaRPr>
+          </a:p>
+        </p:txBody>
+      </p:sp>
+      <p:sp>
+        <p:nvSpPr>
+          <p:cNvPr id="11" name="文本框 10">
+            <a:extLst>
+              <a:ext uri="{FF2B5EF4-FFF2-40B4-BE49-F238E27FC236}">
+                <a16:creationId xmlns:a16="http://schemas.microsoft.com/office/drawing/2014/main" id="{52272828-4E6A-2E07-8730-8CF0660C85ED}"/>
+              </a:ext>
+            </a:extLst>
+          </p:cNvPr>
+          <p:cNvSpPr txBox="1"/>
+          <p:nvPr/>
+        </p:nvSpPr>
+        <p:spPr>
+          <a:xfrm>
+            <a:off x="3350569" y="507856"/>
+            <a:ext cx="307792" cy="230832"/>
+          </a:xfrm>
+          <a:prstGeom prst="rect">
+            <a:avLst/>
+          </a:prstGeom>
+          <a:noFill/>
+        </p:spPr>
+        <p:txBody>
+          <a:bodyPr wrap="square" rtlCol="0">
+            <a:spAutoFit/>
+          </a:bodyPr>
+          <a:lstStyle/>
+          <a:p>
+            <a:r>
+              <a:rPr lang="en-US" sz="900" b="1" dirty="0">
+                <a:latin typeface="Calibri" panose="020F0502020204030204" pitchFamily="34" charset="0"/>
+                <a:ea typeface="Calibri" panose="020F0502020204030204" pitchFamily="34" charset="0"/>
+                <a:cs typeface="Calibri" panose="020F0502020204030204" pitchFamily="34" charset="0"/>
+              </a:rPr>
+              <a:t>b)</a:t>
+            </a:r>
+            <a:endParaRPr lang="en-US" sz="900" i="1" dirty="0">
+              <a:latin typeface="Calibri" panose="020F0502020204030204" pitchFamily="34" charset="0"/>
+              <a:ea typeface="Calibri" panose="020F0502020204030204" pitchFamily="34" charset="0"/>
+              <a:cs typeface="Calibri" panose="020F0502020204030204" pitchFamily="34" charset="0"/>
+            </a:endParaRPr>
+          </a:p>
+        </p:txBody>
+      </p:sp>
+      <p:sp>
+        <p:nvSpPr>
+          <p:cNvPr id="12" name="文本框 11">
+            <a:extLst>
+              <a:ext uri="{FF2B5EF4-FFF2-40B4-BE49-F238E27FC236}">
+                <a16:creationId xmlns:a16="http://schemas.microsoft.com/office/drawing/2014/main" id="{ED8D5DCB-D99B-4380-43D6-876AB70E7D71}"/>
+              </a:ext>
+            </a:extLst>
+          </p:cNvPr>
+          <p:cNvSpPr txBox="1"/>
+          <p:nvPr/>
+        </p:nvSpPr>
+        <p:spPr>
+          <a:xfrm>
+            <a:off x="502345" y="2734489"/>
+            <a:ext cx="307792" cy="230832"/>
+          </a:xfrm>
+          <a:prstGeom prst="rect">
+            <a:avLst/>
+          </a:prstGeom>
+          <a:noFill/>
+        </p:spPr>
+        <p:txBody>
+          <a:bodyPr wrap="square" rtlCol="0">
+            <a:spAutoFit/>
+          </a:bodyPr>
+          <a:lstStyle/>
+          <a:p>
+            <a:r>
+              <a:rPr lang="en-US" sz="900" b="1" dirty="0">
+                <a:latin typeface="Calibri" panose="020F0502020204030204" pitchFamily="34" charset="0"/>
+                <a:ea typeface="Calibri" panose="020F0502020204030204" pitchFamily="34" charset="0"/>
+                <a:cs typeface="Calibri" panose="020F0502020204030204" pitchFamily="34" charset="0"/>
+              </a:rPr>
+              <a:t>c)</a:t>
+            </a:r>
+            <a:endParaRPr lang="en-US" sz="900" i="1" dirty="0">
+              <a:latin typeface="Calibri" panose="020F0502020204030204" pitchFamily="34" charset="0"/>
+              <a:ea typeface="Calibri" panose="020F0502020204030204" pitchFamily="34" charset="0"/>
+              <a:cs typeface="Calibri" panose="020F0502020204030204" pitchFamily="34" charset="0"/>
+            </a:endParaRPr>
+          </a:p>
+        </p:txBody>
+      </p:sp>
+      <p:sp>
+        <p:nvSpPr>
+          <p:cNvPr id="16" name="文本框 15">
+            <a:extLst>
+              <a:ext uri="{FF2B5EF4-FFF2-40B4-BE49-F238E27FC236}">
+                <a16:creationId xmlns:a16="http://schemas.microsoft.com/office/drawing/2014/main" id="{D44532AF-E217-0980-3CB6-EBDE27B7FCFE}"/>
+              </a:ext>
+            </a:extLst>
+          </p:cNvPr>
+          <p:cNvSpPr txBox="1"/>
+          <p:nvPr/>
+        </p:nvSpPr>
+        <p:spPr>
+          <a:xfrm>
+            <a:off x="2910027" y="3506836"/>
+            <a:ext cx="1184877" cy="1277273"/>
+          </a:xfrm>
+          <a:prstGeom prst="rect">
+            <a:avLst/>
+          </a:prstGeom>
+          <a:noFill/>
+        </p:spPr>
+        <p:txBody>
+          <a:bodyPr wrap="square" rtlCol="0">
+            <a:spAutoFit/>
+          </a:bodyPr>
+          <a:lstStyle/>
+          <a:p>
+            <a:pPr algn="ctr"/>
+            <a:r>
+              <a:rPr lang="en-US" sz="800" i="1" u="none" strike="noStrike" baseline="0" dirty="0">
+                <a:latin typeface="Calibri" panose="020F0502020204030204" pitchFamily="34" charset="0"/>
+                <a:ea typeface="Calibri" panose="020F0502020204030204" pitchFamily="34" charset="0"/>
+                <a:cs typeface="Calibri" panose="020F0502020204030204" pitchFamily="34" charset="0"/>
+              </a:rPr>
+              <a:t>cis</a:t>
+            </a:r>
+            <a:r>
+              <a:rPr lang="en-US" sz="800" u="none" strike="noStrike" baseline="0" dirty="0">
+                <a:latin typeface="Calibri" panose="020F0502020204030204" pitchFamily="34" charset="0"/>
+                <a:ea typeface="Calibri" panose="020F0502020204030204" pitchFamily="34" charset="0"/>
+                <a:cs typeface="Calibri" panose="020F0502020204030204" pitchFamily="34" charset="0"/>
+              </a:rPr>
+              <a:t>-state OPN2</a:t>
+            </a:r>
+            <a:endParaRPr lang="en-US" sz="800" i="1" baseline="0" dirty="0">
+              <a:latin typeface="Calibri" panose="020F0502020204030204" pitchFamily="34" charset="0"/>
+              <a:ea typeface="Calibri" panose="020F0502020204030204" pitchFamily="34" charset="0"/>
+              <a:cs typeface="Calibri" panose="020F0502020204030204" pitchFamily="34" charset="0"/>
+            </a:endParaRPr>
+          </a:p>
+          <a:p>
+            <a:pPr algn="ctr"/>
+            <a:r>
+              <a:rPr lang="en-US" altLang="zh-CN" sz="800" i="1" u="none" strike="noStrike" dirty="0">
+                <a:latin typeface="Calibri" panose="020F0502020204030204" pitchFamily="34" charset="0"/>
+                <a:ea typeface="Calibri" panose="020F0502020204030204" pitchFamily="34" charset="0"/>
+                <a:cs typeface="Calibri" panose="020F0502020204030204" pitchFamily="34" charset="0"/>
+              </a:rPr>
+              <a:t>vs</a:t>
+            </a:r>
+          </a:p>
+          <a:p>
+            <a:pPr algn="ctr"/>
+            <a:r>
+              <a:rPr lang="en-US" sz="800" i="1" u="none" strike="noStrike" baseline="0" dirty="0">
+                <a:latin typeface="Calibri" panose="020F0502020204030204" pitchFamily="34" charset="0"/>
+                <a:ea typeface="Calibri" panose="020F0502020204030204" pitchFamily="34" charset="0"/>
+                <a:cs typeface="Calibri" panose="020F0502020204030204" pitchFamily="34" charset="0"/>
+              </a:rPr>
+              <a:t>cis</a:t>
+            </a:r>
+            <a:r>
+              <a:rPr lang="en-US" sz="800" u="none" strike="noStrike" baseline="0" dirty="0">
+                <a:latin typeface="Calibri" panose="020F0502020204030204" pitchFamily="34" charset="0"/>
+                <a:ea typeface="Calibri" panose="020F0502020204030204" pitchFamily="34" charset="0"/>
+                <a:cs typeface="Calibri" panose="020F0502020204030204" pitchFamily="34" charset="0"/>
+              </a:rPr>
+              <a:t>-state </a:t>
+            </a:r>
+            <a:r>
+              <a:rPr lang="en-US" altLang="zh-CN" sz="800" u="none" strike="noStrike" dirty="0">
+                <a:latin typeface="Calibri" panose="020F0502020204030204" pitchFamily="34" charset="0"/>
+                <a:ea typeface="Calibri" panose="020F0502020204030204" pitchFamily="34" charset="0"/>
+                <a:cs typeface="Calibri" panose="020F0502020204030204" pitchFamily="34" charset="0"/>
+              </a:rPr>
+              <a:t>OPN2</a:t>
+            </a:r>
+            <a:r>
+              <a:rPr lang="en-US" altLang="zh-CN" sz="800" u="none" strike="noStrike" baseline="30000" dirty="0">
+                <a:latin typeface="Calibri" panose="020F0502020204030204" pitchFamily="34" charset="0"/>
+                <a:ea typeface="Calibri" panose="020F0502020204030204" pitchFamily="34" charset="0"/>
+                <a:cs typeface="Calibri" panose="020F0502020204030204" pitchFamily="34" charset="0"/>
+              </a:rPr>
+              <a:t>QTY</a:t>
+            </a:r>
+          </a:p>
+          <a:p>
+            <a:pPr algn="ctr"/>
+            <a:r>
+              <a:rPr lang="en-US" sz="800" dirty="0">
+                <a:latin typeface="Calibri" panose="020F0502020204030204" pitchFamily="34" charset="0"/>
+                <a:ea typeface="Calibri" panose="020F0502020204030204" pitchFamily="34" charset="0"/>
+                <a:cs typeface="Calibri" panose="020F0502020204030204" pitchFamily="34" charset="0"/>
+              </a:rPr>
+              <a:t>(</a:t>
+            </a:r>
+            <a:r>
+              <a:rPr lang="en-US" altLang="zh-CN" sz="800" i="0" u="none" strike="noStrike" baseline="0" dirty="0">
+                <a:latin typeface="Calibri" panose="020F0502020204030204" pitchFamily="34" charset="0"/>
+                <a:ea typeface="Calibri" panose="020F0502020204030204" pitchFamily="34" charset="0"/>
+                <a:cs typeface="Calibri" panose="020F0502020204030204" pitchFamily="34" charset="0"/>
+              </a:rPr>
+              <a:t>RMSD = </a:t>
+            </a:r>
+            <a:r>
+              <a:rPr lang="en-US" altLang="zh-CN" sz="800" dirty="0">
+                <a:latin typeface="Calibri" panose="020F0502020204030204" pitchFamily="34" charset="0"/>
+                <a:ea typeface="Calibri" panose="020F0502020204030204" pitchFamily="34" charset="0"/>
+                <a:cs typeface="Calibri" panose="020F0502020204030204" pitchFamily="34" charset="0"/>
+              </a:rPr>
+              <a:t>2.034 </a:t>
+            </a:r>
+            <a:r>
+              <a:rPr lang="en-US" sz="800" dirty="0">
+                <a:latin typeface="Calibri" panose="020F0502020204030204" pitchFamily="34" charset="0"/>
+                <a:ea typeface="Calibri" panose="020F0502020204030204" pitchFamily="34" charset="0"/>
+                <a:cs typeface="Calibri" panose="020F0502020204030204" pitchFamily="34" charset="0"/>
+              </a:rPr>
+              <a:t>Å)</a:t>
+            </a:r>
+          </a:p>
+          <a:p>
+            <a:pPr algn="ctr"/>
+            <a:endParaRPr lang="en-US" sz="800" dirty="0">
+              <a:latin typeface="Calibri" panose="020F0502020204030204" pitchFamily="34" charset="0"/>
+              <a:ea typeface="Calibri" panose="020F0502020204030204" pitchFamily="34" charset="0"/>
+              <a:cs typeface="Calibri" panose="020F0502020204030204" pitchFamily="34" charset="0"/>
+            </a:endParaRPr>
+          </a:p>
+          <a:p>
+            <a:pPr algn="ctr"/>
+            <a:endParaRPr lang="en-US" sz="500" dirty="0">
+              <a:latin typeface="Calibri" panose="020F0502020204030204" pitchFamily="34" charset="0"/>
+              <a:ea typeface="Calibri" panose="020F0502020204030204" pitchFamily="34" charset="0"/>
+              <a:cs typeface="Calibri" panose="020F0502020204030204" pitchFamily="34" charset="0"/>
+            </a:endParaRPr>
+          </a:p>
+          <a:p>
+            <a:pPr algn="ctr"/>
+            <a:r>
+              <a:rPr lang="en-US" sz="800" i="1" u="none" strike="noStrike" baseline="0" dirty="0">
+                <a:latin typeface="Calibri" panose="020F0502020204030204" pitchFamily="34" charset="0"/>
+                <a:ea typeface="Calibri" panose="020F0502020204030204" pitchFamily="34" charset="0"/>
+                <a:cs typeface="Calibri" panose="020F0502020204030204" pitchFamily="34" charset="0"/>
+              </a:rPr>
+              <a:t>trans</a:t>
+            </a:r>
+            <a:r>
+              <a:rPr lang="en-US" sz="800" u="none" strike="noStrike" baseline="0" dirty="0">
+                <a:latin typeface="Calibri" panose="020F0502020204030204" pitchFamily="34" charset="0"/>
+                <a:ea typeface="Calibri" panose="020F0502020204030204" pitchFamily="34" charset="0"/>
+                <a:cs typeface="Calibri" panose="020F0502020204030204" pitchFamily="34" charset="0"/>
+              </a:rPr>
+              <a:t>-state </a:t>
+            </a:r>
+            <a:r>
+              <a:rPr lang="en-US" sz="800" i="0" u="none" strike="noStrike" baseline="0" dirty="0">
+                <a:latin typeface="Calibri" panose="020F0502020204030204" pitchFamily="34" charset="0"/>
+                <a:ea typeface="Calibri" panose="020F0502020204030204" pitchFamily="34" charset="0"/>
+                <a:cs typeface="Calibri" panose="020F0502020204030204" pitchFamily="34" charset="0"/>
+              </a:rPr>
+              <a:t>OPN2</a:t>
+            </a:r>
+          </a:p>
+          <a:p>
+            <a:pPr algn="ctr"/>
+            <a:r>
+              <a:rPr lang="en-US" sz="800" i="1" dirty="0">
+                <a:latin typeface="Calibri" panose="020F0502020204030204" pitchFamily="34" charset="0"/>
+                <a:ea typeface="Calibri" panose="020F0502020204030204" pitchFamily="34" charset="0"/>
+                <a:cs typeface="Calibri" panose="020F0502020204030204" pitchFamily="34" charset="0"/>
+              </a:rPr>
+              <a:t>vs</a:t>
+            </a:r>
+          </a:p>
+          <a:p>
+            <a:pPr algn="ctr"/>
+            <a:r>
+              <a:rPr lang="en-US" sz="800" i="1" u="none" strike="noStrike" baseline="0" dirty="0">
+                <a:latin typeface="Calibri" panose="020F0502020204030204" pitchFamily="34" charset="0"/>
+                <a:ea typeface="Calibri" panose="020F0502020204030204" pitchFamily="34" charset="0"/>
+                <a:cs typeface="Calibri" panose="020F0502020204030204" pitchFamily="34" charset="0"/>
+              </a:rPr>
+              <a:t>trans</a:t>
+            </a:r>
+            <a:r>
+              <a:rPr lang="en-US" sz="800" u="none" strike="noStrike" baseline="0" dirty="0">
+                <a:latin typeface="Calibri" panose="020F0502020204030204" pitchFamily="34" charset="0"/>
+                <a:ea typeface="Calibri" panose="020F0502020204030204" pitchFamily="34" charset="0"/>
+                <a:cs typeface="Calibri" panose="020F0502020204030204" pitchFamily="34" charset="0"/>
+              </a:rPr>
+              <a:t>-state </a:t>
+            </a:r>
+            <a:r>
+              <a:rPr lang="en-US" altLang="zh-CN" sz="800" u="none" strike="noStrike" dirty="0">
+                <a:latin typeface="Calibri" panose="020F0502020204030204" pitchFamily="34" charset="0"/>
+                <a:ea typeface="Calibri" panose="020F0502020204030204" pitchFamily="34" charset="0"/>
+                <a:cs typeface="Calibri" panose="020F0502020204030204" pitchFamily="34" charset="0"/>
+              </a:rPr>
+              <a:t>OPN2</a:t>
+            </a:r>
+            <a:r>
+              <a:rPr lang="en-US" altLang="zh-CN" sz="800" u="none" strike="noStrike" baseline="30000" dirty="0">
+                <a:latin typeface="Calibri" panose="020F0502020204030204" pitchFamily="34" charset="0"/>
+                <a:ea typeface="Calibri" panose="020F0502020204030204" pitchFamily="34" charset="0"/>
+                <a:cs typeface="Calibri" panose="020F0502020204030204" pitchFamily="34" charset="0"/>
+              </a:rPr>
+              <a:t>EXP</a:t>
+            </a:r>
+          </a:p>
+          <a:p>
+            <a:pPr algn="ctr"/>
+            <a:r>
+              <a:rPr lang="en-US" sz="800" dirty="0">
+                <a:latin typeface="Calibri" panose="020F0502020204030204" pitchFamily="34" charset="0"/>
+                <a:ea typeface="Calibri" panose="020F0502020204030204" pitchFamily="34" charset="0"/>
+                <a:cs typeface="Calibri" panose="020F0502020204030204" pitchFamily="34" charset="0"/>
+              </a:rPr>
+              <a:t>(</a:t>
+            </a:r>
+            <a:r>
+              <a:rPr lang="en-US" altLang="zh-CN" sz="800" i="0" u="none" strike="noStrike" baseline="0" dirty="0">
+                <a:latin typeface="Calibri" panose="020F0502020204030204" pitchFamily="34" charset="0"/>
+                <a:ea typeface="Calibri" panose="020F0502020204030204" pitchFamily="34" charset="0"/>
+                <a:cs typeface="Calibri" panose="020F0502020204030204" pitchFamily="34" charset="0"/>
+              </a:rPr>
+              <a:t>RMSD = </a:t>
+            </a:r>
+            <a:r>
+              <a:rPr lang="en-US" altLang="zh-CN" sz="800" dirty="0">
+                <a:latin typeface="Calibri" panose="020F0502020204030204" pitchFamily="34" charset="0"/>
+                <a:ea typeface="Calibri" panose="020F0502020204030204" pitchFamily="34" charset="0"/>
+                <a:cs typeface="Calibri" panose="020F0502020204030204" pitchFamily="34" charset="0"/>
+              </a:rPr>
+              <a:t>2.894 </a:t>
+            </a:r>
+            <a:r>
+              <a:rPr lang="en-US" sz="800" dirty="0">
+                <a:latin typeface="Calibri" panose="020F0502020204030204" pitchFamily="34" charset="0"/>
+                <a:ea typeface="Calibri" panose="020F0502020204030204" pitchFamily="34" charset="0"/>
+                <a:cs typeface="Calibri" panose="020F0502020204030204" pitchFamily="34" charset="0"/>
+              </a:rPr>
+              <a:t>Å)</a:t>
+            </a:r>
+          </a:p>
+        </p:txBody>
+      </p:sp>
+      <p:cxnSp>
+        <p:nvCxnSpPr>
+          <p:cNvPr id="18" name="直接箭头连接符 17">
+            <a:extLst>
+              <a:ext uri="{FF2B5EF4-FFF2-40B4-BE49-F238E27FC236}">
+                <a16:creationId xmlns:a16="http://schemas.microsoft.com/office/drawing/2014/main" id="{1C3ECF87-2FBA-955C-5020-6DF44EBE6BDC}"/>
+              </a:ext>
+            </a:extLst>
+          </p:cNvPr>
+          <p:cNvCxnSpPr>
+            <a:cxnSpLocks/>
+            <a:stCxn id="16" idx="1"/>
+            <a:endCxn id="16" idx="3"/>
+          </p:cNvCxnSpPr>
+          <p:nvPr/>
+        </p:nvCxnSpPr>
+        <p:spPr>
+          <a:xfrm>
+            <a:off x="2910027" y="4145473"/>
+            <a:ext cx="1184877" cy="0"/>
+          </a:xfrm>
+          <a:prstGeom prst="straightConnector1">
+            <a:avLst/>
+          </a:prstGeom>
+          <a:ln w="12700">
+            <a:solidFill>
+              <a:schemeClr val="tx1"/>
+            </a:solidFill>
+            <a:headEnd type="triangle" w="sm" len="lg"/>
+            <a:tailEnd type="triangle" w="sm" len="lg"/>
+          </a:ln>
+        </p:spPr>
+        <p:style>
+          <a:lnRef idx="2">
+            <a:schemeClr val="accent1"/>
+          </a:lnRef>
+          <a:fillRef idx="0">
+            <a:schemeClr val="accent1"/>
+          </a:fillRef>
+          <a:effectRef idx="1">
+            <a:schemeClr val="accent1"/>
+          </a:effectRef>
+          <a:fontRef idx="minor">
+            <a:schemeClr val="tx1"/>
+          </a:fontRef>
+        </p:style>
+      </p:cxnSp>
+      <p:sp>
+        <p:nvSpPr>
+          <p:cNvPr id="26" name="文本框 25">
+            <a:extLst>
+              <a:ext uri="{FF2B5EF4-FFF2-40B4-BE49-F238E27FC236}">
+                <a16:creationId xmlns:a16="http://schemas.microsoft.com/office/drawing/2014/main" id="{8B450F47-C9B1-830A-DAB5-81D545D9E694}"/>
+              </a:ext>
+            </a:extLst>
+          </p:cNvPr>
+          <p:cNvSpPr txBox="1"/>
+          <p:nvPr/>
+        </p:nvSpPr>
+        <p:spPr>
+          <a:xfrm>
+            <a:off x="3465523" y="2745644"/>
+            <a:ext cx="2927001" cy="215444"/>
+          </a:xfrm>
+          <a:prstGeom prst="rect">
+            <a:avLst/>
+          </a:prstGeom>
+          <a:noFill/>
+        </p:spPr>
+        <p:txBody>
+          <a:bodyPr wrap="square" rtlCol="0">
+            <a:spAutoFit/>
+          </a:bodyPr>
+          <a:lstStyle/>
+          <a:p>
+            <a:pPr algn="ctr"/>
+            <a:r>
+              <a:rPr lang="en-US" sz="800" i="1" u="none" strike="noStrike" baseline="0" dirty="0">
+                <a:latin typeface="Calibri" panose="020F0502020204030204" pitchFamily="34" charset="0"/>
+                <a:ea typeface="Calibri" panose="020F0502020204030204" pitchFamily="34" charset="0"/>
+                <a:cs typeface="Calibri" panose="020F0502020204030204" pitchFamily="34" charset="0"/>
+              </a:rPr>
+              <a:t>cis</a:t>
+            </a:r>
+            <a:r>
+              <a:rPr lang="en-US" sz="800" u="none" strike="noStrike" baseline="0" dirty="0">
+                <a:latin typeface="Calibri" panose="020F0502020204030204" pitchFamily="34" charset="0"/>
+                <a:ea typeface="Calibri" panose="020F0502020204030204" pitchFamily="34" charset="0"/>
+                <a:cs typeface="Calibri" panose="020F0502020204030204" pitchFamily="34" charset="0"/>
+              </a:rPr>
+              <a:t>-state </a:t>
+            </a:r>
+            <a:r>
+              <a:rPr lang="en-US" sz="800" u="none" strike="noStrike" dirty="0">
+                <a:latin typeface="Calibri" panose="020F0502020204030204" pitchFamily="34" charset="0"/>
+                <a:ea typeface="Calibri" panose="020F0502020204030204" pitchFamily="34" charset="0"/>
+                <a:cs typeface="Calibri" panose="020F0502020204030204" pitchFamily="34" charset="0"/>
+              </a:rPr>
+              <a:t>OPN2</a:t>
+            </a:r>
+            <a:r>
+              <a:rPr lang="en-US" sz="800" u="none" strike="noStrike" baseline="30000" dirty="0">
+                <a:latin typeface="Calibri" panose="020F0502020204030204" pitchFamily="34" charset="0"/>
+                <a:ea typeface="Calibri" panose="020F0502020204030204" pitchFamily="34" charset="0"/>
+                <a:cs typeface="Calibri" panose="020F0502020204030204" pitchFamily="34" charset="0"/>
+              </a:rPr>
+              <a:t>QTY</a:t>
+            </a:r>
+            <a:r>
+              <a:rPr lang="en-US" sz="800" u="none" strike="noStrike" dirty="0">
+                <a:latin typeface="Calibri" panose="020F0502020204030204" pitchFamily="34" charset="0"/>
+                <a:ea typeface="Calibri" panose="020F0502020204030204" pitchFamily="34" charset="0"/>
+                <a:cs typeface="Calibri" panose="020F0502020204030204" pitchFamily="34" charset="0"/>
+              </a:rPr>
+              <a:t> </a:t>
+            </a:r>
+            <a:r>
+              <a:rPr lang="en-US" altLang="zh-CN" sz="800" i="1" u="none" strike="noStrike" dirty="0">
+                <a:latin typeface="Calibri" panose="020F0502020204030204" pitchFamily="34" charset="0"/>
+                <a:ea typeface="Calibri" panose="020F0502020204030204" pitchFamily="34" charset="0"/>
+                <a:cs typeface="Calibri" panose="020F0502020204030204" pitchFamily="34" charset="0"/>
+              </a:rPr>
+              <a:t>vs </a:t>
+            </a:r>
+            <a:r>
+              <a:rPr lang="en-US" altLang="zh-CN" sz="800" i="1" dirty="0">
+                <a:latin typeface="Calibri" panose="020F0502020204030204" pitchFamily="34" charset="0"/>
+                <a:ea typeface="Calibri" panose="020F0502020204030204" pitchFamily="34" charset="0"/>
+                <a:cs typeface="Calibri" panose="020F0502020204030204" pitchFamily="34" charset="0"/>
+              </a:rPr>
+              <a:t>trans</a:t>
+            </a:r>
+            <a:r>
+              <a:rPr lang="en-US" sz="800" u="none" strike="noStrike" baseline="0" dirty="0">
+                <a:latin typeface="Calibri" panose="020F0502020204030204" pitchFamily="34" charset="0"/>
+                <a:ea typeface="Calibri" panose="020F0502020204030204" pitchFamily="34" charset="0"/>
+                <a:cs typeface="Calibri" panose="020F0502020204030204" pitchFamily="34" charset="0"/>
+              </a:rPr>
+              <a:t>-state </a:t>
+            </a:r>
+            <a:r>
+              <a:rPr lang="en-US" altLang="zh-CN" sz="800" u="none" strike="noStrike" dirty="0">
+                <a:latin typeface="Calibri" panose="020F0502020204030204" pitchFamily="34" charset="0"/>
+                <a:ea typeface="Calibri" panose="020F0502020204030204" pitchFamily="34" charset="0"/>
+                <a:cs typeface="Calibri" panose="020F0502020204030204" pitchFamily="34" charset="0"/>
+              </a:rPr>
+              <a:t>OPN2</a:t>
+            </a:r>
+            <a:r>
+              <a:rPr lang="en-US" sz="800" u="none" strike="noStrike" baseline="30000" dirty="0">
+                <a:latin typeface="Calibri" panose="020F0502020204030204" pitchFamily="34" charset="0"/>
+                <a:ea typeface="Calibri" panose="020F0502020204030204" pitchFamily="34" charset="0"/>
+                <a:cs typeface="Calibri" panose="020F0502020204030204" pitchFamily="34" charset="0"/>
+              </a:rPr>
+              <a:t>QTY</a:t>
+            </a:r>
+            <a:r>
+              <a:rPr lang="en-US" sz="800" u="none" strike="noStrike" dirty="0">
+                <a:latin typeface="Calibri" panose="020F0502020204030204" pitchFamily="34" charset="0"/>
+                <a:ea typeface="Calibri" panose="020F0502020204030204" pitchFamily="34" charset="0"/>
+                <a:cs typeface="Calibri" panose="020F0502020204030204" pitchFamily="34" charset="0"/>
+              </a:rPr>
+              <a:t> </a:t>
+            </a:r>
+            <a:r>
+              <a:rPr lang="en-US" altLang="zh-CN" sz="800" i="0" u="none" strike="noStrike" baseline="0" dirty="0">
+                <a:latin typeface="Calibri" panose="020F0502020204030204" pitchFamily="34" charset="0"/>
+                <a:ea typeface="Calibri" panose="020F0502020204030204" pitchFamily="34" charset="0"/>
+                <a:cs typeface="Calibri" panose="020F0502020204030204" pitchFamily="34" charset="0"/>
+              </a:rPr>
+              <a:t>(RMSD = </a:t>
+            </a:r>
+            <a:r>
+              <a:rPr lang="en-US" altLang="zh-CN" sz="800" dirty="0">
+                <a:latin typeface="Calibri" panose="020F0502020204030204" pitchFamily="34" charset="0"/>
+                <a:ea typeface="Calibri" panose="020F0502020204030204" pitchFamily="34" charset="0"/>
+                <a:cs typeface="Calibri" panose="020F0502020204030204" pitchFamily="34" charset="0"/>
+              </a:rPr>
+              <a:t>2.106 </a:t>
+            </a:r>
+            <a:r>
+              <a:rPr lang="en-US" sz="800" dirty="0">
+                <a:latin typeface="Calibri" panose="020F0502020204030204" pitchFamily="34" charset="0"/>
+                <a:ea typeface="Calibri" panose="020F0502020204030204" pitchFamily="34" charset="0"/>
+                <a:cs typeface="Calibri" panose="020F0502020204030204" pitchFamily="34" charset="0"/>
+              </a:rPr>
+              <a:t>Å)</a:t>
+            </a:r>
+          </a:p>
+        </p:txBody>
+      </p:sp>
+      <p:sp>
+        <p:nvSpPr>
+          <p:cNvPr id="27" name="文本框 26">
+            <a:extLst>
+              <a:ext uri="{FF2B5EF4-FFF2-40B4-BE49-F238E27FC236}">
+                <a16:creationId xmlns:a16="http://schemas.microsoft.com/office/drawing/2014/main" id="{4017DF23-F56F-443A-2A0E-16752EC48CF6}"/>
+              </a:ext>
+            </a:extLst>
+          </p:cNvPr>
+          <p:cNvSpPr txBox="1"/>
+          <p:nvPr/>
+        </p:nvSpPr>
+        <p:spPr>
+          <a:xfrm>
+            <a:off x="923759" y="2751207"/>
+            <a:ext cx="2551805" cy="215444"/>
+          </a:xfrm>
+          <a:prstGeom prst="rect">
+            <a:avLst/>
+          </a:prstGeom>
+          <a:noFill/>
+        </p:spPr>
+        <p:txBody>
+          <a:bodyPr wrap="square" rtlCol="0">
+            <a:spAutoFit/>
+          </a:bodyPr>
+          <a:lstStyle/>
+          <a:p>
+            <a:pPr algn="ctr"/>
+            <a:r>
+              <a:rPr lang="en-US" sz="800" i="1" u="none" strike="noStrike" baseline="0" dirty="0">
+                <a:latin typeface="Calibri" panose="020F0502020204030204" pitchFamily="34" charset="0"/>
+                <a:ea typeface="Calibri" panose="020F0502020204030204" pitchFamily="34" charset="0"/>
+                <a:cs typeface="Calibri" panose="020F0502020204030204" pitchFamily="34" charset="0"/>
+              </a:rPr>
+              <a:t>cis</a:t>
+            </a:r>
+            <a:r>
+              <a:rPr lang="en-US" sz="800" u="none" strike="noStrike" baseline="0" dirty="0">
+                <a:latin typeface="Calibri" panose="020F0502020204030204" pitchFamily="34" charset="0"/>
+                <a:ea typeface="Calibri" panose="020F0502020204030204" pitchFamily="34" charset="0"/>
+                <a:cs typeface="Calibri" panose="020F0502020204030204" pitchFamily="34" charset="0"/>
+              </a:rPr>
+              <a:t>-state </a:t>
+            </a:r>
+            <a:r>
+              <a:rPr lang="en-US" sz="800" u="none" strike="noStrike" dirty="0">
+                <a:latin typeface="Calibri" panose="020F0502020204030204" pitchFamily="34" charset="0"/>
+                <a:ea typeface="Calibri" panose="020F0502020204030204" pitchFamily="34" charset="0"/>
+                <a:cs typeface="Calibri" panose="020F0502020204030204" pitchFamily="34" charset="0"/>
+              </a:rPr>
+              <a:t>OPN2 </a:t>
+            </a:r>
+            <a:r>
+              <a:rPr lang="en-US" altLang="zh-CN" sz="800" i="1" u="none" strike="noStrike" dirty="0">
+                <a:latin typeface="Calibri" panose="020F0502020204030204" pitchFamily="34" charset="0"/>
+                <a:ea typeface="Calibri" panose="020F0502020204030204" pitchFamily="34" charset="0"/>
+                <a:cs typeface="Calibri" panose="020F0502020204030204" pitchFamily="34" charset="0"/>
+              </a:rPr>
+              <a:t>vs </a:t>
+            </a:r>
+            <a:r>
+              <a:rPr lang="en-US" altLang="zh-CN" sz="800" i="1" dirty="0">
+                <a:latin typeface="Calibri" panose="020F0502020204030204" pitchFamily="34" charset="0"/>
+                <a:ea typeface="Calibri" panose="020F0502020204030204" pitchFamily="34" charset="0"/>
+                <a:cs typeface="Calibri" panose="020F0502020204030204" pitchFamily="34" charset="0"/>
+              </a:rPr>
+              <a:t>trans</a:t>
+            </a:r>
+            <a:r>
+              <a:rPr lang="en-US" sz="800" u="none" strike="noStrike" baseline="0" dirty="0">
+                <a:latin typeface="Calibri" panose="020F0502020204030204" pitchFamily="34" charset="0"/>
+                <a:ea typeface="Calibri" panose="020F0502020204030204" pitchFamily="34" charset="0"/>
+                <a:cs typeface="Calibri" panose="020F0502020204030204" pitchFamily="34" charset="0"/>
+              </a:rPr>
+              <a:t>-state </a:t>
+            </a:r>
+            <a:r>
+              <a:rPr lang="en-US" altLang="zh-CN" sz="800" u="none" strike="noStrike" dirty="0">
+                <a:latin typeface="Calibri" panose="020F0502020204030204" pitchFamily="34" charset="0"/>
+                <a:ea typeface="Calibri" panose="020F0502020204030204" pitchFamily="34" charset="0"/>
+                <a:cs typeface="Calibri" panose="020F0502020204030204" pitchFamily="34" charset="0"/>
+              </a:rPr>
+              <a:t>OPN2</a:t>
+            </a:r>
+            <a:r>
+              <a:rPr lang="en-US" sz="800" u="none" strike="noStrike" dirty="0">
+                <a:latin typeface="Calibri" panose="020F0502020204030204" pitchFamily="34" charset="0"/>
+                <a:ea typeface="Calibri" panose="020F0502020204030204" pitchFamily="34" charset="0"/>
+                <a:cs typeface="Calibri" panose="020F0502020204030204" pitchFamily="34" charset="0"/>
+              </a:rPr>
+              <a:t> </a:t>
+            </a:r>
+            <a:r>
+              <a:rPr lang="en-US" altLang="zh-CN" sz="800" i="0" u="none" strike="noStrike" baseline="0" dirty="0">
+                <a:latin typeface="Calibri" panose="020F0502020204030204" pitchFamily="34" charset="0"/>
+                <a:ea typeface="Calibri" panose="020F0502020204030204" pitchFamily="34" charset="0"/>
+                <a:cs typeface="Calibri" panose="020F0502020204030204" pitchFamily="34" charset="0"/>
+              </a:rPr>
+              <a:t>(RMSD = </a:t>
+            </a:r>
+            <a:r>
+              <a:rPr lang="en-US" altLang="zh-CN" sz="800" dirty="0">
+                <a:latin typeface="Calibri" panose="020F0502020204030204" pitchFamily="34" charset="0"/>
+                <a:ea typeface="Calibri" panose="020F0502020204030204" pitchFamily="34" charset="0"/>
+                <a:cs typeface="Calibri" panose="020F0502020204030204" pitchFamily="34" charset="0"/>
+              </a:rPr>
+              <a:t>2.300 </a:t>
+            </a:r>
+            <a:r>
+              <a:rPr lang="en-US" sz="800" dirty="0">
+                <a:latin typeface="Calibri" panose="020F0502020204030204" pitchFamily="34" charset="0"/>
+                <a:ea typeface="Calibri" panose="020F0502020204030204" pitchFamily="34" charset="0"/>
+                <a:cs typeface="Calibri" panose="020F0502020204030204" pitchFamily="34" charset="0"/>
+              </a:rPr>
+              <a:t>Å)</a:t>
+            </a:r>
+          </a:p>
+        </p:txBody>
+      </p:sp>
+      <p:sp>
+        <p:nvSpPr>
+          <p:cNvPr id="28" name="文本框 27">
+            <a:extLst>
+              <a:ext uri="{FF2B5EF4-FFF2-40B4-BE49-F238E27FC236}">
+                <a16:creationId xmlns:a16="http://schemas.microsoft.com/office/drawing/2014/main" id="{B1AE7581-A260-231D-7171-73C6F0046D03}"/>
+              </a:ext>
+            </a:extLst>
+          </p:cNvPr>
+          <p:cNvSpPr txBox="1"/>
+          <p:nvPr/>
+        </p:nvSpPr>
+        <p:spPr>
+          <a:xfrm>
+            <a:off x="4373985" y="384653"/>
+            <a:ext cx="1053272" cy="276999"/>
+          </a:xfrm>
+          <a:prstGeom prst="rect">
+            <a:avLst/>
+          </a:prstGeom>
+          <a:noFill/>
+        </p:spPr>
+        <p:txBody>
+          <a:bodyPr wrap="square" rtlCol="0">
+            <a:spAutoFit/>
+          </a:bodyPr>
+          <a:lstStyle/>
+          <a:p>
+            <a:pPr algn="ctr"/>
+            <a:r>
+              <a:rPr lang="en-US" sz="1200" b="1" dirty="0">
+                <a:solidFill>
+                  <a:schemeClr val="tx2">
+                    <a:lumMod val="75000"/>
+                    <a:lumOff val="25000"/>
+                  </a:schemeClr>
+                </a:solidFill>
+                <a:latin typeface="Calibri" panose="020F0502020204030204" pitchFamily="34" charset="0"/>
+                <a:ea typeface="Calibri" panose="020F0502020204030204" pitchFamily="34" charset="0"/>
+                <a:cs typeface="Calibri" panose="020F0502020204030204" pitchFamily="34" charset="0"/>
+              </a:rPr>
+              <a:t>QTY Analog</a:t>
+            </a:r>
+            <a:endParaRPr lang="en-US" sz="1200" i="1" dirty="0">
+              <a:solidFill>
+                <a:schemeClr val="tx2">
+                  <a:lumMod val="75000"/>
+                  <a:lumOff val="25000"/>
+                </a:schemeClr>
+              </a:solidFill>
+              <a:latin typeface="Calibri" panose="020F0502020204030204" pitchFamily="34" charset="0"/>
+              <a:ea typeface="Calibri" panose="020F0502020204030204" pitchFamily="34" charset="0"/>
+              <a:cs typeface="Calibri" panose="020F0502020204030204" pitchFamily="34" charset="0"/>
+            </a:endParaRPr>
+          </a:p>
+        </p:txBody>
+      </p:sp>
+      <p:sp>
+        <p:nvSpPr>
+          <p:cNvPr id="29" name="文本框 28">
+            <a:extLst>
+              <a:ext uri="{FF2B5EF4-FFF2-40B4-BE49-F238E27FC236}">
+                <a16:creationId xmlns:a16="http://schemas.microsoft.com/office/drawing/2014/main" id="{54561C41-1836-A84E-2CE2-B5048104B7CE}"/>
+              </a:ext>
+            </a:extLst>
+          </p:cNvPr>
+          <p:cNvSpPr txBox="1"/>
+          <p:nvPr/>
+        </p:nvSpPr>
+        <p:spPr>
+          <a:xfrm>
+            <a:off x="1467907" y="387275"/>
+            <a:ext cx="1205230" cy="276999"/>
+          </a:xfrm>
+          <a:prstGeom prst="rect">
+            <a:avLst/>
+          </a:prstGeom>
+          <a:noFill/>
+        </p:spPr>
+        <p:txBody>
+          <a:bodyPr wrap="square" rtlCol="0">
+            <a:spAutoFit/>
+          </a:bodyPr>
+          <a:lstStyle/>
+          <a:p>
+            <a:pPr algn="ctr"/>
+            <a:r>
+              <a:rPr lang="en-US" sz="1200" b="1" dirty="0">
+                <a:solidFill>
+                  <a:schemeClr val="accent6"/>
+                </a:solidFill>
+                <a:latin typeface="Calibri" panose="020F0502020204030204" pitchFamily="34" charset="0"/>
+                <a:ea typeface="Calibri" panose="020F0502020204030204" pitchFamily="34" charset="0"/>
+                <a:cs typeface="Calibri" panose="020F0502020204030204" pitchFamily="34" charset="0"/>
+              </a:rPr>
+              <a:t>Native Protein</a:t>
+            </a:r>
+            <a:endParaRPr lang="en-US" sz="1200" i="1" dirty="0">
+              <a:solidFill>
+                <a:schemeClr val="accent6"/>
+              </a:solidFill>
+              <a:latin typeface="Calibri" panose="020F0502020204030204" pitchFamily="34" charset="0"/>
+              <a:ea typeface="Calibri" panose="020F0502020204030204" pitchFamily="34" charset="0"/>
+              <a:cs typeface="Calibri" panose="020F0502020204030204" pitchFamily="34" charset="0"/>
+            </a:endParaRPr>
+          </a:p>
+        </p:txBody>
+      </p:sp>
       <p:pic>
         <p:nvPicPr>
-          <p:cNvPr id="2" name="图片 1">
+          <p:cNvPr id="32" name="图片 31">
             <a:extLst>
               <a:ext uri="{FF2B5EF4-FFF2-40B4-BE49-F238E27FC236}">
-                <a16:creationId xmlns:a16="http://schemas.microsoft.com/office/drawing/2014/main" id="{515B0FF6-8D30-5ADA-F47C-8BDDF4C2788E}"/>
+                <a16:creationId xmlns:a16="http://schemas.microsoft.com/office/drawing/2014/main" id="{F9DA4191-10BD-C2B1-FA1C-552BB2CD5CA3}"/>
               </a:ext>
             </a:extLst>
           </p:cNvPr>
@@ -3434,14 +4223,14 @@
           <p:nvPr/>
         </p:nvPicPr>
         <p:blipFill>
-          <a:blip r:embed="rId3"/>
+          <a:blip r:embed="rId4"/>
           <a:stretch>
             <a:fillRect/>
           </a:stretch>
         </p:blipFill>
         <p:spPr>
           <a:xfrm>
-            <a:off x="572578" y="705951"/>
+            <a:off x="3420288" y="705053"/>
             <a:ext cx="2765918" cy="1793692"/>
           </a:xfrm>
           <a:prstGeom prst="rect">
@@ -3451,7 +4240,7 @@
       </p:pic>
       <p:pic>
         <p:nvPicPr>
-          <p:cNvPr id="3" name="图片 2">
+          <p:cNvPr id="35" name="图片 34">
             <a:extLst>
               <a:ext uri="{FF2B5EF4-FFF2-40B4-BE49-F238E27FC236}">
                 <a16:creationId xmlns:a16="http://schemas.microsoft.com/office/drawing/2014/main" id="{6E9D4F00-A570-A859-2D78-FD9C4E560276}"/>
@@ -3464,7 +4253,7 @@
           <p:nvPr/>
         </p:nvPicPr>
         <p:blipFill>
-          <a:blip r:embed="rId4">
+          <a:blip r:embed="rId5">
             <a:alphaModFix/>
           </a:blip>
           <a:stretch>
@@ -3473,7 +4262,7 @@
         </p:blipFill>
         <p:spPr>
           <a:xfrm>
-            <a:off x="3412041" y="705983"/>
+            <a:off x="567412" y="688542"/>
             <a:ext cx="2778698" cy="1800149"/>
           </a:xfrm>
           <a:prstGeom prst="rect">
@@ -3483,7 +4272,7 @@
       </p:pic>
       <p:pic>
         <p:nvPicPr>
-          <p:cNvPr id="5" name="图片 4">
+          <p:cNvPr id="36" name="图片 35">
             <a:extLst>
               <a:ext uri="{FF2B5EF4-FFF2-40B4-BE49-F238E27FC236}">
                 <a16:creationId xmlns:a16="http://schemas.microsoft.com/office/drawing/2014/main" id="{0BDD8E4E-61EF-E540-3CE9-8FAC6F2574AA}"/>
@@ -3496,14 +4285,14 @@
           <p:nvPr/>
         </p:nvPicPr>
         <p:blipFill>
-          <a:blip r:embed="rId5"/>
+          <a:blip r:embed="rId6"/>
           <a:stretch>
             <a:fillRect/>
           </a:stretch>
         </p:blipFill>
         <p:spPr>
           <a:xfrm>
-            <a:off x="1820331" y="2518831"/>
+            <a:off x="1820331" y="2508671"/>
             <a:ext cx="3357033" cy="185690"/>
           </a:xfrm>
           <a:prstGeom prst="rect">
@@ -3541,931 +4330,2181 @@
           <a:chExt cx="0" cy="0"/>
         </a:xfrm>
       </p:grpSpPr>
-      <p:sp>
-        <p:nvSpPr>
-          <p:cNvPr id="27" name="文本框 26">
+      <p:grpSp>
+        <p:nvGrpSpPr>
+          <p:cNvPr id="103" name="组合 102">
             <a:extLst>
               <a:ext uri="{FF2B5EF4-FFF2-40B4-BE49-F238E27FC236}">
-                <a16:creationId xmlns:a16="http://schemas.microsoft.com/office/drawing/2014/main" id="{5C44FD30-148C-9B80-B278-29A893DBCFD8}"/>
+                <a16:creationId xmlns:a16="http://schemas.microsoft.com/office/drawing/2014/main" id="{F98FE925-A831-6A5C-82EF-33DEF4D9005E}"/>
               </a:ext>
             </a:extLst>
           </p:cNvPr>
-          <p:cNvSpPr txBox="1"/>
+          <p:cNvGrpSpPr/>
           <p:nvPr/>
-        </p:nvSpPr>
-        <p:spPr>
+        </p:nvGrpSpPr>
+        <p:grpSpPr>
           <a:xfrm>
-            <a:off x="7336493" y="3646208"/>
-            <a:ext cx="1962622" cy="215444"/>
+            <a:off x="3477646" y="579350"/>
+            <a:ext cx="2733933" cy="1925301"/>
+            <a:chOff x="419784" y="4903680"/>
+            <a:chExt cx="2733933" cy="1925301"/>
           </a:xfrm>
-          <a:prstGeom prst="rect">
-            <a:avLst/>
-          </a:prstGeom>
-          <a:noFill/>
-        </p:spPr>
-        <p:txBody>
-          <a:bodyPr wrap="square" rtlCol="0">
-            <a:spAutoFit/>
-          </a:bodyPr>
-          <a:lstStyle/>
-          <a:p>
-            <a:r>
-              <a:rPr lang="en-US" sz="800" b="1" i="0" u="none" strike="noStrike" baseline="0" dirty="0">
+        </p:grpSpPr>
+        <p:pic>
+          <p:nvPicPr>
+            <p:cNvPr id="39" name="图片 38" descr="图片包含 地图&#10;&#10;AI 生成的内容可能不正确。">
+              <a:extLst>
+                <a:ext uri="{FF2B5EF4-FFF2-40B4-BE49-F238E27FC236}">
+                  <a16:creationId xmlns:a16="http://schemas.microsoft.com/office/drawing/2014/main" id="{0EC8BD40-2D69-6FC8-96EA-19CE53259C1C}"/>
+                </a:ext>
+              </a:extLst>
+            </p:cNvPr>
+            <p:cNvPicPr>
+              <a:picLocks noChangeAspect="1"/>
+            </p:cNvPicPr>
+            <p:nvPr/>
+          </p:nvPicPr>
+          <p:blipFill>
+            <a:blip r:embed="rId2">
+              <a:clrChange>
+                <a:clrFrom>
+                  <a:srgbClr val="FFFFFF"/>
+                </a:clrFrom>
+                <a:clrTo>
+                  <a:srgbClr val="FFFFFF">
+                    <a:alpha val="0"/>
+                  </a:srgbClr>
+                </a:clrTo>
+              </a:clrChange>
+              <a:extLst>
+                <a:ext uri="{28A0092B-C50C-407E-A947-70E740481C1C}">
+                  <a14:useLocalDpi xmlns:a14="http://schemas.microsoft.com/office/drawing/2010/main" val="0"/>
+                </a:ext>
+              </a:extLst>
+            </a:blip>
+            <a:stretch>
+              <a:fillRect/>
+            </a:stretch>
+          </p:blipFill>
+          <p:spPr>
+            <a:xfrm>
+              <a:off x="485613" y="4903680"/>
+              <a:ext cx="2668104" cy="1925301"/>
+            </a:xfrm>
+            <a:prstGeom prst="rect">
+              <a:avLst/>
+            </a:prstGeom>
+          </p:spPr>
+        </p:pic>
+        <p:sp>
+          <p:nvSpPr>
+            <p:cNvPr id="52" name="文本框 51">
+              <a:extLst>
+                <a:ext uri="{FF2B5EF4-FFF2-40B4-BE49-F238E27FC236}">
+                  <a16:creationId xmlns:a16="http://schemas.microsoft.com/office/drawing/2014/main" id="{38F07D92-F038-E103-5C1A-C30612612F17}"/>
+                </a:ext>
+              </a:extLst>
+            </p:cNvPr>
+            <p:cNvSpPr txBox="1"/>
+            <p:nvPr/>
+          </p:nvSpPr>
+          <p:spPr>
+            <a:xfrm>
+              <a:off x="766669" y="5602485"/>
+              <a:ext cx="398182" cy="200055"/>
+            </a:xfrm>
+            <a:prstGeom prst="rect">
+              <a:avLst/>
+            </a:prstGeom>
+            <a:noFill/>
+          </p:spPr>
+          <p:txBody>
+            <a:bodyPr wrap="square" rtlCol="0">
+              <a:spAutoFit/>
+            </a:bodyPr>
+            <a:lstStyle/>
+            <a:p>
+              <a:r>
+                <a:rPr lang="en-US" sz="700" dirty="0">
+                  <a:solidFill>
+                    <a:srgbClr val="324A7A"/>
+                  </a:solidFill>
+                  <a:latin typeface="Calibri" panose="020F0502020204030204" pitchFamily="34" charset="0"/>
+                  <a:ea typeface="Calibri" panose="020F0502020204030204" pitchFamily="34" charset="0"/>
+                  <a:cs typeface="Calibri" panose="020F0502020204030204" pitchFamily="34" charset="0"/>
+                </a:rPr>
+                <a:t>296</a:t>
+              </a:r>
+              <a:r>
+                <a:rPr lang="en-US" altLang="zh-CN" sz="700" dirty="0">
+                  <a:solidFill>
+                    <a:srgbClr val="324A7A"/>
+                  </a:solidFill>
+                  <a:latin typeface="Calibri" panose="020F0502020204030204" pitchFamily="34" charset="0"/>
+                  <a:ea typeface="Calibri" panose="020F0502020204030204" pitchFamily="34" charset="0"/>
+                  <a:cs typeface="Calibri" panose="020F0502020204030204" pitchFamily="34" charset="0"/>
+                </a:rPr>
+                <a:t>K</a:t>
+              </a:r>
+              <a:endParaRPr lang="en-US" sz="700" dirty="0">
+                <a:solidFill>
+                  <a:srgbClr val="324A7A"/>
+                </a:solidFill>
                 <a:latin typeface="Calibri" panose="020F0502020204030204" pitchFamily="34" charset="0"/>
                 <a:ea typeface="Calibri" panose="020F0502020204030204" pitchFamily="34" charset="0"/>
                 <a:cs typeface="Calibri" panose="020F0502020204030204" pitchFamily="34" charset="0"/>
-              </a:rPr>
-              <a:t>d) OPN2</a:t>
-            </a:r>
-            <a:r>
-              <a:rPr lang="en-US" altLang="zh-CN" sz="800" b="1" i="0" u="none" strike="noStrike" baseline="30000" dirty="0">
+              </a:endParaRPr>
+            </a:p>
+          </p:txBody>
+        </p:sp>
+        <p:sp>
+          <p:nvSpPr>
+            <p:cNvPr id="53" name="文本框 52">
+              <a:extLst>
+                <a:ext uri="{FF2B5EF4-FFF2-40B4-BE49-F238E27FC236}">
+                  <a16:creationId xmlns:a16="http://schemas.microsoft.com/office/drawing/2014/main" id="{A16B2FF9-073E-D36D-6E55-D463FA7A0C9D}"/>
+                </a:ext>
+              </a:extLst>
+            </p:cNvPr>
+            <p:cNvSpPr txBox="1"/>
+            <p:nvPr/>
+          </p:nvSpPr>
+          <p:spPr>
+            <a:xfrm>
+              <a:off x="419784" y="6050315"/>
+              <a:ext cx="398182" cy="200055"/>
+            </a:xfrm>
+            <a:prstGeom prst="rect">
+              <a:avLst/>
+            </a:prstGeom>
+            <a:noFill/>
+          </p:spPr>
+          <p:txBody>
+            <a:bodyPr wrap="square" rtlCol="0">
+              <a:spAutoFit/>
+            </a:bodyPr>
+            <a:lstStyle/>
+            <a:p>
+              <a:r>
+                <a:rPr lang="en-US" sz="700" dirty="0">
+                  <a:solidFill>
+                    <a:srgbClr val="324A7A"/>
+                  </a:solidFill>
+                  <a:latin typeface="Calibri" panose="020F0502020204030204" pitchFamily="34" charset="0"/>
+                  <a:ea typeface="Calibri" panose="020F0502020204030204" pitchFamily="34" charset="0"/>
+                  <a:cs typeface="Calibri" panose="020F0502020204030204" pitchFamily="34" charset="0"/>
+                </a:rPr>
+                <a:t>187C</a:t>
+              </a:r>
+            </a:p>
+          </p:txBody>
+        </p:sp>
+        <p:sp>
+          <p:nvSpPr>
+            <p:cNvPr id="54" name="文本框 53">
+              <a:extLst>
+                <a:ext uri="{FF2B5EF4-FFF2-40B4-BE49-F238E27FC236}">
+                  <a16:creationId xmlns:a16="http://schemas.microsoft.com/office/drawing/2014/main" id="{0C76AEF4-2298-4732-2A3F-4CB8394891F9}"/>
+                </a:ext>
+              </a:extLst>
+            </p:cNvPr>
+            <p:cNvSpPr txBox="1"/>
+            <p:nvPr/>
+          </p:nvSpPr>
+          <p:spPr>
+            <a:xfrm>
+              <a:off x="1164851" y="6142162"/>
+              <a:ext cx="420532" cy="200055"/>
+            </a:xfrm>
+            <a:prstGeom prst="rect">
+              <a:avLst/>
+            </a:prstGeom>
+            <a:noFill/>
+          </p:spPr>
+          <p:txBody>
+            <a:bodyPr wrap="square" rtlCol="0">
+              <a:spAutoFit/>
+            </a:bodyPr>
+            <a:lstStyle/>
+            <a:p>
+              <a:r>
+                <a:rPr lang="en-US" sz="700" dirty="0">
+                  <a:solidFill>
+                    <a:srgbClr val="324A7A"/>
+                  </a:solidFill>
+                  <a:latin typeface="Calibri" panose="020F0502020204030204" pitchFamily="34" charset="0"/>
+                  <a:ea typeface="Calibri" panose="020F0502020204030204" pitchFamily="34" charset="0"/>
+                  <a:cs typeface="Calibri" panose="020F0502020204030204" pitchFamily="34" charset="0"/>
+                </a:rPr>
+                <a:t>188G</a:t>
+              </a:r>
+            </a:p>
+          </p:txBody>
+        </p:sp>
+        <p:sp>
+          <p:nvSpPr>
+            <p:cNvPr id="55" name="文本框 54">
+              <a:extLst>
+                <a:ext uri="{FF2B5EF4-FFF2-40B4-BE49-F238E27FC236}">
+                  <a16:creationId xmlns:a16="http://schemas.microsoft.com/office/drawing/2014/main" id="{F6CB8717-C8E1-80D5-6713-2B6FACA8E481}"/>
+                </a:ext>
+              </a:extLst>
+            </p:cNvPr>
+            <p:cNvSpPr txBox="1"/>
+            <p:nvPr/>
+          </p:nvSpPr>
+          <p:spPr>
+            <a:xfrm>
+              <a:off x="1541618" y="6507755"/>
+              <a:ext cx="420532" cy="200055"/>
+            </a:xfrm>
+            <a:prstGeom prst="rect">
+              <a:avLst/>
+            </a:prstGeom>
+            <a:noFill/>
+          </p:spPr>
+          <p:txBody>
+            <a:bodyPr wrap="square" rtlCol="0">
+              <a:spAutoFit/>
+            </a:bodyPr>
+            <a:lstStyle/>
+            <a:p>
+              <a:r>
+                <a:rPr lang="en-US" sz="700" dirty="0">
+                  <a:solidFill>
+                    <a:srgbClr val="324A7A"/>
+                  </a:solidFill>
+                  <a:latin typeface="Calibri" panose="020F0502020204030204" pitchFamily="34" charset="0"/>
+                  <a:ea typeface="Calibri" panose="020F0502020204030204" pitchFamily="34" charset="0"/>
+                  <a:cs typeface="Calibri" panose="020F0502020204030204" pitchFamily="34" charset="0"/>
+                </a:rPr>
+                <a:t>189I</a:t>
+              </a:r>
+            </a:p>
+          </p:txBody>
+        </p:sp>
+        <p:sp>
+          <p:nvSpPr>
+            <p:cNvPr id="56" name="文本框 55">
+              <a:extLst>
+                <a:ext uri="{FF2B5EF4-FFF2-40B4-BE49-F238E27FC236}">
+                  <a16:creationId xmlns:a16="http://schemas.microsoft.com/office/drawing/2014/main" id="{D9C5BBB6-5AB1-26D1-F4A2-98079A0D22B3}"/>
+                </a:ext>
+              </a:extLst>
+            </p:cNvPr>
+            <p:cNvSpPr txBox="1"/>
+            <p:nvPr/>
+          </p:nvSpPr>
+          <p:spPr>
+            <a:xfrm>
+              <a:off x="781143" y="5843459"/>
+              <a:ext cx="420532" cy="200055"/>
+            </a:xfrm>
+            <a:prstGeom prst="rect">
+              <a:avLst/>
+            </a:prstGeom>
+            <a:noFill/>
+          </p:spPr>
+          <p:txBody>
+            <a:bodyPr wrap="square" rtlCol="0">
+              <a:spAutoFit/>
+            </a:bodyPr>
+            <a:lstStyle/>
+            <a:p>
+              <a:r>
+                <a:rPr lang="en-US" sz="700" dirty="0">
+                  <a:solidFill>
+                    <a:srgbClr val="324A7A"/>
+                  </a:solidFill>
+                  <a:latin typeface="Calibri" panose="020F0502020204030204" pitchFamily="34" charset="0"/>
+                  <a:ea typeface="Calibri" panose="020F0502020204030204" pitchFamily="34" charset="0"/>
+                  <a:cs typeface="Calibri" panose="020F0502020204030204" pitchFamily="34" charset="0"/>
+                </a:rPr>
+                <a:t>181E</a:t>
+              </a:r>
+            </a:p>
+          </p:txBody>
+        </p:sp>
+        <p:sp>
+          <p:nvSpPr>
+            <p:cNvPr id="57" name="文本框 56">
+              <a:extLst>
+                <a:ext uri="{FF2B5EF4-FFF2-40B4-BE49-F238E27FC236}">
+                  <a16:creationId xmlns:a16="http://schemas.microsoft.com/office/drawing/2014/main" id="{347D1815-3DDE-CBB4-B3DA-70CC68DA9F87}"/>
+                </a:ext>
+              </a:extLst>
+            </p:cNvPr>
+            <p:cNvSpPr txBox="1"/>
+            <p:nvPr/>
+          </p:nvSpPr>
+          <p:spPr>
+            <a:xfrm>
+              <a:off x="1504446" y="5999958"/>
+              <a:ext cx="420532" cy="200055"/>
+            </a:xfrm>
+            <a:prstGeom prst="rect">
+              <a:avLst/>
+            </a:prstGeom>
+            <a:noFill/>
+          </p:spPr>
+          <p:txBody>
+            <a:bodyPr wrap="square" rtlCol="0">
+              <a:spAutoFit/>
+            </a:bodyPr>
+            <a:lstStyle/>
+            <a:p>
+              <a:r>
+                <a:rPr lang="en-US" sz="700" dirty="0">
+                  <a:solidFill>
+                    <a:srgbClr val="324A7A"/>
+                  </a:solidFill>
+                  <a:latin typeface="Calibri" panose="020F0502020204030204" pitchFamily="34" charset="0"/>
+                  <a:ea typeface="Calibri" panose="020F0502020204030204" pitchFamily="34" charset="0"/>
+                  <a:cs typeface="Calibri" panose="020F0502020204030204" pitchFamily="34" charset="0"/>
+                </a:rPr>
+                <a:t>268Y</a:t>
+              </a:r>
+            </a:p>
+          </p:txBody>
+        </p:sp>
+        <p:sp>
+          <p:nvSpPr>
+            <p:cNvPr id="58" name="文本框 57">
+              <a:extLst>
+                <a:ext uri="{FF2B5EF4-FFF2-40B4-BE49-F238E27FC236}">
+                  <a16:creationId xmlns:a16="http://schemas.microsoft.com/office/drawing/2014/main" id="{7538A8C7-3420-FAE1-D1D5-62F47D2CC012}"/>
+                </a:ext>
+              </a:extLst>
+            </p:cNvPr>
+            <p:cNvSpPr txBox="1"/>
+            <p:nvPr/>
+          </p:nvSpPr>
+          <p:spPr>
+            <a:xfrm>
+              <a:off x="2259163" y="6174736"/>
+              <a:ext cx="420532" cy="200055"/>
+            </a:xfrm>
+            <a:prstGeom prst="rect">
+              <a:avLst/>
+            </a:prstGeom>
+            <a:noFill/>
+          </p:spPr>
+          <p:txBody>
+            <a:bodyPr wrap="square" rtlCol="0">
+              <a:spAutoFit/>
+            </a:bodyPr>
+            <a:lstStyle/>
+            <a:p>
+              <a:r>
+                <a:rPr lang="en-US" sz="700" dirty="0">
+                  <a:solidFill>
+                    <a:srgbClr val="324A7A"/>
+                  </a:solidFill>
+                  <a:latin typeface="Calibri" panose="020F0502020204030204" pitchFamily="34" charset="0"/>
+                  <a:ea typeface="Calibri" panose="020F0502020204030204" pitchFamily="34" charset="0"/>
+                  <a:cs typeface="Calibri" panose="020F0502020204030204" pitchFamily="34" charset="0"/>
+                </a:rPr>
+                <a:t>208Y</a:t>
+              </a:r>
+            </a:p>
+          </p:txBody>
+        </p:sp>
+        <p:sp>
+          <p:nvSpPr>
+            <p:cNvPr id="59" name="文本框 58">
+              <a:extLst>
+                <a:ext uri="{FF2B5EF4-FFF2-40B4-BE49-F238E27FC236}">
+                  <a16:creationId xmlns:a16="http://schemas.microsoft.com/office/drawing/2014/main" id="{0DC7CBC1-97F3-6DAC-37CD-B411B6100EED}"/>
+                </a:ext>
+              </a:extLst>
+            </p:cNvPr>
+            <p:cNvSpPr txBox="1"/>
+            <p:nvPr/>
+          </p:nvSpPr>
+          <p:spPr>
+            <a:xfrm>
+              <a:off x="2626779" y="5907070"/>
+              <a:ext cx="420532" cy="200055"/>
+            </a:xfrm>
+            <a:prstGeom prst="rect">
+              <a:avLst/>
+            </a:prstGeom>
+            <a:noFill/>
+          </p:spPr>
+          <p:txBody>
+            <a:bodyPr wrap="square" rtlCol="0">
+              <a:spAutoFit/>
+            </a:bodyPr>
+            <a:lstStyle/>
+            <a:p>
+              <a:r>
+                <a:rPr lang="en-US" sz="700" dirty="0">
+                  <a:solidFill>
+                    <a:srgbClr val="324A7A"/>
+                  </a:solidFill>
+                  <a:latin typeface="Calibri" panose="020F0502020204030204" pitchFamily="34" charset="0"/>
+                  <a:ea typeface="Calibri" panose="020F0502020204030204" pitchFamily="34" charset="0"/>
+                  <a:cs typeface="Calibri" panose="020F0502020204030204" pitchFamily="34" charset="0"/>
+                </a:rPr>
+                <a:t>212Y</a:t>
+              </a:r>
+            </a:p>
+          </p:txBody>
+        </p:sp>
+        <p:sp>
+          <p:nvSpPr>
+            <p:cNvPr id="60" name="文本框 59">
+              <a:extLst>
+                <a:ext uri="{FF2B5EF4-FFF2-40B4-BE49-F238E27FC236}">
+                  <a16:creationId xmlns:a16="http://schemas.microsoft.com/office/drawing/2014/main" id="{E84682CC-FF2B-F72B-FFF7-BE631E129A1E}"/>
+                </a:ext>
+              </a:extLst>
+            </p:cNvPr>
+            <p:cNvSpPr txBox="1"/>
+            <p:nvPr/>
+          </p:nvSpPr>
+          <p:spPr>
+            <a:xfrm>
+              <a:off x="1772061" y="5147505"/>
+              <a:ext cx="439853" cy="200055"/>
+            </a:xfrm>
+            <a:prstGeom prst="rect">
+              <a:avLst/>
+            </a:prstGeom>
+            <a:noFill/>
+          </p:spPr>
+          <p:txBody>
+            <a:bodyPr wrap="square" rtlCol="0">
+              <a:spAutoFit/>
+            </a:bodyPr>
+            <a:lstStyle/>
+            <a:p>
+              <a:r>
+                <a:rPr lang="en-US" sz="700" dirty="0">
+                  <a:solidFill>
+                    <a:srgbClr val="324A7A"/>
+                  </a:solidFill>
+                  <a:latin typeface="Calibri" panose="020F0502020204030204" pitchFamily="34" charset="0"/>
+                  <a:ea typeface="Calibri" panose="020F0502020204030204" pitchFamily="34" charset="0"/>
+                  <a:cs typeface="Calibri" panose="020F0502020204030204" pitchFamily="34" charset="0"/>
+                </a:rPr>
+                <a:t>265W</a:t>
+              </a:r>
+            </a:p>
+          </p:txBody>
+        </p:sp>
+        <p:sp>
+          <p:nvSpPr>
+            <p:cNvPr id="61" name="文本框 60">
+              <a:extLst>
+                <a:ext uri="{FF2B5EF4-FFF2-40B4-BE49-F238E27FC236}">
+                  <a16:creationId xmlns:a16="http://schemas.microsoft.com/office/drawing/2014/main" id="{BC4D7F51-2557-F6C9-90C6-E867FA0C6AE3}"/>
+                </a:ext>
+              </a:extLst>
+            </p:cNvPr>
+            <p:cNvSpPr txBox="1"/>
+            <p:nvPr/>
+          </p:nvSpPr>
+          <p:spPr>
+            <a:xfrm>
+              <a:off x="1480696" y="5479935"/>
+              <a:ext cx="398182" cy="200055"/>
+            </a:xfrm>
+            <a:prstGeom prst="rect">
+              <a:avLst/>
+            </a:prstGeom>
+            <a:noFill/>
+          </p:spPr>
+          <p:txBody>
+            <a:bodyPr wrap="square" rtlCol="0">
+              <a:spAutoFit/>
+            </a:bodyPr>
+            <a:lstStyle/>
+            <a:p>
+              <a:r>
+                <a:rPr lang="en-US" sz="700" dirty="0">
+                  <a:solidFill>
+                    <a:srgbClr val="324A7A"/>
+                  </a:solidFill>
+                  <a:latin typeface="Calibri" panose="020F0502020204030204" pitchFamily="34" charset="0"/>
+                  <a:ea typeface="Calibri" panose="020F0502020204030204" pitchFamily="34" charset="0"/>
+                  <a:cs typeface="Calibri" panose="020F0502020204030204" pitchFamily="34" charset="0"/>
+                </a:rPr>
+                <a:t>117A</a:t>
+              </a:r>
+            </a:p>
+          </p:txBody>
+        </p:sp>
+        <p:sp>
+          <p:nvSpPr>
+            <p:cNvPr id="62" name="文本框 61">
+              <a:extLst>
+                <a:ext uri="{FF2B5EF4-FFF2-40B4-BE49-F238E27FC236}">
+                  <a16:creationId xmlns:a16="http://schemas.microsoft.com/office/drawing/2014/main" id="{A71C08EB-E0A7-8B1B-C1F0-0958815B705A}"/>
+                </a:ext>
+              </a:extLst>
+            </p:cNvPr>
+            <p:cNvSpPr txBox="1"/>
+            <p:nvPr/>
+          </p:nvSpPr>
+          <p:spPr>
+            <a:xfrm>
+              <a:off x="2520373" y="5723021"/>
+              <a:ext cx="439853" cy="200055"/>
+            </a:xfrm>
+            <a:prstGeom prst="rect">
+              <a:avLst/>
+            </a:prstGeom>
+            <a:noFill/>
+          </p:spPr>
+          <p:txBody>
+            <a:bodyPr wrap="square" rtlCol="0">
+              <a:spAutoFit/>
+            </a:bodyPr>
+            <a:lstStyle/>
+            <a:p>
+              <a:r>
+                <a:rPr lang="en-US" sz="700" b="1" dirty="0">
+                  <a:solidFill>
+                    <a:schemeClr val="accent2"/>
+                  </a:solidFill>
+                  <a:latin typeface="Calibri" panose="020F0502020204030204" pitchFamily="34" charset="0"/>
+                  <a:ea typeface="Calibri" panose="020F0502020204030204" pitchFamily="34" charset="0"/>
+                  <a:cs typeface="Calibri" panose="020F0502020204030204" pitchFamily="34" charset="0"/>
+                </a:rPr>
+                <a:t>RET</a:t>
+              </a:r>
+            </a:p>
+          </p:txBody>
+        </p:sp>
+      </p:grpSp>
+      <p:grpSp>
+        <p:nvGrpSpPr>
+          <p:cNvPr id="102" name="组合 101">
+            <a:extLst>
+              <a:ext uri="{FF2B5EF4-FFF2-40B4-BE49-F238E27FC236}">
+                <a16:creationId xmlns:a16="http://schemas.microsoft.com/office/drawing/2014/main" id="{6005B6CD-A0BA-D081-80C3-85CF02902E32}"/>
+              </a:ext>
+            </a:extLst>
+          </p:cNvPr>
+          <p:cNvGrpSpPr/>
+          <p:nvPr/>
+        </p:nvGrpSpPr>
+        <p:grpSpPr>
+          <a:xfrm>
+            <a:off x="654919" y="575350"/>
+            <a:ext cx="2273345" cy="1865802"/>
+            <a:chOff x="3553300" y="5053411"/>
+            <a:chExt cx="2273345" cy="1865802"/>
+          </a:xfrm>
+        </p:grpSpPr>
+        <p:pic>
+          <p:nvPicPr>
+            <p:cNvPr id="45" name="图片 44" descr="图示&#10;&#10;AI 生成的内容可能不正确。">
+              <a:extLst>
+                <a:ext uri="{FF2B5EF4-FFF2-40B4-BE49-F238E27FC236}">
+                  <a16:creationId xmlns:a16="http://schemas.microsoft.com/office/drawing/2014/main" id="{2BD666F4-943B-09B8-783A-FB568C9D8051}"/>
+                </a:ext>
+              </a:extLst>
+            </p:cNvPr>
+            <p:cNvPicPr>
+              <a:picLocks noChangeAspect="1"/>
+            </p:cNvPicPr>
+            <p:nvPr/>
+          </p:nvPicPr>
+          <p:blipFill>
+            <a:blip r:embed="rId3">
+              <a:clrChange>
+                <a:clrFrom>
+                  <a:srgbClr val="FFFFFF"/>
+                </a:clrFrom>
+                <a:clrTo>
+                  <a:srgbClr val="FFFFFF">
+                    <a:alpha val="0"/>
+                  </a:srgbClr>
+                </a:clrTo>
+              </a:clrChange>
+              <a:extLst>
+                <a:ext uri="{28A0092B-C50C-407E-A947-70E740481C1C}">
+                  <a14:useLocalDpi xmlns:a14="http://schemas.microsoft.com/office/drawing/2010/main" val="0"/>
+                </a:ext>
+              </a:extLst>
+            </a:blip>
+            <a:stretch>
+              <a:fillRect/>
+            </a:stretch>
+          </p:blipFill>
+          <p:spPr>
+            <a:xfrm>
+              <a:off x="3553300" y="5053411"/>
+              <a:ext cx="2191460" cy="1865802"/>
+            </a:xfrm>
+            <a:prstGeom prst="rect">
+              <a:avLst/>
+            </a:prstGeom>
+          </p:spPr>
+        </p:pic>
+        <p:sp>
+          <p:nvSpPr>
+            <p:cNvPr id="63" name="文本框 62">
+              <a:extLst>
+                <a:ext uri="{FF2B5EF4-FFF2-40B4-BE49-F238E27FC236}">
+                  <a16:creationId xmlns:a16="http://schemas.microsoft.com/office/drawing/2014/main" id="{5E2A1DD8-85C9-B0B7-0EE7-D7C5E042A29B}"/>
+                </a:ext>
+              </a:extLst>
+            </p:cNvPr>
+            <p:cNvSpPr txBox="1"/>
+            <p:nvPr/>
+          </p:nvSpPr>
+          <p:spPr>
+            <a:xfrm>
+              <a:off x="3750618" y="5533080"/>
+              <a:ext cx="398182" cy="200055"/>
+            </a:xfrm>
+            <a:prstGeom prst="rect">
+              <a:avLst/>
+            </a:prstGeom>
+            <a:noFill/>
+          </p:spPr>
+          <p:txBody>
+            <a:bodyPr wrap="square" rtlCol="0">
+              <a:spAutoFit/>
+            </a:bodyPr>
+            <a:lstStyle/>
+            <a:p>
+              <a:r>
+                <a:rPr lang="en-US" sz="700" dirty="0">
+                  <a:solidFill>
+                    <a:srgbClr val="324A7A"/>
+                  </a:solidFill>
+                  <a:latin typeface="Calibri" panose="020F0502020204030204" pitchFamily="34" charset="0"/>
+                  <a:ea typeface="Calibri" panose="020F0502020204030204" pitchFamily="34" charset="0"/>
+                  <a:cs typeface="Calibri" panose="020F0502020204030204" pitchFamily="34" charset="0"/>
+                </a:rPr>
+                <a:t>296</a:t>
+              </a:r>
+              <a:r>
+                <a:rPr lang="en-US" altLang="zh-CN" sz="700" dirty="0">
+                  <a:solidFill>
+                    <a:srgbClr val="324A7A"/>
+                  </a:solidFill>
+                  <a:latin typeface="Calibri" panose="020F0502020204030204" pitchFamily="34" charset="0"/>
+                  <a:ea typeface="Calibri" panose="020F0502020204030204" pitchFamily="34" charset="0"/>
+                  <a:cs typeface="Calibri" panose="020F0502020204030204" pitchFamily="34" charset="0"/>
+                </a:rPr>
+                <a:t>K</a:t>
+              </a:r>
+              <a:endParaRPr lang="en-US" sz="700" dirty="0">
+                <a:solidFill>
+                  <a:srgbClr val="324A7A"/>
+                </a:solidFill>
                 <a:latin typeface="Calibri" panose="020F0502020204030204" pitchFamily="34" charset="0"/>
                 <a:ea typeface="Calibri" panose="020F0502020204030204" pitchFamily="34" charset="0"/>
                 <a:cs typeface="Calibri" panose="020F0502020204030204" pitchFamily="34" charset="0"/>
-              </a:rPr>
-              <a:t>AF3</a:t>
-            </a:r>
-            <a:r>
-              <a:rPr lang="en-US" altLang="zh-CN" sz="800" b="1" i="1" u="none" strike="noStrike" dirty="0">
+              </a:endParaRPr>
+            </a:p>
+          </p:txBody>
+        </p:sp>
+        <p:sp>
+          <p:nvSpPr>
+            <p:cNvPr id="64" name="文本框 63">
+              <a:extLst>
+                <a:ext uri="{FF2B5EF4-FFF2-40B4-BE49-F238E27FC236}">
+                  <a16:creationId xmlns:a16="http://schemas.microsoft.com/office/drawing/2014/main" id="{D1C16E41-4348-B6BB-4794-DD00438FDD30}"/>
+                </a:ext>
+              </a:extLst>
+            </p:cNvPr>
+            <p:cNvSpPr txBox="1"/>
+            <p:nvPr/>
+          </p:nvSpPr>
+          <p:spPr>
+            <a:xfrm>
+              <a:off x="3611828" y="5886284"/>
+              <a:ext cx="398182" cy="200055"/>
+            </a:xfrm>
+            <a:prstGeom prst="rect">
+              <a:avLst/>
+            </a:prstGeom>
+            <a:noFill/>
+          </p:spPr>
+          <p:txBody>
+            <a:bodyPr wrap="square" rtlCol="0">
+              <a:spAutoFit/>
+            </a:bodyPr>
+            <a:lstStyle/>
+            <a:p>
+              <a:r>
+                <a:rPr lang="en-US" sz="700" dirty="0">
+                  <a:solidFill>
+                    <a:srgbClr val="324A7A"/>
+                  </a:solidFill>
+                  <a:latin typeface="Calibri" panose="020F0502020204030204" pitchFamily="34" charset="0"/>
+                  <a:ea typeface="Calibri" panose="020F0502020204030204" pitchFamily="34" charset="0"/>
+                  <a:cs typeface="Calibri" panose="020F0502020204030204" pitchFamily="34" charset="0"/>
+                </a:rPr>
+                <a:t>113E</a:t>
+              </a:r>
+            </a:p>
+          </p:txBody>
+        </p:sp>
+        <p:sp>
+          <p:nvSpPr>
+            <p:cNvPr id="65" name="文本框 64">
+              <a:extLst>
+                <a:ext uri="{FF2B5EF4-FFF2-40B4-BE49-F238E27FC236}">
+                  <a16:creationId xmlns:a16="http://schemas.microsoft.com/office/drawing/2014/main" id="{5C7CBAEF-D586-7B27-C6BB-0835264FE90C}"/>
+                </a:ext>
+              </a:extLst>
+            </p:cNvPr>
+            <p:cNvSpPr txBox="1"/>
+            <p:nvPr/>
+          </p:nvSpPr>
+          <p:spPr>
+            <a:xfrm>
+              <a:off x="3750618" y="6456599"/>
+              <a:ext cx="398182" cy="200055"/>
+            </a:xfrm>
+            <a:prstGeom prst="rect">
+              <a:avLst/>
+            </a:prstGeom>
+            <a:noFill/>
+          </p:spPr>
+          <p:txBody>
+            <a:bodyPr wrap="square" rtlCol="0">
+              <a:spAutoFit/>
+            </a:bodyPr>
+            <a:lstStyle/>
+            <a:p>
+              <a:r>
+                <a:rPr lang="en-US" sz="700" dirty="0">
+                  <a:solidFill>
+                    <a:srgbClr val="324A7A"/>
+                  </a:solidFill>
+                  <a:latin typeface="Calibri" panose="020F0502020204030204" pitchFamily="34" charset="0"/>
+                  <a:ea typeface="Calibri" panose="020F0502020204030204" pitchFamily="34" charset="0"/>
+                  <a:cs typeface="Calibri" panose="020F0502020204030204" pitchFamily="34" charset="0"/>
+                </a:rPr>
+                <a:t>187C</a:t>
+              </a:r>
+            </a:p>
+          </p:txBody>
+        </p:sp>
+        <p:sp>
+          <p:nvSpPr>
+            <p:cNvPr id="66" name="文本框 65">
+              <a:extLst>
+                <a:ext uri="{FF2B5EF4-FFF2-40B4-BE49-F238E27FC236}">
+                  <a16:creationId xmlns:a16="http://schemas.microsoft.com/office/drawing/2014/main" id="{9BB13B55-8302-E2AB-9B36-DDF8C49B6D10}"/>
+                </a:ext>
+              </a:extLst>
+            </p:cNvPr>
+            <p:cNvSpPr txBox="1"/>
+            <p:nvPr/>
+          </p:nvSpPr>
+          <p:spPr>
+            <a:xfrm>
+              <a:off x="4250848" y="6523144"/>
+              <a:ext cx="398182" cy="200055"/>
+            </a:xfrm>
+            <a:prstGeom prst="rect">
+              <a:avLst/>
+            </a:prstGeom>
+            <a:noFill/>
+          </p:spPr>
+          <p:txBody>
+            <a:bodyPr wrap="square" rtlCol="0">
+              <a:spAutoFit/>
+            </a:bodyPr>
+            <a:lstStyle/>
+            <a:p>
+              <a:r>
+                <a:rPr lang="en-US" sz="700" dirty="0">
+                  <a:solidFill>
+                    <a:srgbClr val="324A7A"/>
+                  </a:solidFill>
+                  <a:latin typeface="Calibri" panose="020F0502020204030204" pitchFamily="34" charset="0"/>
+                  <a:ea typeface="Calibri" panose="020F0502020204030204" pitchFamily="34" charset="0"/>
+                  <a:cs typeface="Calibri" panose="020F0502020204030204" pitchFamily="34" charset="0"/>
+                </a:rPr>
+                <a:t>188G</a:t>
+              </a:r>
+            </a:p>
+          </p:txBody>
+        </p:sp>
+        <p:sp>
+          <p:nvSpPr>
+            <p:cNvPr id="67" name="文本框 66">
+              <a:extLst>
+                <a:ext uri="{FF2B5EF4-FFF2-40B4-BE49-F238E27FC236}">
+                  <a16:creationId xmlns:a16="http://schemas.microsoft.com/office/drawing/2014/main" id="{A6AC247D-2F9C-B8A8-DA09-DA5605941403}"/>
+                </a:ext>
+              </a:extLst>
+            </p:cNvPr>
+            <p:cNvSpPr txBox="1"/>
+            <p:nvPr/>
+          </p:nvSpPr>
+          <p:spPr>
+            <a:xfrm>
+              <a:off x="4650431" y="6540259"/>
+              <a:ext cx="398182" cy="200055"/>
+            </a:xfrm>
+            <a:prstGeom prst="rect">
+              <a:avLst/>
+            </a:prstGeom>
+            <a:noFill/>
+          </p:spPr>
+          <p:txBody>
+            <a:bodyPr wrap="square" rtlCol="0">
+              <a:spAutoFit/>
+            </a:bodyPr>
+            <a:lstStyle/>
+            <a:p>
+              <a:r>
+                <a:rPr lang="en-US" sz="700" dirty="0">
+                  <a:solidFill>
+                    <a:srgbClr val="324A7A"/>
+                  </a:solidFill>
+                  <a:latin typeface="Calibri" panose="020F0502020204030204" pitchFamily="34" charset="0"/>
+                  <a:ea typeface="Calibri" panose="020F0502020204030204" pitchFamily="34" charset="0"/>
+                  <a:cs typeface="Calibri" panose="020F0502020204030204" pitchFamily="34" charset="0"/>
+                </a:rPr>
+                <a:t>189I</a:t>
+              </a:r>
+            </a:p>
+          </p:txBody>
+        </p:sp>
+        <p:sp>
+          <p:nvSpPr>
+            <p:cNvPr id="68" name="文本框 67">
+              <a:extLst>
+                <a:ext uri="{FF2B5EF4-FFF2-40B4-BE49-F238E27FC236}">
+                  <a16:creationId xmlns:a16="http://schemas.microsoft.com/office/drawing/2014/main" id="{92029F6C-81B9-E9C8-3E98-6866EBBB40FD}"/>
+                </a:ext>
+              </a:extLst>
+            </p:cNvPr>
+            <p:cNvSpPr txBox="1"/>
+            <p:nvPr/>
+          </p:nvSpPr>
+          <p:spPr>
+            <a:xfrm>
+              <a:off x="5386792" y="6340204"/>
+              <a:ext cx="398182" cy="200055"/>
+            </a:xfrm>
+            <a:prstGeom prst="rect">
+              <a:avLst/>
+            </a:prstGeom>
+            <a:noFill/>
+          </p:spPr>
+          <p:txBody>
+            <a:bodyPr wrap="square" rtlCol="0">
+              <a:spAutoFit/>
+            </a:bodyPr>
+            <a:lstStyle/>
+            <a:p>
+              <a:r>
+                <a:rPr lang="en-US" sz="700" dirty="0">
+                  <a:solidFill>
+                    <a:srgbClr val="324A7A"/>
+                  </a:solidFill>
+                  <a:latin typeface="Calibri" panose="020F0502020204030204" pitchFamily="34" charset="0"/>
+                  <a:ea typeface="Calibri" panose="020F0502020204030204" pitchFamily="34" charset="0"/>
+                  <a:cs typeface="Calibri" panose="020F0502020204030204" pitchFamily="34" charset="0"/>
+                </a:rPr>
+                <a:t>191Y</a:t>
+              </a:r>
+            </a:p>
+          </p:txBody>
+        </p:sp>
+        <p:sp>
+          <p:nvSpPr>
+            <p:cNvPr id="73" name="文本框 72">
+              <a:extLst>
+                <a:ext uri="{FF2B5EF4-FFF2-40B4-BE49-F238E27FC236}">
+                  <a16:creationId xmlns:a16="http://schemas.microsoft.com/office/drawing/2014/main" id="{ABDEBC52-F0CE-FF9B-A899-D12CEA432441}"/>
+                </a:ext>
+              </a:extLst>
+            </p:cNvPr>
+            <p:cNvSpPr txBox="1"/>
+            <p:nvPr/>
+          </p:nvSpPr>
+          <p:spPr>
+            <a:xfrm>
+              <a:off x="4472415" y="5664632"/>
+              <a:ext cx="398182" cy="200055"/>
+            </a:xfrm>
+            <a:prstGeom prst="rect">
+              <a:avLst/>
+            </a:prstGeom>
+            <a:noFill/>
+          </p:spPr>
+          <p:txBody>
+            <a:bodyPr wrap="square" rtlCol="0">
+              <a:spAutoFit/>
+            </a:bodyPr>
+            <a:lstStyle/>
+            <a:p>
+              <a:r>
+                <a:rPr lang="en-US" sz="700" dirty="0">
+                  <a:solidFill>
+                    <a:srgbClr val="324A7A"/>
+                  </a:solidFill>
+                  <a:latin typeface="Calibri" panose="020F0502020204030204" pitchFamily="34" charset="0"/>
+                  <a:ea typeface="Calibri" panose="020F0502020204030204" pitchFamily="34" charset="0"/>
+                  <a:cs typeface="Calibri" panose="020F0502020204030204" pitchFamily="34" charset="0"/>
+                </a:rPr>
+                <a:t>268Y</a:t>
+              </a:r>
+            </a:p>
+          </p:txBody>
+        </p:sp>
+        <p:sp>
+          <p:nvSpPr>
+            <p:cNvPr id="74" name="文本框 73">
+              <a:extLst>
+                <a:ext uri="{FF2B5EF4-FFF2-40B4-BE49-F238E27FC236}">
+                  <a16:creationId xmlns:a16="http://schemas.microsoft.com/office/drawing/2014/main" id="{F3C66141-EC71-985C-2FB8-4A576D4B777E}"/>
+                </a:ext>
+              </a:extLst>
+            </p:cNvPr>
+            <p:cNvSpPr txBox="1"/>
+            <p:nvPr/>
+          </p:nvSpPr>
+          <p:spPr>
+            <a:xfrm>
+              <a:off x="4823782" y="5247532"/>
+              <a:ext cx="398182" cy="200055"/>
+            </a:xfrm>
+            <a:prstGeom prst="rect">
+              <a:avLst/>
+            </a:prstGeom>
+            <a:noFill/>
+          </p:spPr>
+          <p:txBody>
+            <a:bodyPr wrap="square" rtlCol="0">
+              <a:spAutoFit/>
+            </a:bodyPr>
+            <a:lstStyle/>
+            <a:p>
+              <a:r>
+                <a:rPr lang="en-US" sz="700" dirty="0">
+                  <a:solidFill>
+                    <a:srgbClr val="324A7A"/>
+                  </a:solidFill>
+                  <a:latin typeface="Calibri" panose="020F0502020204030204" pitchFamily="34" charset="0"/>
+                  <a:ea typeface="Calibri" panose="020F0502020204030204" pitchFamily="34" charset="0"/>
+                  <a:cs typeface="Calibri" panose="020F0502020204030204" pitchFamily="34" charset="0"/>
+                </a:rPr>
+                <a:t>265</a:t>
+              </a:r>
+              <a:r>
+                <a:rPr lang="en-US" altLang="zh-CN" sz="700" dirty="0">
+                  <a:solidFill>
+                    <a:srgbClr val="324A7A"/>
+                  </a:solidFill>
+                  <a:latin typeface="Calibri" panose="020F0502020204030204" pitchFamily="34" charset="0"/>
+                  <a:ea typeface="Calibri" panose="020F0502020204030204" pitchFamily="34" charset="0"/>
+                  <a:cs typeface="Calibri" panose="020F0502020204030204" pitchFamily="34" charset="0"/>
+                </a:rPr>
+                <a:t>W</a:t>
+              </a:r>
+              <a:endParaRPr lang="en-US" sz="700" dirty="0">
+                <a:solidFill>
+                  <a:srgbClr val="324A7A"/>
+                </a:solidFill>
                 <a:latin typeface="Calibri" panose="020F0502020204030204" pitchFamily="34" charset="0"/>
                 <a:ea typeface="Calibri" panose="020F0502020204030204" pitchFamily="34" charset="0"/>
                 <a:cs typeface="Calibri" panose="020F0502020204030204" pitchFamily="34" charset="0"/>
-              </a:rPr>
-              <a:t> vs</a:t>
-            </a:r>
-            <a:r>
-              <a:rPr lang="en-US" altLang="zh-CN" sz="800" b="1" u="none" strike="noStrike" dirty="0">
+              </a:endParaRPr>
+            </a:p>
+          </p:txBody>
+        </p:sp>
+        <p:sp>
+          <p:nvSpPr>
+            <p:cNvPr id="75" name="文本框 74">
+              <a:extLst>
+                <a:ext uri="{FF2B5EF4-FFF2-40B4-BE49-F238E27FC236}">
+                  <a16:creationId xmlns:a16="http://schemas.microsoft.com/office/drawing/2014/main" id="{DFD565FD-5E0C-2858-A4CB-E25086FE19BF}"/>
+                </a:ext>
+              </a:extLst>
+            </p:cNvPr>
+            <p:cNvSpPr txBox="1"/>
+            <p:nvPr/>
+          </p:nvSpPr>
+          <p:spPr>
+            <a:xfrm>
+              <a:off x="5386792" y="6086339"/>
+              <a:ext cx="439853" cy="200055"/>
+            </a:xfrm>
+            <a:prstGeom prst="rect">
+              <a:avLst/>
+            </a:prstGeom>
+            <a:noFill/>
+          </p:spPr>
+          <p:txBody>
+            <a:bodyPr wrap="square" rtlCol="0">
+              <a:spAutoFit/>
+            </a:bodyPr>
+            <a:lstStyle/>
+            <a:p>
+              <a:r>
+                <a:rPr lang="en-US" sz="700" b="1" dirty="0">
+                  <a:solidFill>
+                    <a:schemeClr val="accent2"/>
+                  </a:solidFill>
+                  <a:latin typeface="Calibri" panose="020F0502020204030204" pitchFamily="34" charset="0"/>
+                  <a:ea typeface="Calibri" panose="020F0502020204030204" pitchFamily="34" charset="0"/>
+                  <a:cs typeface="Calibri" panose="020F0502020204030204" pitchFamily="34" charset="0"/>
+                </a:rPr>
+                <a:t>RET</a:t>
+              </a:r>
+            </a:p>
+          </p:txBody>
+        </p:sp>
+      </p:grpSp>
+      <p:grpSp>
+        <p:nvGrpSpPr>
+          <p:cNvPr id="101" name="组合 100">
+            <a:extLst>
+              <a:ext uri="{FF2B5EF4-FFF2-40B4-BE49-F238E27FC236}">
+                <a16:creationId xmlns:a16="http://schemas.microsoft.com/office/drawing/2014/main" id="{FFF42066-6FB7-4FED-2B27-29C8795DB99B}"/>
+              </a:ext>
+            </a:extLst>
+          </p:cNvPr>
+          <p:cNvGrpSpPr/>
+          <p:nvPr/>
+        </p:nvGrpSpPr>
+        <p:grpSpPr>
+          <a:xfrm>
+            <a:off x="636270" y="2412778"/>
+            <a:ext cx="2526298" cy="2043053"/>
+            <a:chOff x="3534651" y="6723199"/>
+            <a:chExt cx="2526298" cy="2043053"/>
+          </a:xfrm>
+        </p:grpSpPr>
+        <p:pic>
+          <p:nvPicPr>
+            <p:cNvPr id="48" name="图片 47" descr="图示&#10;&#10;AI 生成的内容可能不正确。">
+              <a:extLst>
+                <a:ext uri="{FF2B5EF4-FFF2-40B4-BE49-F238E27FC236}">
+                  <a16:creationId xmlns:a16="http://schemas.microsoft.com/office/drawing/2014/main" id="{7659C210-7EF7-29E2-3317-9790D10ACF05}"/>
+                </a:ext>
+              </a:extLst>
+            </p:cNvPr>
+            <p:cNvPicPr>
+              <a:picLocks noChangeAspect="1"/>
+            </p:cNvPicPr>
+            <p:nvPr/>
+          </p:nvPicPr>
+          <p:blipFill>
+            <a:blip r:embed="rId4">
+              <a:clrChange>
+                <a:clrFrom>
+                  <a:srgbClr val="FFFFFF"/>
+                </a:clrFrom>
+                <a:clrTo>
+                  <a:srgbClr val="FFFFFF">
+                    <a:alpha val="0"/>
+                  </a:srgbClr>
+                </a:clrTo>
+              </a:clrChange>
+              <a:extLst>
+                <a:ext uri="{28A0092B-C50C-407E-A947-70E740481C1C}">
+                  <a14:useLocalDpi xmlns:a14="http://schemas.microsoft.com/office/drawing/2010/main" val="0"/>
+                </a:ext>
+              </a:extLst>
+            </a:blip>
+            <a:stretch>
+              <a:fillRect/>
+            </a:stretch>
+          </p:blipFill>
+          <p:spPr>
+            <a:xfrm>
+              <a:off x="3534651" y="6723199"/>
+              <a:ext cx="2526298" cy="2043053"/>
+            </a:xfrm>
+            <a:prstGeom prst="rect">
+              <a:avLst/>
+            </a:prstGeom>
+          </p:spPr>
+        </p:pic>
+        <p:sp>
+          <p:nvSpPr>
+            <p:cNvPr id="78" name="文本框 77">
+              <a:extLst>
+                <a:ext uri="{FF2B5EF4-FFF2-40B4-BE49-F238E27FC236}">
+                  <a16:creationId xmlns:a16="http://schemas.microsoft.com/office/drawing/2014/main" id="{4A4822ED-1EDB-3F77-9841-2C6F38EF011D}"/>
+                </a:ext>
+              </a:extLst>
+            </p:cNvPr>
+            <p:cNvSpPr txBox="1"/>
+            <p:nvPr/>
+          </p:nvSpPr>
+          <p:spPr>
+            <a:xfrm>
+              <a:off x="5303380" y="7672593"/>
+              <a:ext cx="439853" cy="200055"/>
+            </a:xfrm>
+            <a:prstGeom prst="rect">
+              <a:avLst/>
+            </a:prstGeom>
+            <a:noFill/>
+          </p:spPr>
+          <p:txBody>
+            <a:bodyPr wrap="square" rtlCol="0">
+              <a:spAutoFit/>
+            </a:bodyPr>
+            <a:lstStyle/>
+            <a:p>
+              <a:r>
+                <a:rPr lang="en-US" sz="700" b="1" dirty="0">
+                  <a:solidFill>
+                    <a:srgbClr val="49C3C4"/>
+                  </a:solidFill>
+                  <a:latin typeface="Calibri" panose="020F0502020204030204" pitchFamily="34" charset="0"/>
+                  <a:ea typeface="Calibri" panose="020F0502020204030204" pitchFamily="34" charset="0"/>
+                  <a:cs typeface="Calibri" panose="020F0502020204030204" pitchFamily="34" charset="0"/>
+                </a:rPr>
+                <a:t>RET</a:t>
+              </a:r>
+            </a:p>
+          </p:txBody>
+        </p:sp>
+        <p:sp>
+          <p:nvSpPr>
+            <p:cNvPr id="88" name="文本框 87">
+              <a:extLst>
+                <a:ext uri="{FF2B5EF4-FFF2-40B4-BE49-F238E27FC236}">
+                  <a16:creationId xmlns:a16="http://schemas.microsoft.com/office/drawing/2014/main" id="{822173D4-1CB6-88D0-4183-70B5E65EF152}"/>
+                </a:ext>
+              </a:extLst>
+            </p:cNvPr>
+            <p:cNvSpPr txBox="1"/>
+            <p:nvPr/>
+          </p:nvSpPr>
+          <p:spPr>
+            <a:xfrm>
+              <a:off x="3584453" y="7583223"/>
+              <a:ext cx="398182" cy="200055"/>
+            </a:xfrm>
+            <a:prstGeom prst="rect">
+              <a:avLst/>
+            </a:prstGeom>
+            <a:noFill/>
+          </p:spPr>
+          <p:txBody>
+            <a:bodyPr wrap="square" rtlCol="0">
+              <a:spAutoFit/>
+            </a:bodyPr>
+            <a:lstStyle/>
+            <a:p>
+              <a:r>
+                <a:rPr lang="en-US" sz="700" dirty="0">
+                  <a:solidFill>
+                    <a:srgbClr val="B4B000"/>
+                  </a:solidFill>
+                  <a:latin typeface="Calibri" panose="020F0502020204030204" pitchFamily="34" charset="0"/>
+                  <a:ea typeface="Calibri" panose="020F0502020204030204" pitchFamily="34" charset="0"/>
+                  <a:cs typeface="Calibri" panose="020F0502020204030204" pitchFamily="34" charset="0"/>
+                </a:rPr>
+                <a:t>117A</a:t>
+              </a:r>
+            </a:p>
+          </p:txBody>
+        </p:sp>
+        <p:sp>
+          <p:nvSpPr>
+            <p:cNvPr id="89" name="文本框 88">
+              <a:extLst>
+                <a:ext uri="{FF2B5EF4-FFF2-40B4-BE49-F238E27FC236}">
+                  <a16:creationId xmlns:a16="http://schemas.microsoft.com/office/drawing/2014/main" id="{4499F72B-5CE0-FE59-AC03-A2557D6B0706}"/>
+                </a:ext>
+              </a:extLst>
+            </p:cNvPr>
+            <p:cNvSpPr txBox="1"/>
+            <p:nvPr/>
+          </p:nvSpPr>
+          <p:spPr>
+            <a:xfrm>
+              <a:off x="3667719" y="8275373"/>
+              <a:ext cx="398182" cy="200055"/>
+            </a:xfrm>
+            <a:prstGeom prst="rect">
+              <a:avLst/>
+            </a:prstGeom>
+            <a:noFill/>
+          </p:spPr>
+          <p:txBody>
+            <a:bodyPr wrap="square" rtlCol="0">
+              <a:spAutoFit/>
+            </a:bodyPr>
+            <a:lstStyle/>
+            <a:p>
+              <a:r>
+                <a:rPr lang="en-US" sz="700" dirty="0">
+                  <a:solidFill>
+                    <a:srgbClr val="B4B000"/>
+                  </a:solidFill>
+                  <a:latin typeface="Calibri" panose="020F0502020204030204" pitchFamily="34" charset="0"/>
+                  <a:ea typeface="Calibri" panose="020F0502020204030204" pitchFamily="34" charset="0"/>
+                  <a:cs typeface="Calibri" panose="020F0502020204030204" pitchFamily="34" charset="0"/>
+                </a:rPr>
+                <a:t>181</a:t>
+              </a:r>
+              <a:r>
+                <a:rPr lang="en-US" altLang="zh-CN" sz="700" dirty="0">
+                  <a:solidFill>
+                    <a:srgbClr val="B4B000"/>
+                  </a:solidFill>
+                  <a:latin typeface="Calibri" panose="020F0502020204030204" pitchFamily="34" charset="0"/>
+                  <a:ea typeface="Calibri" panose="020F0502020204030204" pitchFamily="34" charset="0"/>
+                  <a:cs typeface="Calibri" panose="020F0502020204030204" pitchFamily="34" charset="0"/>
+                </a:rPr>
+                <a:t>E</a:t>
+              </a:r>
+              <a:endParaRPr lang="en-US" sz="700" dirty="0">
+                <a:solidFill>
+                  <a:srgbClr val="B4B000"/>
+                </a:solidFill>
                 <a:latin typeface="Calibri" panose="020F0502020204030204" pitchFamily="34" charset="0"/>
                 <a:ea typeface="Calibri" panose="020F0502020204030204" pitchFamily="34" charset="0"/>
                 <a:cs typeface="Calibri" panose="020F0502020204030204" pitchFamily="34" charset="0"/>
-              </a:rPr>
-              <a:t> OPN2</a:t>
-            </a:r>
-            <a:r>
-              <a:rPr lang="en-US" altLang="zh-CN" sz="800" b="1" u="none" strike="noStrike" baseline="30000" dirty="0">
+              </a:endParaRPr>
+            </a:p>
+          </p:txBody>
+        </p:sp>
+        <p:sp>
+          <p:nvSpPr>
+            <p:cNvPr id="90" name="文本框 89">
+              <a:extLst>
+                <a:ext uri="{FF2B5EF4-FFF2-40B4-BE49-F238E27FC236}">
+                  <a16:creationId xmlns:a16="http://schemas.microsoft.com/office/drawing/2014/main" id="{0785C058-1390-F7DD-4E59-F7092C9C7880}"/>
+                </a:ext>
+              </a:extLst>
+            </p:cNvPr>
+            <p:cNvSpPr txBox="1"/>
+            <p:nvPr/>
+          </p:nvSpPr>
+          <p:spPr>
+            <a:xfrm>
+              <a:off x="3796358" y="8057331"/>
+              <a:ext cx="398182" cy="200055"/>
+            </a:xfrm>
+            <a:prstGeom prst="rect">
+              <a:avLst/>
+            </a:prstGeom>
+            <a:noFill/>
+          </p:spPr>
+          <p:txBody>
+            <a:bodyPr wrap="square" rtlCol="0">
+              <a:spAutoFit/>
+            </a:bodyPr>
+            <a:lstStyle/>
+            <a:p>
+              <a:r>
+                <a:rPr lang="en-US" sz="700" dirty="0">
+                  <a:solidFill>
+                    <a:srgbClr val="B4B000"/>
+                  </a:solidFill>
+                  <a:latin typeface="Calibri" panose="020F0502020204030204" pitchFamily="34" charset="0"/>
+                  <a:ea typeface="Calibri" panose="020F0502020204030204" pitchFamily="34" charset="0"/>
+                  <a:cs typeface="Calibri" panose="020F0502020204030204" pitchFamily="34" charset="0"/>
+                </a:rPr>
+                <a:t>187C</a:t>
+              </a:r>
+            </a:p>
+          </p:txBody>
+        </p:sp>
+        <p:sp>
+          <p:nvSpPr>
+            <p:cNvPr id="91" name="文本框 90">
+              <a:extLst>
+                <a:ext uri="{FF2B5EF4-FFF2-40B4-BE49-F238E27FC236}">
+                  <a16:creationId xmlns:a16="http://schemas.microsoft.com/office/drawing/2014/main" id="{AD7B2D2E-62B8-4BAF-C749-6CB60D3B60F0}"/>
+                </a:ext>
+              </a:extLst>
+            </p:cNvPr>
+            <p:cNvSpPr txBox="1"/>
+            <p:nvPr/>
+          </p:nvSpPr>
+          <p:spPr>
+            <a:xfrm>
+              <a:off x="4304357" y="8044627"/>
+              <a:ext cx="398182" cy="200055"/>
+            </a:xfrm>
+            <a:prstGeom prst="rect">
+              <a:avLst/>
+            </a:prstGeom>
+            <a:noFill/>
+          </p:spPr>
+          <p:txBody>
+            <a:bodyPr wrap="square" rtlCol="0">
+              <a:spAutoFit/>
+            </a:bodyPr>
+            <a:lstStyle/>
+            <a:p>
+              <a:r>
+                <a:rPr lang="en-US" sz="700" dirty="0">
+                  <a:solidFill>
+                    <a:srgbClr val="B4B000"/>
+                  </a:solidFill>
+                  <a:latin typeface="Calibri" panose="020F0502020204030204" pitchFamily="34" charset="0"/>
+                  <a:ea typeface="Calibri" panose="020F0502020204030204" pitchFamily="34" charset="0"/>
+                  <a:cs typeface="Calibri" panose="020F0502020204030204" pitchFamily="34" charset="0"/>
+                </a:rPr>
+                <a:t>188G</a:t>
+              </a:r>
+            </a:p>
+          </p:txBody>
+        </p:sp>
+        <p:sp>
+          <p:nvSpPr>
+            <p:cNvPr id="92" name="文本框 91">
+              <a:extLst>
+                <a:ext uri="{FF2B5EF4-FFF2-40B4-BE49-F238E27FC236}">
+                  <a16:creationId xmlns:a16="http://schemas.microsoft.com/office/drawing/2014/main" id="{45D3D784-4FAD-6223-BAD6-86EDB1A7BC21}"/>
+                </a:ext>
+              </a:extLst>
+            </p:cNvPr>
+            <p:cNvSpPr txBox="1"/>
+            <p:nvPr/>
+          </p:nvSpPr>
+          <p:spPr>
+            <a:xfrm>
+              <a:off x="4689662" y="7867884"/>
+              <a:ext cx="398182" cy="200055"/>
+            </a:xfrm>
+            <a:prstGeom prst="rect">
+              <a:avLst/>
+            </a:prstGeom>
+            <a:noFill/>
+          </p:spPr>
+          <p:txBody>
+            <a:bodyPr wrap="square" rtlCol="0">
+              <a:spAutoFit/>
+            </a:bodyPr>
+            <a:lstStyle/>
+            <a:p>
+              <a:r>
+                <a:rPr lang="en-US" sz="700" dirty="0">
+                  <a:solidFill>
+                    <a:srgbClr val="B4B000"/>
+                  </a:solidFill>
+                  <a:latin typeface="Calibri" panose="020F0502020204030204" pitchFamily="34" charset="0"/>
+                  <a:ea typeface="Calibri" panose="020F0502020204030204" pitchFamily="34" charset="0"/>
+                  <a:cs typeface="Calibri" panose="020F0502020204030204" pitchFamily="34" charset="0"/>
+                </a:rPr>
+                <a:t>189I</a:t>
+              </a:r>
+            </a:p>
+          </p:txBody>
+        </p:sp>
+        <p:sp>
+          <p:nvSpPr>
+            <p:cNvPr id="93" name="文本框 92">
+              <a:extLst>
+                <a:ext uri="{FF2B5EF4-FFF2-40B4-BE49-F238E27FC236}">
+                  <a16:creationId xmlns:a16="http://schemas.microsoft.com/office/drawing/2014/main" id="{68D4FEA7-8AE7-3FB8-9FC9-80E7CBE6774D}"/>
+                </a:ext>
+              </a:extLst>
+            </p:cNvPr>
+            <p:cNvSpPr txBox="1"/>
+            <p:nvPr/>
+          </p:nvSpPr>
+          <p:spPr>
+            <a:xfrm>
+              <a:off x="5208536" y="8094797"/>
+              <a:ext cx="398182" cy="200055"/>
+            </a:xfrm>
+            <a:prstGeom prst="rect">
+              <a:avLst/>
+            </a:prstGeom>
+            <a:noFill/>
+          </p:spPr>
+          <p:txBody>
+            <a:bodyPr wrap="square" rtlCol="0">
+              <a:spAutoFit/>
+            </a:bodyPr>
+            <a:lstStyle/>
+            <a:p>
+              <a:r>
+                <a:rPr lang="en-US" sz="700" dirty="0">
+                  <a:solidFill>
+                    <a:srgbClr val="B4B000"/>
+                  </a:solidFill>
+                  <a:latin typeface="Calibri" panose="020F0502020204030204" pitchFamily="34" charset="0"/>
+                  <a:ea typeface="Calibri" panose="020F0502020204030204" pitchFamily="34" charset="0"/>
+                  <a:cs typeface="Calibri" panose="020F0502020204030204" pitchFamily="34" charset="0"/>
+                </a:rPr>
+                <a:t>191Y</a:t>
+              </a:r>
+            </a:p>
+          </p:txBody>
+        </p:sp>
+        <p:sp>
+          <p:nvSpPr>
+            <p:cNvPr id="95" name="文本框 94">
+              <a:extLst>
+                <a:ext uri="{FF2B5EF4-FFF2-40B4-BE49-F238E27FC236}">
+                  <a16:creationId xmlns:a16="http://schemas.microsoft.com/office/drawing/2014/main" id="{F175F493-7861-DC99-BBFA-143CA1E46EB3}"/>
+                </a:ext>
+              </a:extLst>
+            </p:cNvPr>
+            <p:cNvSpPr txBox="1"/>
+            <p:nvPr/>
+          </p:nvSpPr>
+          <p:spPr>
+            <a:xfrm>
+              <a:off x="5606718" y="7421330"/>
+              <a:ext cx="398182" cy="200055"/>
+            </a:xfrm>
+            <a:prstGeom prst="rect">
+              <a:avLst/>
+            </a:prstGeom>
+            <a:noFill/>
+          </p:spPr>
+          <p:txBody>
+            <a:bodyPr wrap="square" rtlCol="0">
+              <a:spAutoFit/>
+            </a:bodyPr>
+            <a:lstStyle/>
+            <a:p>
+              <a:r>
+                <a:rPr lang="en-US" sz="700" dirty="0">
+                  <a:solidFill>
+                    <a:srgbClr val="B4B000"/>
+                  </a:solidFill>
+                  <a:latin typeface="Calibri" panose="020F0502020204030204" pitchFamily="34" charset="0"/>
+                  <a:ea typeface="Calibri" panose="020F0502020204030204" pitchFamily="34" charset="0"/>
+                  <a:cs typeface="Calibri" panose="020F0502020204030204" pitchFamily="34" charset="0"/>
+                </a:rPr>
+                <a:t>207M</a:t>
+              </a:r>
+            </a:p>
+          </p:txBody>
+        </p:sp>
+        <p:sp>
+          <p:nvSpPr>
+            <p:cNvPr id="96" name="文本框 95">
+              <a:extLst>
+                <a:ext uri="{FF2B5EF4-FFF2-40B4-BE49-F238E27FC236}">
+                  <a16:creationId xmlns:a16="http://schemas.microsoft.com/office/drawing/2014/main" id="{F812F78B-B637-00DD-2432-A1531985824B}"/>
+                </a:ext>
+              </a:extLst>
+            </p:cNvPr>
+            <p:cNvSpPr txBox="1"/>
+            <p:nvPr/>
+          </p:nvSpPr>
+          <p:spPr>
+            <a:xfrm>
+              <a:off x="4689662" y="7005095"/>
+              <a:ext cx="398182" cy="200055"/>
+            </a:xfrm>
+            <a:prstGeom prst="rect">
+              <a:avLst/>
+            </a:prstGeom>
+            <a:noFill/>
+          </p:spPr>
+          <p:txBody>
+            <a:bodyPr wrap="square" rtlCol="0">
+              <a:spAutoFit/>
+            </a:bodyPr>
+            <a:lstStyle/>
+            <a:p>
+              <a:r>
+                <a:rPr lang="en-US" sz="700" dirty="0">
+                  <a:solidFill>
+                    <a:srgbClr val="B4B000"/>
+                  </a:solidFill>
+                  <a:latin typeface="Calibri" panose="020F0502020204030204" pitchFamily="34" charset="0"/>
+                  <a:ea typeface="Calibri" panose="020F0502020204030204" pitchFamily="34" charset="0"/>
+                  <a:cs typeface="Calibri" panose="020F0502020204030204" pitchFamily="34" charset="0"/>
+                </a:rPr>
+                <a:t>268Y</a:t>
+              </a:r>
+            </a:p>
+          </p:txBody>
+        </p:sp>
+        <p:sp>
+          <p:nvSpPr>
+            <p:cNvPr id="97" name="文本框 96">
+              <a:extLst>
+                <a:ext uri="{FF2B5EF4-FFF2-40B4-BE49-F238E27FC236}">
+                  <a16:creationId xmlns:a16="http://schemas.microsoft.com/office/drawing/2014/main" id="{4031397A-66F5-4DB9-9DBC-EE0A583D7CA8}"/>
+                </a:ext>
+              </a:extLst>
+            </p:cNvPr>
+            <p:cNvSpPr txBox="1"/>
+            <p:nvPr/>
+          </p:nvSpPr>
+          <p:spPr>
+            <a:xfrm>
+              <a:off x="4425600" y="7106739"/>
+              <a:ext cx="398182" cy="200055"/>
+            </a:xfrm>
+            <a:prstGeom prst="rect">
+              <a:avLst/>
+            </a:prstGeom>
+            <a:noFill/>
+          </p:spPr>
+          <p:txBody>
+            <a:bodyPr wrap="square" rtlCol="0">
+              <a:spAutoFit/>
+            </a:bodyPr>
+            <a:lstStyle/>
+            <a:p>
+              <a:r>
+                <a:rPr lang="en-US" sz="700" dirty="0">
+                  <a:solidFill>
+                    <a:srgbClr val="B4B000"/>
+                  </a:solidFill>
+                  <a:latin typeface="Calibri" panose="020F0502020204030204" pitchFamily="34" charset="0"/>
+                  <a:ea typeface="Calibri" panose="020F0502020204030204" pitchFamily="34" charset="0"/>
+                  <a:cs typeface="Calibri" panose="020F0502020204030204" pitchFamily="34" charset="0"/>
+                </a:rPr>
+                <a:t>292A</a:t>
+              </a:r>
+            </a:p>
+          </p:txBody>
+        </p:sp>
+        <p:sp>
+          <p:nvSpPr>
+            <p:cNvPr id="98" name="文本框 97">
+              <a:extLst>
+                <a:ext uri="{FF2B5EF4-FFF2-40B4-BE49-F238E27FC236}">
+                  <a16:creationId xmlns:a16="http://schemas.microsoft.com/office/drawing/2014/main" id="{03AC7D6A-5DB8-21D6-597F-1EDC52E7F19D}"/>
+                </a:ext>
+              </a:extLst>
+            </p:cNvPr>
+            <p:cNvSpPr txBox="1"/>
+            <p:nvPr/>
+          </p:nvSpPr>
+          <p:spPr>
+            <a:xfrm>
+              <a:off x="3910689" y="7234316"/>
+              <a:ext cx="398182" cy="200055"/>
+            </a:xfrm>
+            <a:prstGeom prst="rect">
+              <a:avLst/>
+            </a:prstGeom>
+            <a:noFill/>
+          </p:spPr>
+          <p:txBody>
+            <a:bodyPr wrap="square" rtlCol="0">
+              <a:spAutoFit/>
+            </a:bodyPr>
+            <a:lstStyle/>
+            <a:p>
+              <a:r>
+                <a:rPr lang="en-US" sz="700" dirty="0">
+                  <a:solidFill>
+                    <a:srgbClr val="B4B000"/>
+                  </a:solidFill>
+                  <a:latin typeface="Calibri" panose="020F0502020204030204" pitchFamily="34" charset="0"/>
+                  <a:ea typeface="Calibri" panose="020F0502020204030204" pitchFamily="34" charset="0"/>
+                  <a:cs typeface="Calibri" panose="020F0502020204030204" pitchFamily="34" charset="0"/>
+                </a:rPr>
+                <a:t>296K</a:t>
+              </a:r>
+            </a:p>
+          </p:txBody>
+        </p:sp>
+      </p:grpSp>
+      <p:grpSp>
+        <p:nvGrpSpPr>
+          <p:cNvPr id="100" name="组合 99">
+            <a:extLst>
+              <a:ext uri="{FF2B5EF4-FFF2-40B4-BE49-F238E27FC236}">
+                <a16:creationId xmlns:a16="http://schemas.microsoft.com/office/drawing/2014/main" id="{E38247DD-2E09-D1B0-A9B9-65D49FE49817}"/>
+              </a:ext>
+            </a:extLst>
+          </p:cNvPr>
+          <p:cNvGrpSpPr/>
+          <p:nvPr/>
+        </p:nvGrpSpPr>
+        <p:grpSpPr>
+          <a:xfrm>
+            <a:off x="3594942" y="2450164"/>
+            <a:ext cx="2519517" cy="1853348"/>
+            <a:chOff x="572640" y="6745919"/>
+            <a:chExt cx="2519517" cy="1853348"/>
+          </a:xfrm>
+        </p:grpSpPr>
+        <p:pic>
+          <p:nvPicPr>
+            <p:cNvPr id="42" name="图片 41" descr="图示&#10;&#10;AI 生成的内容可能不正确。">
+              <a:extLst>
+                <a:ext uri="{FF2B5EF4-FFF2-40B4-BE49-F238E27FC236}">
+                  <a16:creationId xmlns:a16="http://schemas.microsoft.com/office/drawing/2014/main" id="{02FCDEAE-4EF1-132C-CC14-113BF4DB47C7}"/>
+                </a:ext>
+              </a:extLst>
+            </p:cNvPr>
+            <p:cNvPicPr>
+              <a:picLocks noChangeAspect="1"/>
+            </p:cNvPicPr>
+            <p:nvPr/>
+          </p:nvPicPr>
+          <p:blipFill>
+            <a:blip r:embed="rId5">
+              <a:clrChange>
+                <a:clrFrom>
+                  <a:srgbClr val="FFFFFF"/>
+                </a:clrFrom>
+                <a:clrTo>
+                  <a:srgbClr val="FFFFFF">
+                    <a:alpha val="0"/>
+                  </a:srgbClr>
+                </a:clrTo>
+              </a:clrChange>
+              <a:extLst>
+                <a:ext uri="{28A0092B-C50C-407E-A947-70E740481C1C}">
+                  <a14:useLocalDpi xmlns:a14="http://schemas.microsoft.com/office/drawing/2010/main" val="0"/>
+                </a:ext>
+              </a:extLst>
+            </a:blip>
+            <a:stretch>
+              <a:fillRect/>
+            </a:stretch>
+          </p:blipFill>
+          <p:spPr>
+            <a:xfrm>
+              <a:off x="572640" y="6745919"/>
+              <a:ext cx="2519517" cy="1853348"/>
+            </a:xfrm>
+            <a:prstGeom prst="rect">
+              <a:avLst/>
+            </a:prstGeom>
+          </p:spPr>
+        </p:pic>
+        <p:sp>
+          <p:nvSpPr>
+            <p:cNvPr id="76" name="文本框 75">
+              <a:extLst>
+                <a:ext uri="{FF2B5EF4-FFF2-40B4-BE49-F238E27FC236}">
+                  <a16:creationId xmlns:a16="http://schemas.microsoft.com/office/drawing/2014/main" id="{A5A6C1C3-3B41-B911-54D0-49E0848FE017}"/>
+                </a:ext>
+              </a:extLst>
+            </p:cNvPr>
+            <p:cNvSpPr txBox="1"/>
+            <p:nvPr/>
+          </p:nvSpPr>
+          <p:spPr>
+            <a:xfrm>
+              <a:off x="803493" y="8107597"/>
+              <a:ext cx="398182" cy="200055"/>
+            </a:xfrm>
+            <a:prstGeom prst="rect">
+              <a:avLst/>
+            </a:prstGeom>
+            <a:noFill/>
+          </p:spPr>
+          <p:txBody>
+            <a:bodyPr wrap="square" rtlCol="0">
+              <a:spAutoFit/>
+            </a:bodyPr>
+            <a:lstStyle/>
+            <a:p>
+              <a:r>
+                <a:rPr lang="en-US" sz="700" dirty="0">
+                  <a:solidFill>
+                    <a:srgbClr val="B4B000"/>
+                  </a:solidFill>
+                  <a:latin typeface="Calibri" panose="020F0502020204030204" pitchFamily="34" charset="0"/>
+                  <a:ea typeface="Calibri" panose="020F0502020204030204" pitchFamily="34" charset="0"/>
+                  <a:cs typeface="Calibri" panose="020F0502020204030204" pitchFamily="34" charset="0"/>
+                </a:rPr>
+                <a:t>187C</a:t>
+              </a:r>
+            </a:p>
+          </p:txBody>
+        </p:sp>
+        <p:sp>
+          <p:nvSpPr>
+            <p:cNvPr id="77" name="文本框 76">
+              <a:extLst>
+                <a:ext uri="{FF2B5EF4-FFF2-40B4-BE49-F238E27FC236}">
+                  <a16:creationId xmlns:a16="http://schemas.microsoft.com/office/drawing/2014/main" id="{BBB8B49A-AA11-1B23-0290-11C2C3A1672C}"/>
+                </a:ext>
+              </a:extLst>
+            </p:cNvPr>
+            <p:cNvSpPr txBox="1"/>
+            <p:nvPr/>
+          </p:nvSpPr>
+          <p:spPr>
+            <a:xfrm>
+              <a:off x="2462512" y="7183167"/>
+              <a:ext cx="439853" cy="200055"/>
+            </a:xfrm>
+            <a:prstGeom prst="rect">
+              <a:avLst/>
+            </a:prstGeom>
+            <a:noFill/>
+          </p:spPr>
+          <p:txBody>
+            <a:bodyPr wrap="square" rtlCol="0">
+              <a:spAutoFit/>
+            </a:bodyPr>
+            <a:lstStyle/>
+            <a:p>
+              <a:r>
+                <a:rPr lang="en-US" sz="700" b="1" dirty="0">
+                  <a:solidFill>
+                    <a:srgbClr val="49C3C4"/>
+                  </a:solidFill>
+                  <a:latin typeface="Calibri" panose="020F0502020204030204" pitchFamily="34" charset="0"/>
+                  <a:ea typeface="Calibri" panose="020F0502020204030204" pitchFamily="34" charset="0"/>
+                  <a:cs typeface="Calibri" panose="020F0502020204030204" pitchFamily="34" charset="0"/>
+                </a:rPr>
+                <a:t>RET</a:t>
+              </a:r>
+            </a:p>
+          </p:txBody>
+        </p:sp>
+        <p:sp>
+          <p:nvSpPr>
+            <p:cNvPr id="79" name="文本框 78">
+              <a:extLst>
+                <a:ext uri="{FF2B5EF4-FFF2-40B4-BE49-F238E27FC236}">
+                  <a16:creationId xmlns:a16="http://schemas.microsoft.com/office/drawing/2014/main" id="{91D9D296-D402-1318-1502-32AA774D2492}"/>
+                </a:ext>
+              </a:extLst>
+            </p:cNvPr>
+            <p:cNvSpPr txBox="1"/>
+            <p:nvPr/>
+          </p:nvSpPr>
+          <p:spPr>
+            <a:xfrm>
+              <a:off x="803493" y="7583383"/>
+              <a:ext cx="398182" cy="200055"/>
+            </a:xfrm>
+            <a:prstGeom prst="rect">
+              <a:avLst/>
+            </a:prstGeom>
+            <a:noFill/>
+          </p:spPr>
+          <p:txBody>
+            <a:bodyPr wrap="square" rtlCol="0">
+              <a:spAutoFit/>
+            </a:bodyPr>
+            <a:lstStyle/>
+            <a:p>
+              <a:r>
+                <a:rPr lang="en-US" sz="700" dirty="0">
+                  <a:solidFill>
+                    <a:srgbClr val="B4B000"/>
+                  </a:solidFill>
+                  <a:latin typeface="Calibri" panose="020F0502020204030204" pitchFamily="34" charset="0"/>
+                  <a:ea typeface="Calibri" panose="020F0502020204030204" pitchFamily="34" charset="0"/>
+                  <a:cs typeface="Calibri" panose="020F0502020204030204" pitchFamily="34" charset="0"/>
+                </a:rPr>
+                <a:t>181</a:t>
+              </a:r>
+              <a:r>
+                <a:rPr lang="en-US" altLang="zh-CN" sz="700" dirty="0">
+                  <a:solidFill>
+                    <a:srgbClr val="B4B000"/>
+                  </a:solidFill>
+                  <a:latin typeface="Calibri" panose="020F0502020204030204" pitchFamily="34" charset="0"/>
+                  <a:ea typeface="Calibri" panose="020F0502020204030204" pitchFamily="34" charset="0"/>
+                  <a:cs typeface="Calibri" panose="020F0502020204030204" pitchFamily="34" charset="0"/>
+                </a:rPr>
+                <a:t>E</a:t>
+              </a:r>
+              <a:endParaRPr lang="en-US" sz="700" dirty="0">
+                <a:solidFill>
+                  <a:srgbClr val="B4B000"/>
+                </a:solidFill>
                 <a:latin typeface="Calibri" panose="020F0502020204030204" pitchFamily="34" charset="0"/>
                 <a:ea typeface="Calibri" panose="020F0502020204030204" pitchFamily="34" charset="0"/>
                 <a:cs typeface="Calibri" panose="020F0502020204030204" pitchFamily="34" charset="0"/>
-              </a:rPr>
-              <a:t>QTY</a:t>
-            </a:r>
-            <a:r>
-              <a:rPr lang="en-US" altLang="zh-CN" sz="800" b="1" u="none" strike="noStrike" dirty="0">
-                <a:latin typeface="Calibri" panose="020F0502020204030204" pitchFamily="34" charset="0"/>
-                <a:ea typeface="Calibri" panose="020F0502020204030204" pitchFamily="34" charset="0"/>
-                <a:cs typeface="Calibri" panose="020F0502020204030204" pitchFamily="34" charset="0"/>
-              </a:rPr>
-              <a:t> </a:t>
-            </a:r>
-            <a:r>
-              <a:rPr lang="en-US" sz="800" b="1" i="1" dirty="0">
-                <a:latin typeface="Calibri" panose="020F0502020204030204" pitchFamily="34" charset="0"/>
-                <a:ea typeface="Calibri" panose="020F0502020204030204" pitchFamily="34" charset="0"/>
-                <a:cs typeface="Calibri" panose="020F0502020204030204" pitchFamily="34" charset="0"/>
-              </a:rPr>
-              <a:t>vs</a:t>
-            </a:r>
-            <a:r>
-              <a:rPr lang="en-US" altLang="zh-CN" sz="800" b="1" u="none" strike="noStrike" dirty="0">
-                <a:latin typeface="Calibri" panose="020F0502020204030204" pitchFamily="34" charset="0"/>
-                <a:ea typeface="Calibri" panose="020F0502020204030204" pitchFamily="34" charset="0"/>
-                <a:cs typeface="Calibri" panose="020F0502020204030204" pitchFamily="34" charset="0"/>
-              </a:rPr>
-              <a:t> OPN2</a:t>
-            </a:r>
-            <a:r>
-              <a:rPr lang="en-US" altLang="zh-CN" sz="800" b="1" u="none" strike="noStrike" baseline="30000" dirty="0">
-                <a:latin typeface="Calibri" panose="020F0502020204030204" pitchFamily="34" charset="0"/>
-                <a:ea typeface="Calibri" panose="020F0502020204030204" pitchFamily="34" charset="0"/>
-                <a:cs typeface="Calibri" panose="020F0502020204030204" pitchFamily="34" charset="0"/>
-              </a:rPr>
-              <a:t>EXP</a:t>
-            </a:r>
-            <a:endParaRPr lang="en-US" sz="800" i="1" dirty="0">
-              <a:latin typeface="Calibri" panose="020F0502020204030204" pitchFamily="34" charset="0"/>
-              <a:ea typeface="Calibri" panose="020F0502020204030204" pitchFamily="34" charset="0"/>
-              <a:cs typeface="Calibri" panose="020F0502020204030204" pitchFamily="34" charset="0"/>
-            </a:endParaRPr>
-          </a:p>
-        </p:txBody>
-      </p:sp>
-      <p:sp>
-        <p:nvSpPr>
-          <p:cNvPr id="3" name="文本框 2">
+              </a:endParaRPr>
+            </a:p>
+          </p:txBody>
+        </p:sp>
+        <p:sp>
+          <p:nvSpPr>
+            <p:cNvPr id="80" name="文本框 79">
+              <a:extLst>
+                <a:ext uri="{FF2B5EF4-FFF2-40B4-BE49-F238E27FC236}">
+                  <a16:creationId xmlns:a16="http://schemas.microsoft.com/office/drawing/2014/main" id="{3A493543-3CC0-4C52-C2FA-F9162CE2827C}"/>
+                </a:ext>
+              </a:extLst>
+            </p:cNvPr>
+            <p:cNvSpPr txBox="1"/>
+            <p:nvPr/>
+          </p:nvSpPr>
+          <p:spPr>
+            <a:xfrm>
+              <a:off x="1281605" y="7984401"/>
+              <a:ext cx="398182" cy="200055"/>
+            </a:xfrm>
+            <a:prstGeom prst="rect">
+              <a:avLst/>
+            </a:prstGeom>
+            <a:noFill/>
+          </p:spPr>
+          <p:txBody>
+            <a:bodyPr wrap="square" rtlCol="0">
+              <a:spAutoFit/>
+            </a:bodyPr>
+            <a:lstStyle/>
+            <a:p>
+              <a:r>
+                <a:rPr lang="en-US" sz="700" dirty="0">
+                  <a:solidFill>
+                    <a:srgbClr val="B4B000"/>
+                  </a:solidFill>
+                  <a:latin typeface="Calibri" panose="020F0502020204030204" pitchFamily="34" charset="0"/>
+                  <a:ea typeface="Calibri" panose="020F0502020204030204" pitchFamily="34" charset="0"/>
+                  <a:cs typeface="Calibri" panose="020F0502020204030204" pitchFamily="34" charset="0"/>
+                </a:rPr>
+                <a:t>188G</a:t>
+              </a:r>
+            </a:p>
+          </p:txBody>
+        </p:sp>
+        <p:sp>
+          <p:nvSpPr>
+            <p:cNvPr id="81" name="文本框 80">
+              <a:extLst>
+                <a:ext uri="{FF2B5EF4-FFF2-40B4-BE49-F238E27FC236}">
+                  <a16:creationId xmlns:a16="http://schemas.microsoft.com/office/drawing/2014/main" id="{5975C010-8E7D-030A-2631-9BA737D898D6}"/>
+                </a:ext>
+              </a:extLst>
+            </p:cNvPr>
+            <p:cNvSpPr txBox="1"/>
+            <p:nvPr/>
+          </p:nvSpPr>
+          <p:spPr>
+            <a:xfrm>
+              <a:off x="1679787" y="8307652"/>
+              <a:ext cx="398182" cy="200055"/>
+            </a:xfrm>
+            <a:prstGeom prst="rect">
+              <a:avLst/>
+            </a:prstGeom>
+            <a:noFill/>
+          </p:spPr>
+          <p:txBody>
+            <a:bodyPr wrap="square" rtlCol="0">
+              <a:spAutoFit/>
+            </a:bodyPr>
+            <a:lstStyle/>
+            <a:p>
+              <a:r>
+                <a:rPr lang="en-US" sz="700" dirty="0">
+                  <a:solidFill>
+                    <a:srgbClr val="B4B000"/>
+                  </a:solidFill>
+                  <a:latin typeface="Calibri" panose="020F0502020204030204" pitchFamily="34" charset="0"/>
+                  <a:ea typeface="Calibri" panose="020F0502020204030204" pitchFamily="34" charset="0"/>
+                  <a:cs typeface="Calibri" panose="020F0502020204030204" pitchFamily="34" charset="0"/>
+                </a:rPr>
+                <a:t>191I</a:t>
+              </a:r>
+            </a:p>
+          </p:txBody>
+        </p:sp>
+        <p:sp>
+          <p:nvSpPr>
+            <p:cNvPr id="82" name="文本框 81">
+              <a:extLst>
+                <a:ext uri="{FF2B5EF4-FFF2-40B4-BE49-F238E27FC236}">
+                  <a16:creationId xmlns:a16="http://schemas.microsoft.com/office/drawing/2014/main" id="{3DB1450F-7C40-48A1-332A-01BBF1809BCA}"/>
+                </a:ext>
+              </a:extLst>
+            </p:cNvPr>
+            <p:cNvSpPr txBox="1"/>
+            <p:nvPr/>
+          </p:nvSpPr>
+          <p:spPr>
+            <a:xfrm>
+              <a:off x="1832398" y="8027285"/>
+              <a:ext cx="398182" cy="200055"/>
+            </a:xfrm>
+            <a:prstGeom prst="rect">
+              <a:avLst/>
+            </a:prstGeom>
+            <a:noFill/>
+          </p:spPr>
+          <p:txBody>
+            <a:bodyPr wrap="square" rtlCol="0">
+              <a:spAutoFit/>
+            </a:bodyPr>
+            <a:lstStyle/>
+            <a:p>
+              <a:r>
+                <a:rPr lang="en-US" sz="700" dirty="0">
+                  <a:solidFill>
+                    <a:srgbClr val="B4B000"/>
+                  </a:solidFill>
+                  <a:latin typeface="Calibri" panose="020F0502020204030204" pitchFamily="34" charset="0"/>
+                  <a:ea typeface="Calibri" panose="020F0502020204030204" pitchFamily="34" charset="0"/>
+                  <a:cs typeface="Calibri" panose="020F0502020204030204" pitchFamily="34" charset="0"/>
+                </a:rPr>
+                <a:t>208Y</a:t>
+              </a:r>
+            </a:p>
+          </p:txBody>
+        </p:sp>
+        <p:sp>
+          <p:nvSpPr>
+            <p:cNvPr id="83" name="文本框 82">
+              <a:extLst>
+                <a:ext uri="{FF2B5EF4-FFF2-40B4-BE49-F238E27FC236}">
+                  <a16:creationId xmlns:a16="http://schemas.microsoft.com/office/drawing/2014/main" id="{8BD0D8DB-594A-B687-68EE-F96FE4645545}"/>
+                </a:ext>
+              </a:extLst>
+            </p:cNvPr>
+            <p:cNvSpPr txBox="1"/>
+            <p:nvPr/>
+          </p:nvSpPr>
+          <p:spPr>
+            <a:xfrm>
+              <a:off x="2412423" y="7949364"/>
+              <a:ext cx="398182" cy="200055"/>
+            </a:xfrm>
+            <a:prstGeom prst="rect">
+              <a:avLst/>
+            </a:prstGeom>
+            <a:noFill/>
+          </p:spPr>
+          <p:txBody>
+            <a:bodyPr wrap="square" rtlCol="0">
+              <a:spAutoFit/>
+            </a:bodyPr>
+            <a:lstStyle/>
+            <a:p>
+              <a:r>
+                <a:rPr lang="en-US" sz="700" dirty="0">
+                  <a:solidFill>
+                    <a:srgbClr val="B4B000"/>
+                  </a:solidFill>
+                  <a:latin typeface="Calibri" panose="020F0502020204030204" pitchFamily="34" charset="0"/>
+                  <a:ea typeface="Calibri" panose="020F0502020204030204" pitchFamily="34" charset="0"/>
+                  <a:cs typeface="Calibri" panose="020F0502020204030204" pitchFamily="34" charset="0"/>
+                </a:rPr>
+                <a:t>207M</a:t>
+              </a:r>
+            </a:p>
+          </p:txBody>
+        </p:sp>
+        <p:sp>
+          <p:nvSpPr>
+            <p:cNvPr id="84" name="文本框 83">
+              <a:extLst>
+                <a:ext uri="{FF2B5EF4-FFF2-40B4-BE49-F238E27FC236}">
+                  <a16:creationId xmlns:a16="http://schemas.microsoft.com/office/drawing/2014/main" id="{63D89D41-1C00-F8B0-ECC3-F67E6EAA635F}"/>
+                </a:ext>
+              </a:extLst>
+            </p:cNvPr>
+            <p:cNvSpPr txBox="1"/>
+            <p:nvPr/>
+          </p:nvSpPr>
+          <p:spPr>
+            <a:xfrm>
+              <a:off x="2649129" y="7421331"/>
+              <a:ext cx="398182" cy="200055"/>
+            </a:xfrm>
+            <a:prstGeom prst="rect">
+              <a:avLst/>
+            </a:prstGeom>
+            <a:noFill/>
+          </p:spPr>
+          <p:txBody>
+            <a:bodyPr wrap="square" rtlCol="0">
+              <a:spAutoFit/>
+            </a:bodyPr>
+            <a:lstStyle/>
+            <a:p>
+              <a:r>
+                <a:rPr lang="en-US" sz="700" dirty="0">
+                  <a:solidFill>
+                    <a:srgbClr val="B4B000"/>
+                  </a:solidFill>
+                  <a:latin typeface="Calibri" panose="020F0502020204030204" pitchFamily="34" charset="0"/>
+                  <a:ea typeface="Calibri" panose="020F0502020204030204" pitchFamily="34" charset="0"/>
+                  <a:cs typeface="Calibri" panose="020F0502020204030204" pitchFamily="34" charset="0"/>
+                </a:rPr>
+                <a:t>212Y</a:t>
+              </a:r>
+            </a:p>
+          </p:txBody>
+        </p:sp>
+        <p:sp>
+          <p:nvSpPr>
+            <p:cNvPr id="85" name="文本框 84">
+              <a:extLst>
+                <a:ext uri="{FF2B5EF4-FFF2-40B4-BE49-F238E27FC236}">
+                  <a16:creationId xmlns:a16="http://schemas.microsoft.com/office/drawing/2014/main" id="{E51B8D15-2EB9-DEA2-D9FD-612FE7866B48}"/>
+                </a:ext>
+              </a:extLst>
+            </p:cNvPr>
+            <p:cNvSpPr txBox="1"/>
+            <p:nvPr/>
+          </p:nvSpPr>
+          <p:spPr>
+            <a:xfrm>
+              <a:off x="1772061" y="6888937"/>
+              <a:ext cx="398182" cy="200055"/>
+            </a:xfrm>
+            <a:prstGeom prst="rect">
+              <a:avLst/>
+            </a:prstGeom>
+            <a:noFill/>
+          </p:spPr>
+          <p:txBody>
+            <a:bodyPr wrap="square" rtlCol="0">
+              <a:spAutoFit/>
+            </a:bodyPr>
+            <a:lstStyle/>
+            <a:p>
+              <a:r>
+                <a:rPr lang="en-US" sz="700" dirty="0">
+                  <a:solidFill>
+                    <a:srgbClr val="B4B000"/>
+                  </a:solidFill>
+                  <a:latin typeface="Calibri" panose="020F0502020204030204" pitchFamily="34" charset="0"/>
+                  <a:ea typeface="Calibri" panose="020F0502020204030204" pitchFamily="34" charset="0"/>
+                  <a:cs typeface="Calibri" panose="020F0502020204030204" pitchFamily="34" charset="0"/>
+                </a:rPr>
+                <a:t>265W</a:t>
+              </a:r>
+            </a:p>
+          </p:txBody>
+        </p:sp>
+        <p:sp>
+          <p:nvSpPr>
+            <p:cNvPr id="86" name="文本框 85">
+              <a:extLst>
+                <a:ext uri="{FF2B5EF4-FFF2-40B4-BE49-F238E27FC236}">
+                  <a16:creationId xmlns:a16="http://schemas.microsoft.com/office/drawing/2014/main" id="{F99F77A6-6E65-84D8-15AA-47DD31829744}"/>
+                </a:ext>
+              </a:extLst>
+            </p:cNvPr>
+            <p:cNvSpPr txBox="1"/>
+            <p:nvPr/>
+          </p:nvSpPr>
+          <p:spPr>
+            <a:xfrm>
+              <a:off x="1821726" y="7381351"/>
+              <a:ext cx="398182" cy="200055"/>
+            </a:xfrm>
+            <a:prstGeom prst="rect">
+              <a:avLst/>
+            </a:prstGeom>
+            <a:noFill/>
+          </p:spPr>
+          <p:txBody>
+            <a:bodyPr wrap="square" rtlCol="0">
+              <a:spAutoFit/>
+            </a:bodyPr>
+            <a:lstStyle/>
+            <a:p>
+              <a:r>
+                <a:rPr lang="en-US" sz="700" dirty="0">
+                  <a:solidFill>
+                    <a:srgbClr val="B4B000"/>
+                  </a:solidFill>
+                  <a:latin typeface="Calibri" panose="020F0502020204030204" pitchFamily="34" charset="0"/>
+                  <a:ea typeface="Calibri" panose="020F0502020204030204" pitchFamily="34" charset="0"/>
+                  <a:cs typeface="Calibri" panose="020F0502020204030204" pitchFamily="34" charset="0"/>
+                </a:rPr>
+                <a:t>117A</a:t>
+              </a:r>
+            </a:p>
+          </p:txBody>
+        </p:sp>
+        <p:sp>
+          <p:nvSpPr>
+            <p:cNvPr id="87" name="文本框 86">
+              <a:extLst>
+                <a:ext uri="{FF2B5EF4-FFF2-40B4-BE49-F238E27FC236}">
+                  <a16:creationId xmlns:a16="http://schemas.microsoft.com/office/drawing/2014/main" id="{753B44C8-184D-5B55-3D46-19CA93358676}"/>
+                </a:ext>
+              </a:extLst>
+            </p:cNvPr>
+            <p:cNvSpPr txBox="1"/>
+            <p:nvPr/>
+          </p:nvSpPr>
+          <p:spPr>
+            <a:xfrm>
+              <a:off x="1526796" y="7158127"/>
+              <a:ext cx="398182" cy="200055"/>
+            </a:xfrm>
+            <a:prstGeom prst="rect">
+              <a:avLst/>
+            </a:prstGeom>
+            <a:noFill/>
+          </p:spPr>
+          <p:txBody>
+            <a:bodyPr wrap="square" rtlCol="0">
+              <a:spAutoFit/>
+            </a:bodyPr>
+            <a:lstStyle/>
+            <a:p>
+              <a:r>
+                <a:rPr lang="en-US" sz="700" dirty="0">
+                  <a:solidFill>
+                    <a:srgbClr val="B4B000"/>
+                  </a:solidFill>
+                  <a:latin typeface="Calibri" panose="020F0502020204030204" pitchFamily="34" charset="0"/>
+                  <a:ea typeface="Calibri" panose="020F0502020204030204" pitchFamily="34" charset="0"/>
+                  <a:cs typeface="Calibri" panose="020F0502020204030204" pitchFamily="34" charset="0"/>
+                </a:rPr>
+                <a:t>268Y</a:t>
+              </a:r>
+            </a:p>
+          </p:txBody>
+        </p:sp>
+        <p:sp>
+          <p:nvSpPr>
+            <p:cNvPr id="99" name="文本框 98">
+              <a:extLst>
+                <a:ext uri="{FF2B5EF4-FFF2-40B4-BE49-F238E27FC236}">
+                  <a16:creationId xmlns:a16="http://schemas.microsoft.com/office/drawing/2014/main" id="{F3B46390-6760-03A0-AA09-FCE69E04F3ED}"/>
+                </a:ext>
+              </a:extLst>
+            </p:cNvPr>
+            <p:cNvSpPr txBox="1"/>
+            <p:nvPr/>
+          </p:nvSpPr>
+          <p:spPr>
+            <a:xfrm>
+              <a:off x="1058938" y="7362840"/>
+              <a:ext cx="398182" cy="200055"/>
+            </a:xfrm>
+            <a:prstGeom prst="rect">
+              <a:avLst/>
+            </a:prstGeom>
+            <a:noFill/>
+          </p:spPr>
+          <p:txBody>
+            <a:bodyPr wrap="square" rtlCol="0">
+              <a:spAutoFit/>
+            </a:bodyPr>
+            <a:lstStyle/>
+            <a:p>
+              <a:r>
+                <a:rPr lang="en-US" sz="700" dirty="0">
+                  <a:solidFill>
+                    <a:srgbClr val="B4B000"/>
+                  </a:solidFill>
+                  <a:latin typeface="Calibri" panose="020F0502020204030204" pitchFamily="34" charset="0"/>
+                  <a:ea typeface="Calibri" panose="020F0502020204030204" pitchFamily="34" charset="0"/>
+                  <a:cs typeface="Calibri" panose="020F0502020204030204" pitchFamily="34" charset="0"/>
+                </a:rPr>
+                <a:t>296K</a:t>
+              </a:r>
+            </a:p>
+          </p:txBody>
+        </p:sp>
+      </p:grpSp>
+      <p:pic>
+        <p:nvPicPr>
+          <p:cNvPr id="115" name="图片 114">
             <a:extLst>
               <a:ext uri="{FF2B5EF4-FFF2-40B4-BE49-F238E27FC236}">
-                <a16:creationId xmlns:a16="http://schemas.microsoft.com/office/drawing/2014/main" id="{71188298-D5F1-862E-BF24-CD4D3C5583FF}"/>
-              </a:ext>
-            </a:extLst>
-          </p:cNvPr>
-          <p:cNvSpPr txBox="1"/>
-          <p:nvPr/>
-        </p:nvSpPr>
-        <p:spPr>
-          <a:xfrm>
-            <a:off x="7092764" y="5428647"/>
-            <a:ext cx="6281420" cy="215444"/>
-          </a:xfrm>
-          <a:prstGeom prst="rect">
-            <a:avLst/>
-          </a:prstGeom>
-          <a:noFill/>
-        </p:spPr>
-        <p:txBody>
-          <a:bodyPr wrap="square" rtlCol="0">
-            <a:spAutoFit/>
-          </a:bodyPr>
-          <a:lstStyle/>
-          <a:p>
-            <a:r>
-              <a:rPr lang="en-US" sz="800" b="1" i="0" u="none" strike="noStrike" baseline="0" dirty="0">
-                <a:latin typeface="Calibri" panose="020F0502020204030204" pitchFamily="34" charset="0"/>
-                <a:ea typeface="Calibri" panose="020F0502020204030204" pitchFamily="34" charset="0"/>
-                <a:cs typeface="Calibri" panose="020F0502020204030204" pitchFamily="34" charset="0"/>
-              </a:rPr>
-              <a:t>j) OPN1MW</a:t>
-            </a:r>
-            <a:r>
-              <a:rPr lang="en-US" altLang="zh-CN" sz="800" b="1" i="0" u="none" strike="noStrike" baseline="30000" dirty="0">
-                <a:latin typeface="Calibri" panose="020F0502020204030204" pitchFamily="34" charset="0"/>
-                <a:ea typeface="Calibri" panose="020F0502020204030204" pitchFamily="34" charset="0"/>
-                <a:cs typeface="Calibri" panose="020F0502020204030204" pitchFamily="34" charset="0"/>
-              </a:rPr>
-              <a:t>AF3</a:t>
-            </a:r>
-            <a:r>
-              <a:rPr lang="en-US" altLang="zh-CN" sz="800" b="1" i="0" u="none" strike="noStrike" dirty="0">
-                <a:latin typeface="Calibri" panose="020F0502020204030204" pitchFamily="34" charset="0"/>
-                <a:ea typeface="Calibri" panose="020F0502020204030204" pitchFamily="34" charset="0"/>
-                <a:cs typeface="Calibri" panose="020F0502020204030204" pitchFamily="34" charset="0"/>
-              </a:rPr>
-              <a:t> </a:t>
-            </a:r>
-            <a:r>
-              <a:rPr lang="en-US" altLang="zh-CN" sz="800" b="1" i="1" u="none" strike="noStrike" dirty="0">
-                <a:latin typeface="Calibri" panose="020F0502020204030204" pitchFamily="34" charset="0"/>
-                <a:ea typeface="Calibri" panose="020F0502020204030204" pitchFamily="34" charset="0"/>
-                <a:cs typeface="Calibri" panose="020F0502020204030204" pitchFamily="34" charset="0"/>
-              </a:rPr>
-              <a:t>vs</a:t>
-            </a:r>
-            <a:r>
-              <a:rPr lang="en-US" altLang="zh-CN" sz="800" b="1" u="none" strike="noStrike" dirty="0">
-                <a:latin typeface="Calibri" panose="020F0502020204030204" pitchFamily="34" charset="0"/>
-                <a:ea typeface="Calibri" panose="020F0502020204030204" pitchFamily="34" charset="0"/>
-                <a:cs typeface="Calibri" panose="020F0502020204030204" pitchFamily="34" charset="0"/>
-              </a:rPr>
-              <a:t> </a:t>
-            </a:r>
-            <a:r>
-              <a:rPr lang="en-US" sz="800" b="1" i="0" u="none" strike="noStrike" baseline="0" dirty="0">
-                <a:latin typeface="Calibri" panose="020F0502020204030204" pitchFamily="34" charset="0"/>
-                <a:ea typeface="Calibri" panose="020F0502020204030204" pitchFamily="34" charset="0"/>
-                <a:cs typeface="Calibri" panose="020F0502020204030204" pitchFamily="34" charset="0"/>
-              </a:rPr>
-              <a:t>OPN1LW</a:t>
-            </a:r>
-            <a:r>
-              <a:rPr lang="en-US" altLang="zh-CN" sz="800" b="1" i="0" u="none" strike="noStrike" baseline="30000" dirty="0">
-                <a:latin typeface="Calibri" panose="020F0502020204030204" pitchFamily="34" charset="0"/>
-                <a:ea typeface="Calibri" panose="020F0502020204030204" pitchFamily="34" charset="0"/>
-                <a:cs typeface="Calibri" panose="020F0502020204030204" pitchFamily="34" charset="0"/>
-              </a:rPr>
-              <a:t>AF3</a:t>
-            </a:r>
-            <a:r>
-              <a:rPr lang="en-US" altLang="zh-CN" sz="800" b="1" i="0" u="none" strike="noStrike" dirty="0">
-                <a:latin typeface="Calibri" panose="020F0502020204030204" pitchFamily="34" charset="0"/>
-                <a:ea typeface="Calibri" panose="020F0502020204030204" pitchFamily="34" charset="0"/>
-                <a:cs typeface="Calibri" panose="020F0502020204030204" pitchFamily="34" charset="0"/>
-              </a:rPr>
-              <a:t> </a:t>
-            </a:r>
-            <a:r>
-              <a:rPr lang="en-US" altLang="zh-CN" sz="800" b="1" i="1" u="none" strike="noStrike" dirty="0">
-                <a:latin typeface="Calibri" panose="020F0502020204030204" pitchFamily="34" charset="0"/>
-                <a:ea typeface="Calibri" panose="020F0502020204030204" pitchFamily="34" charset="0"/>
-                <a:cs typeface="Calibri" panose="020F0502020204030204" pitchFamily="34" charset="0"/>
-              </a:rPr>
-              <a:t>vs</a:t>
-            </a:r>
-            <a:r>
-              <a:rPr lang="en-US" altLang="zh-CN" sz="800" b="1" u="none" strike="noStrike" dirty="0">
-                <a:latin typeface="Calibri" panose="020F0502020204030204" pitchFamily="34" charset="0"/>
-                <a:ea typeface="Calibri" panose="020F0502020204030204" pitchFamily="34" charset="0"/>
-                <a:cs typeface="Calibri" panose="020F0502020204030204" pitchFamily="34" charset="0"/>
-              </a:rPr>
-              <a:t> </a:t>
-            </a:r>
-            <a:r>
-              <a:rPr lang="en-US" sz="800" b="1" i="0" u="none" strike="noStrike" baseline="0" dirty="0">
-                <a:latin typeface="Calibri" panose="020F0502020204030204" pitchFamily="34" charset="0"/>
-                <a:ea typeface="Calibri" panose="020F0502020204030204" pitchFamily="34" charset="0"/>
-                <a:cs typeface="Calibri" panose="020F0502020204030204" pitchFamily="34" charset="0"/>
-              </a:rPr>
-              <a:t>OPN1SW</a:t>
-            </a:r>
-            <a:r>
-              <a:rPr lang="en-US" altLang="zh-CN" sz="800" b="1" i="0" u="none" strike="noStrike" baseline="30000" dirty="0">
-                <a:latin typeface="Calibri" panose="020F0502020204030204" pitchFamily="34" charset="0"/>
-                <a:ea typeface="Calibri" panose="020F0502020204030204" pitchFamily="34" charset="0"/>
-                <a:cs typeface="Calibri" panose="020F0502020204030204" pitchFamily="34" charset="0"/>
-              </a:rPr>
-              <a:t>AF3</a:t>
-            </a:r>
-            <a:r>
-              <a:rPr lang="en-US" altLang="zh-CN" sz="800" b="1" i="0" u="none" strike="noStrike" dirty="0">
-                <a:latin typeface="Calibri" panose="020F0502020204030204" pitchFamily="34" charset="0"/>
-                <a:ea typeface="Calibri" panose="020F0502020204030204" pitchFamily="34" charset="0"/>
-                <a:cs typeface="Calibri" panose="020F0502020204030204" pitchFamily="34" charset="0"/>
-              </a:rPr>
-              <a:t> </a:t>
-            </a:r>
-            <a:r>
-              <a:rPr lang="en-US" altLang="zh-CN" sz="800" b="1" i="1" u="none" strike="noStrike" dirty="0">
-                <a:latin typeface="Calibri" panose="020F0502020204030204" pitchFamily="34" charset="0"/>
-                <a:ea typeface="Calibri" panose="020F0502020204030204" pitchFamily="34" charset="0"/>
-                <a:cs typeface="Calibri" panose="020F0502020204030204" pitchFamily="34" charset="0"/>
-              </a:rPr>
-              <a:t>vs</a:t>
-            </a:r>
-            <a:r>
-              <a:rPr lang="en-US" altLang="zh-CN" sz="800" b="1" u="none" strike="noStrike" dirty="0">
-                <a:latin typeface="Calibri" panose="020F0502020204030204" pitchFamily="34" charset="0"/>
-                <a:ea typeface="Calibri" panose="020F0502020204030204" pitchFamily="34" charset="0"/>
-                <a:cs typeface="Calibri" panose="020F0502020204030204" pitchFamily="34" charset="0"/>
-              </a:rPr>
-              <a:t> </a:t>
-            </a:r>
-            <a:r>
-              <a:rPr lang="en-US" sz="800" b="1" i="0" u="none" strike="noStrike" baseline="0" dirty="0">
-                <a:latin typeface="Calibri" panose="020F0502020204030204" pitchFamily="34" charset="0"/>
-                <a:ea typeface="Calibri" panose="020F0502020204030204" pitchFamily="34" charset="0"/>
-                <a:cs typeface="Calibri" panose="020F0502020204030204" pitchFamily="34" charset="0"/>
-              </a:rPr>
-              <a:t>OPN2</a:t>
-            </a:r>
-            <a:r>
-              <a:rPr lang="en-US" altLang="zh-CN" sz="800" b="1" i="0" u="none" strike="noStrike" baseline="30000" dirty="0">
-                <a:latin typeface="Calibri" panose="020F0502020204030204" pitchFamily="34" charset="0"/>
-                <a:ea typeface="Calibri" panose="020F0502020204030204" pitchFamily="34" charset="0"/>
-                <a:cs typeface="Calibri" panose="020F0502020204030204" pitchFamily="34" charset="0"/>
-              </a:rPr>
-              <a:t>AF3</a:t>
-            </a:r>
-            <a:r>
-              <a:rPr lang="en-US" altLang="zh-CN" sz="800" b="1" i="1" u="none" strike="noStrike" dirty="0">
-                <a:latin typeface="Calibri" panose="020F0502020204030204" pitchFamily="34" charset="0"/>
-                <a:ea typeface="Calibri" panose="020F0502020204030204" pitchFamily="34" charset="0"/>
-                <a:cs typeface="Calibri" panose="020F0502020204030204" pitchFamily="34" charset="0"/>
-              </a:rPr>
-              <a:t> vs</a:t>
-            </a:r>
-            <a:r>
-              <a:rPr lang="en-US" altLang="zh-CN" sz="800" b="1" u="none" strike="noStrike" dirty="0">
-                <a:latin typeface="Calibri" panose="020F0502020204030204" pitchFamily="34" charset="0"/>
-                <a:ea typeface="Calibri" panose="020F0502020204030204" pitchFamily="34" charset="0"/>
-                <a:cs typeface="Calibri" panose="020F0502020204030204" pitchFamily="34" charset="0"/>
-              </a:rPr>
-              <a:t> </a:t>
-            </a:r>
-            <a:r>
-              <a:rPr lang="en-US" sz="800" b="1" i="0" u="none" strike="noStrike" baseline="0" dirty="0">
-                <a:latin typeface="Calibri" panose="020F0502020204030204" pitchFamily="34" charset="0"/>
-                <a:ea typeface="Calibri" panose="020F0502020204030204" pitchFamily="34" charset="0"/>
-                <a:cs typeface="Calibri" panose="020F0502020204030204" pitchFamily="34" charset="0"/>
-              </a:rPr>
-              <a:t>OPN3</a:t>
-            </a:r>
-            <a:r>
-              <a:rPr lang="en-US" altLang="zh-CN" sz="800" b="1" i="0" u="none" strike="noStrike" baseline="30000" dirty="0">
-                <a:latin typeface="Calibri" panose="020F0502020204030204" pitchFamily="34" charset="0"/>
-                <a:ea typeface="Calibri" panose="020F0502020204030204" pitchFamily="34" charset="0"/>
-                <a:cs typeface="Calibri" panose="020F0502020204030204" pitchFamily="34" charset="0"/>
-              </a:rPr>
-              <a:t>AF3</a:t>
-            </a:r>
-            <a:r>
-              <a:rPr lang="en-US" altLang="zh-CN" sz="800" b="1" i="0" u="none" strike="noStrike" dirty="0">
-                <a:latin typeface="Calibri" panose="020F0502020204030204" pitchFamily="34" charset="0"/>
-                <a:ea typeface="Calibri" panose="020F0502020204030204" pitchFamily="34" charset="0"/>
-                <a:cs typeface="Calibri" panose="020F0502020204030204" pitchFamily="34" charset="0"/>
-              </a:rPr>
-              <a:t> </a:t>
-            </a:r>
-            <a:r>
-              <a:rPr lang="en-US" altLang="zh-CN" sz="800" b="1" i="1" u="none" strike="noStrike" dirty="0">
-                <a:latin typeface="Calibri" panose="020F0502020204030204" pitchFamily="34" charset="0"/>
-                <a:ea typeface="Calibri" panose="020F0502020204030204" pitchFamily="34" charset="0"/>
-                <a:cs typeface="Calibri" panose="020F0502020204030204" pitchFamily="34" charset="0"/>
-              </a:rPr>
-              <a:t>vs</a:t>
-            </a:r>
-            <a:r>
-              <a:rPr lang="en-US" altLang="zh-CN" sz="800" b="1" u="none" strike="noStrike" dirty="0">
-                <a:latin typeface="Calibri" panose="020F0502020204030204" pitchFamily="34" charset="0"/>
-                <a:ea typeface="Calibri" panose="020F0502020204030204" pitchFamily="34" charset="0"/>
-                <a:cs typeface="Calibri" panose="020F0502020204030204" pitchFamily="34" charset="0"/>
-              </a:rPr>
-              <a:t> </a:t>
-            </a:r>
-            <a:r>
-              <a:rPr lang="en-US" sz="800" b="1" i="0" u="none" strike="noStrike" baseline="0" dirty="0">
-                <a:latin typeface="Calibri" panose="020F0502020204030204" pitchFamily="34" charset="0"/>
-                <a:ea typeface="Calibri" panose="020F0502020204030204" pitchFamily="34" charset="0"/>
-                <a:cs typeface="Calibri" panose="020F0502020204030204" pitchFamily="34" charset="0"/>
-              </a:rPr>
-              <a:t>OPN4</a:t>
-            </a:r>
-            <a:r>
-              <a:rPr lang="en-US" altLang="zh-CN" sz="800" b="1" i="0" u="none" strike="noStrike" baseline="30000" dirty="0">
-                <a:latin typeface="Calibri" panose="020F0502020204030204" pitchFamily="34" charset="0"/>
-                <a:ea typeface="Calibri" panose="020F0502020204030204" pitchFamily="34" charset="0"/>
-                <a:cs typeface="Calibri" panose="020F0502020204030204" pitchFamily="34" charset="0"/>
-              </a:rPr>
-              <a:t>AF3</a:t>
-            </a:r>
-            <a:r>
-              <a:rPr lang="en-US" altLang="zh-CN" sz="800" b="1" i="0" u="none" strike="noStrike" dirty="0">
-                <a:latin typeface="Calibri" panose="020F0502020204030204" pitchFamily="34" charset="0"/>
-                <a:ea typeface="Calibri" panose="020F0502020204030204" pitchFamily="34" charset="0"/>
-                <a:cs typeface="Calibri" panose="020F0502020204030204" pitchFamily="34" charset="0"/>
-              </a:rPr>
-              <a:t> </a:t>
-            </a:r>
-            <a:r>
-              <a:rPr lang="en-US" altLang="zh-CN" sz="800" b="1" i="1" u="none" strike="noStrike" dirty="0">
-                <a:latin typeface="Calibri" panose="020F0502020204030204" pitchFamily="34" charset="0"/>
-                <a:ea typeface="Calibri" panose="020F0502020204030204" pitchFamily="34" charset="0"/>
-                <a:cs typeface="Calibri" panose="020F0502020204030204" pitchFamily="34" charset="0"/>
-              </a:rPr>
-              <a:t>vs</a:t>
-            </a:r>
-            <a:r>
-              <a:rPr lang="en-US" altLang="zh-CN" sz="800" b="1" u="none" strike="noStrike" dirty="0">
-                <a:latin typeface="Calibri" panose="020F0502020204030204" pitchFamily="34" charset="0"/>
-                <a:ea typeface="Calibri" panose="020F0502020204030204" pitchFamily="34" charset="0"/>
-                <a:cs typeface="Calibri" panose="020F0502020204030204" pitchFamily="34" charset="0"/>
-              </a:rPr>
-              <a:t> </a:t>
-            </a:r>
-            <a:r>
-              <a:rPr lang="en-US" sz="800" b="1" i="0" u="none" strike="noStrike" baseline="0" dirty="0">
-                <a:latin typeface="Calibri" panose="020F0502020204030204" pitchFamily="34" charset="0"/>
-                <a:ea typeface="Calibri" panose="020F0502020204030204" pitchFamily="34" charset="0"/>
-                <a:cs typeface="Calibri" panose="020F0502020204030204" pitchFamily="34" charset="0"/>
-              </a:rPr>
-              <a:t>OPN5</a:t>
-            </a:r>
-            <a:r>
-              <a:rPr lang="en-US" altLang="zh-CN" sz="800" b="1" i="0" u="none" strike="noStrike" baseline="30000" dirty="0">
-                <a:latin typeface="Calibri" panose="020F0502020204030204" pitchFamily="34" charset="0"/>
-                <a:ea typeface="Calibri" panose="020F0502020204030204" pitchFamily="34" charset="0"/>
-                <a:cs typeface="Calibri" panose="020F0502020204030204" pitchFamily="34" charset="0"/>
-              </a:rPr>
-              <a:t>AF3</a:t>
-            </a:r>
-            <a:r>
-              <a:rPr lang="en-US" altLang="zh-CN" sz="800" b="1" i="0" u="none" strike="noStrike" dirty="0">
-                <a:latin typeface="Calibri" panose="020F0502020204030204" pitchFamily="34" charset="0"/>
-                <a:ea typeface="Calibri" panose="020F0502020204030204" pitchFamily="34" charset="0"/>
-                <a:cs typeface="Calibri" panose="020F0502020204030204" pitchFamily="34" charset="0"/>
-              </a:rPr>
-              <a:t> </a:t>
-            </a:r>
-            <a:r>
-              <a:rPr lang="en-US" altLang="zh-CN" sz="800" b="1" i="1" u="none" strike="noStrike" dirty="0">
-                <a:latin typeface="Calibri" panose="020F0502020204030204" pitchFamily="34" charset="0"/>
-                <a:ea typeface="Calibri" panose="020F0502020204030204" pitchFamily="34" charset="0"/>
-                <a:cs typeface="Calibri" panose="020F0502020204030204" pitchFamily="34" charset="0"/>
-              </a:rPr>
-              <a:t>vs</a:t>
-            </a:r>
-            <a:r>
-              <a:rPr lang="en-US" altLang="zh-CN" sz="800" b="1" u="none" strike="noStrike" dirty="0">
-                <a:latin typeface="Calibri" panose="020F0502020204030204" pitchFamily="34" charset="0"/>
-                <a:ea typeface="Calibri" panose="020F0502020204030204" pitchFamily="34" charset="0"/>
-                <a:cs typeface="Calibri" panose="020F0502020204030204" pitchFamily="34" charset="0"/>
-              </a:rPr>
-              <a:t> RGR</a:t>
-            </a:r>
-            <a:r>
-              <a:rPr lang="en-US" altLang="zh-CN" sz="800" b="1" i="0" u="none" strike="noStrike" baseline="30000" dirty="0">
-                <a:latin typeface="Calibri" panose="020F0502020204030204" pitchFamily="34" charset="0"/>
-                <a:ea typeface="Calibri" panose="020F0502020204030204" pitchFamily="34" charset="0"/>
-                <a:cs typeface="Calibri" panose="020F0502020204030204" pitchFamily="34" charset="0"/>
-              </a:rPr>
-              <a:t>AF3</a:t>
-            </a:r>
-            <a:r>
-              <a:rPr lang="en-US" altLang="zh-CN" sz="800" b="1" i="0" u="none" strike="noStrike" dirty="0">
-                <a:latin typeface="Calibri" panose="020F0502020204030204" pitchFamily="34" charset="0"/>
-                <a:ea typeface="Calibri" panose="020F0502020204030204" pitchFamily="34" charset="0"/>
-                <a:cs typeface="Calibri" panose="020F0502020204030204" pitchFamily="34" charset="0"/>
-              </a:rPr>
-              <a:t> </a:t>
-            </a:r>
-            <a:r>
-              <a:rPr lang="en-US" altLang="zh-CN" sz="800" b="1" i="1" u="none" strike="noStrike" dirty="0">
-                <a:latin typeface="Calibri" panose="020F0502020204030204" pitchFamily="34" charset="0"/>
-                <a:ea typeface="Calibri" panose="020F0502020204030204" pitchFamily="34" charset="0"/>
-                <a:cs typeface="Calibri" panose="020F0502020204030204" pitchFamily="34" charset="0"/>
-              </a:rPr>
-              <a:t>vs</a:t>
-            </a:r>
-            <a:r>
-              <a:rPr lang="en-US" altLang="zh-CN" sz="800" b="1" u="none" strike="noStrike" dirty="0">
-                <a:latin typeface="Calibri" panose="020F0502020204030204" pitchFamily="34" charset="0"/>
-                <a:ea typeface="Calibri" panose="020F0502020204030204" pitchFamily="34" charset="0"/>
-                <a:cs typeface="Calibri" panose="020F0502020204030204" pitchFamily="34" charset="0"/>
-              </a:rPr>
-              <a:t> RRH</a:t>
-            </a:r>
-            <a:r>
-              <a:rPr lang="en-US" altLang="zh-CN" sz="800" b="1" i="0" u="none" strike="noStrike" baseline="30000" dirty="0">
-                <a:latin typeface="Calibri" panose="020F0502020204030204" pitchFamily="34" charset="0"/>
-                <a:ea typeface="Calibri" panose="020F0502020204030204" pitchFamily="34" charset="0"/>
-                <a:cs typeface="Calibri" panose="020F0502020204030204" pitchFamily="34" charset="0"/>
-              </a:rPr>
-              <a:t>AF3</a:t>
-            </a:r>
-            <a:endParaRPr lang="en-US" sz="800" i="1" dirty="0">
-              <a:latin typeface="Calibri" panose="020F0502020204030204" pitchFamily="34" charset="0"/>
-              <a:ea typeface="Calibri" panose="020F0502020204030204" pitchFamily="34" charset="0"/>
-              <a:cs typeface="Calibri" panose="020F0502020204030204" pitchFamily="34" charset="0"/>
-            </a:endParaRPr>
-          </a:p>
-        </p:txBody>
-      </p:sp>
-      <p:sp>
-        <p:nvSpPr>
-          <p:cNvPr id="14" name="文本框 13">
-            <a:extLst>
-              <a:ext uri="{FF2B5EF4-FFF2-40B4-BE49-F238E27FC236}">
-                <a16:creationId xmlns:a16="http://schemas.microsoft.com/office/drawing/2014/main" id="{3DD282E9-0389-062D-D2A0-C4F58F19F298}"/>
-              </a:ext>
-            </a:extLst>
-          </p:cNvPr>
-          <p:cNvSpPr txBox="1"/>
-          <p:nvPr/>
-        </p:nvSpPr>
-        <p:spPr>
-          <a:xfrm>
-            <a:off x="7445847" y="3968115"/>
-            <a:ext cx="1025437" cy="984885"/>
-          </a:xfrm>
-          <a:prstGeom prst="rect">
-            <a:avLst/>
-          </a:prstGeom>
-          <a:noFill/>
-        </p:spPr>
-        <p:txBody>
-          <a:bodyPr wrap="square" rtlCol="0">
-            <a:spAutoFit/>
-          </a:bodyPr>
-          <a:lstStyle/>
-          <a:p>
-            <a:r>
-              <a:rPr lang="en-US" sz="800" i="0" u="none" strike="noStrike" baseline="0" dirty="0">
-                <a:latin typeface="Calibri" panose="020F0502020204030204" pitchFamily="34" charset="0"/>
-                <a:ea typeface="Calibri" panose="020F0502020204030204" pitchFamily="34" charset="0"/>
-                <a:cs typeface="Calibri" panose="020F0502020204030204" pitchFamily="34" charset="0"/>
-              </a:rPr>
-              <a:t>OPN2</a:t>
-            </a:r>
-            <a:r>
-              <a:rPr lang="en-US" altLang="zh-CN" sz="800" i="0" u="none" strike="noStrike" baseline="30000" dirty="0">
-                <a:latin typeface="Calibri" panose="020F0502020204030204" pitchFamily="34" charset="0"/>
-                <a:ea typeface="Calibri" panose="020F0502020204030204" pitchFamily="34" charset="0"/>
-                <a:cs typeface="Calibri" panose="020F0502020204030204" pitchFamily="34" charset="0"/>
-              </a:rPr>
-              <a:t>AF3</a:t>
-            </a:r>
-            <a:r>
-              <a:rPr lang="en-US" altLang="zh-CN" sz="800" i="1" u="none" strike="noStrike" dirty="0">
-                <a:latin typeface="Calibri" panose="020F0502020204030204" pitchFamily="34" charset="0"/>
-                <a:ea typeface="Calibri" panose="020F0502020204030204" pitchFamily="34" charset="0"/>
-                <a:cs typeface="Calibri" panose="020F0502020204030204" pitchFamily="34" charset="0"/>
-              </a:rPr>
-              <a:t> vs</a:t>
-            </a:r>
-            <a:r>
-              <a:rPr lang="en-US" altLang="zh-CN" sz="800" u="none" strike="noStrike" dirty="0">
-                <a:latin typeface="Calibri" panose="020F0502020204030204" pitchFamily="34" charset="0"/>
-                <a:ea typeface="Calibri" panose="020F0502020204030204" pitchFamily="34" charset="0"/>
-                <a:cs typeface="Calibri" panose="020F0502020204030204" pitchFamily="34" charset="0"/>
-              </a:rPr>
-              <a:t> OPN2</a:t>
-            </a:r>
-            <a:r>
-              <a:rPr lang="en-US" altLang="zh-CN" sz="800" u="none" strike="noStrike" baseline="30000" dirty="0">
-                <a:latin typeface="Calibri" panose="020F0502020204030204" pitchFamily="34" charset="0"/>
-                <a:ea typeface="Calibri" panose="020F0502020204030204" pitchFamily="34" charset="0"/>
-                <a:cs typeface="Calibri" panose="020F0502020204030204" pitchFamily="34" charset="0"/>
-              </a:rPr>
-              <a:t>QTY</a:t>
-            </a:r>
-          </a:p>
-          <a:p>
-            <a:r>
-              <a:rPr lang="en-US" sz="800" dirty="0">
-                <a:latin typeface="Calibri" panose="020F0502020204030204" pitchFamily="34" charset="0"/>
-                <a:ea typeface="Calibri" panose="020F0502020204030204" pitchFamily="34" charset="0"/>
-                <a:cs typeface="Calibri" panose="020F0502020204030204" pitchFamily="34" charset="0"/>
-              </a:rPr>
-              <a:t>(</a:t>
-            </a:r>
-            <a:r>
-              <a:rPr lang="en-US" altLang="zh-CN" sz="800" i="0" u="none" strike="noStrike" baseline="0" dirty="0">
-                <a:latin typeface="Calibri" panose="020F0502020204030204" pitchFamily="34" charset="0"/>
-                <a:ea typeface="Calibri" panose="020F0502020204030204" pitchFamily="34" charset="0"/>
-                <a:cs typeface="Calibri" panose="020F0502020204030204" pitchFamily="34" charset="0"/>
-              </a:rPr>
-              <a:t>RMSD = </a:t>
-            </a:r>
-            <a:r>
-              <a:rPr lang="en-US" altLang="zh-CN" sz="800" dirty="0">
-                <a:latin typeface="Calibri" panose="020F0502020204030204" pitchFamily="34" charset="0"/>
-                <a:ea typeface="Calibri" panose="020F0502020204030204" pitchFamily="34" charset="0"/>
-                <a:cs typeface="Calibri" panose="020F0502020204030204" pitchFamily="34" charset="0"/>
-              </a:rPr>
-              <a:t>0.559 </a:t>
-            </a:r>
-            <a:r>
-              <a:rPr lang="en-US" sz="800" dirty="0">
-                <a:latin typeface="Calibri" panose="020F0502020204030204" pitchFamily="34" charset="0"/>
-                <a:ea typeface="Calibri" panose="020F0502020204030204" pitchFamily="34" charset="0"/>
-                <a:cs typeface="Calibri" panose="020F0502020204030204" pitchFamily="34" charset="0"/>
-              </a:rPr>
-              <a:t>Å)</a:t>
-            </a:r>
-          </a:p>
-          <a:p>
-            <a:endParaRPr lang="en-US" sz="500" dirty="0">
-              <a:latin typeface="Calibri" panose="020F0502020204030204" pitchFamily="34" charset="0"/>
-              <a:ea typeface="Calibri" panose="020F0502020204030204" pitchFamily="34" charset="0"/>
-              <a:cs typeface="Calibri" panose="020F0502020204030204" pitchFamily="34" charset="0"/>
-            </a:endParaRPr>
-          </a:p>
-          <a:p>
-            <a:r>
-              <a:rPr lang="en-US" sz="800" i="0" u="none" strike="noStrike" baseline="0" dirty="0">
-                <a:latin typeface="Calibri" panose="020F0502020204030204" pitchFamily="34" charset="0"/>
-                <a:ea typeface="Calibri" panose="020F0502020204030204" pitchFamily="34" charset="0"/>
-                <a:cs typeface="Calibri" panose="020F0502020204030204" pitchFamily="34" charset="0"/>
-              </a:rPr>
-              <a:t>OPN2</a:t>
-            </a:r>
-            <a:r>
-              <a:rPr lang="en-US" altLang="zh-CN" sz="800" i="0" u="none" strike="noStrike" baseline="30000" dirty="0">
-                <a:latin typeface="Calibri" panose="020F0502020204030204" pitchFamily="34" charset="0"/>
-                <a:ea typeface="Calibri" panose="020F0502020204030204" pitchFamily="34" charset="0"/>
-                <a:cs typeface="Calibri" panose="020F0502020204030204" pitchFamily="34" charset="0"/>
-              </a:rPr>
-              <a:t>AF3</a:t>
-            </a:r>
-            <a:r>
-              <a:rPr lang="en-US" altLang="zh-CN" sz="800" i="1" u="none" strike="noStrike" dirty="0">
-                <a:latin typeface="Calibri" panose="020F0502020204030204" pitchFamily="34" charset="0"/>
-                <a:ea typeface="Calibri" panose="020F0502020204030204" pitchFamily="34" charset="0"/>
-                <a:cs typeface="Calibri" panose="020F0502020204030204" pitchFamily="34" charset="0"/>
-              </a:rPr>
-              <a:t> </a:t>
-            </a:r>
-            <a:r>
-              <a:rPr lang="en-US" sz="800" i="1" dirty="0">
-                <a:latin typeface="Calibri" panose="020F0502020204030204" pitchFamily="34" charset="0"/>
-                <a:ea typeface="Calibri" panose="020F0502020204030204" pitchFamily="34" charset="0"/>
-                <a:cs typeface="Calibri" panose="020F0502020204030204" pitchFamily="34" charset="0"/>
-              </a:rPr>
-              <a:t>vs</a:t>
-            </a:r>
-            <a:r>
-              <a:rPr lang="en-US" altLang="zh-CN" sz="800" u="none" strike="noStrike" dirty="0">
-                <a:latin typeface="Calibri" panose="020F0502020204030204" pitchFamily="34" charset="0"/>
-                <a:ea typeface="Calibri" panose="020F0502020204030204" pitchFamily="34" charset="0"/>
-                <a:cs typeface="Calibri" panose="020F0502020204030204" pitchFamily="34" charset="0"/>
-              </a:rPr>
-              <a:t> OPN2</a:t>
-            </a:r>
-            <a:r>
-              <a:rPr lang="en-US" altLang="zh-CN" sz="800" u="none" strike="noStrike" baseline="30000" dirty="0">
-                <a:latin typeface="Calibri" panose="020F0502020204030204" pitchFamily="34" charset="0"/>
-                <a:ea typeface="Calibri" panose="020F0502020204030204" pitchFamily="34" charset="0"/>
-                <a:cs typeface="Calibri" panose="020F0502020204030204" pitchFamily="34" charset="0"/>
-              </a:rPr>
-              <a:t>EXP</a:t>
-            </a:r>
-          </a:p>
-          <a:p>
-            <a:r>
-              <a:rPr lang="en-US" sz="800" dirty="0">
-                <a:latin typeface="Calibri" panose="020F0502020204030204" pitchFamily="34" charset="0"/>
-                <a:ea typeface="Calibri" panose="020F0502020204030204" pitchFamily="34" charset="0"/>
-                <a:cs typeface="Calibri" panose="020F0502020204030204" pitchFamily="34" charset="0"/>
-              </a:rPr>
-              <a:t>(</a:t>
-            </a:r>
-            <a:r>
-              <a:rPr lang="en-US" altLang="zh-CN" sz="800" i="0" u="none" strike="noStrike" baseline="0" dirty="0">
-                <a:latin typeface="Calibri" panose="020F0502020204030204" pitchFamily="34" charset="0"/>
-                <a:ea typeface="Calibri" panose="020F0502020204030204" pitchFamily="34" charset="0"/>
-                <a:cs typeface="Calibri" panose="020F0502020204030204" pitchFamily="34" charset="0"/>
-              </a:rPr>
-              <a:t>RMSD = </a:t>
-            </a:r>
-            <a:r>
-              <a:rPr lang="en-US" altLang="zh-CN" sz="800" dirty="0">
-                <a:latin typeface="Calibri" panose="020F0502020204030204" pitchFamily="34" charset="0"/>
-                <a:ea typeface="Calibri" panose="020F0502020204030204" pitchFamily="34" charset="0"/>
-                <a:cs typeface="Calibri" panose="020F0502020204030204" pitchFamily="34" charset="0"/>
-              </a:rPr>
-              <a:t>0.549 </a:t>
-            </a:r>
-            <a:r>
-              <a:rPr lang="en-US" sz="800" dirty="0">
-                <a:latin typeface="Calibri" panose="020F0502020204030204" pitchFamily="34" charset="0"/>
-                <a:ea typeface="Calibri" panose="020F0502020204030204" pitchFamily="34" charset="0"/>
-                <a:cs typeface="Calibri" panose="020F0502020204030204" pitchFamily="34" charset="0"/>
-              </a:rPr>
-              <a:t>Å)</a:t>
-            </a:r>
-          </a:p>
-          <a:p>
-            <a:endParaRPr lang="en-US" sz="500" dirty="0">
-              <a:latin typeface="Calibri" panose="020F0502020204030204" pitchFamily="34" charset="0"/>
-              <a:ea typeface="Calibri" panose="020F0502020204030204" pitchFamily="34" charset="0"/>
-              <a:cs typeface="Calibri" panose="020F0502020204030204" pitchFamily="34" charset="0"/>
-            </a:endParaRPr>
-          </a:p>
-          <a:p>
-            <a:r>
-              <a:rPr lang="en-US" altLang="zh-CN" sz="800" u="none" strike="noStrike" dirty="0">
-                <a:latin typeface="Calibri" panose="020F0502020204030204" pitchFamily="34" charset="0"/>
-                <a:ea typeface="Calibri" panose="020F0502020204030204" pitchFamily="34" charset="0"/>
-                <a:cs typeface="Calibri" panose="020F0502020204030204" pitchFamily="34" charset="0"/>
-              </a:rPr>
-              <a:t>OPN2</a:t>
-            </a:r>
-            <a:r>
-              <a:rPr lang="en-US" altLang="zh-CN" sz="800" u="none" strike="noStrike" baseline="30000" dirty="0">
-                <a:latin typeface="Calibri" panose="020F0502020204030204" pitchFamily="34" charset="0"/>
-                <a:ea typeface="Calibri" panose="020F0502020204030204" pitchFamily="34" charset="0"/>
-                <a:cs typeface="Calibri" panose="020F0502020204030204" pitchFamily="34" charset="0"/>
-              </a:rPr>
-              <a:t>QTY</a:t>
-            </a:r>
-            <a:r>
-              <a:rPr lang="en-US" sz="800" i="1" dirty="0">
-                <a:latin typeface="Calibri" panose="020F0502020204030204" pitchFamily="34" charset="0"/>
-                <a:ea typeface="Calibri" panose="020F0502020204030204" pitchFamily="34" charset="0"/>
-                <a:cs typeface="Calibri" panose="020F0502020204030204" pitchFamily="34" charset="0"/>
-              </a:rPr>
-              <a:t> vs</a:t>
-            </a:r>
-            <a:r>
-              <a:rPr lang="en-US" altLang="zh-CN" sz="800" u="none" strike="noStrike" dirty="0">
-                <a:latin typeface="Calibri" panose="020F0502020204030204" pitchFamily="34" charset="0"/>
-                <a:ea typeface="Calibri" panose="020F0502020204030204" pitchFamily="34" charset="0"/>
-                <a:cs typeface="Calibri" panose="020F0502020204030204" pitchFamily="34" charset="0"/>
-              </a:rPr>
-              <a:t> OPN2</a:t>
-            </a:r>
-            <a:r>
-              <a:rPr lang="en-US" altLang="zh-CN" sz="800" u="none" strike="noStrike" baseline="30000" dirty="0">
-                <a:latin typeface="Calibri" panose="020F0502020204030204" pitchFamily="34" charset="0"/>
-                <a:ea typeface="Calibri" panose="020F0502020204030204" pitchFamily="34" charset="0"/>
-                <a:cs typeface="Calibri" panose="020F0502020204030204" pitchFamily="34" charset="0"/>
-              </a:rPr>
-              <a:t>EXP</a:t>
-            </a:r>
-          </a:p>
-          <a:p>
-            <a:r>
-              <a:rPr lang="en-US" sz="800" dirty="0">
-                <a:latin typeface="Calibri" panose="020F0502020204030204" pitchFamily="34" charset="0"/>
-                <a:ea typeface="Calibri" panose="020F0502020204030204" pitchFamily="34" charset="0"/>
-                <a:cs typeface="Calibri" panose="020F0502020204030204" pitchFamily="34" charset="0"/>
-              </a:rPr>
-              <a:t>(</a:t>
-            </a:r>
-            <a:r>
-              <a:rPr lang="en-US" altLang="zh-CN" sz="800" i="0" u="none" strike="noStrike" baseline="0" dirty="0">
-                <a:latin typeface="Calibri" panose="020F0502020204030204" pitchFamily="34" charset="0"/>
-                <a:ea typeface="Calibri" panose="020F0502020204030204" pitchFamily="34" charset="0"/>
-                <a:cs typeface="Calibri" panose="020F0502020204030204" pitchFamily="34" charset="0"/>
-              </a:rPr>
-              <a:t>RMSD = </a:t>
-            </a:r>
-            <a:r>
-              <a:rPr lang="en-US" altLang="zh-CN" sz="800" dirty="0">
-                <a:latin typeface="Calibri" panose="020F0502020204030204" pitchFamily="34" charset="0"/>
-                <a:ea typeface="Calibri" panose="020F0502020204030204" pitchFamily="34" charset="0"/>
-                <a:cs typeface="Calibri" panose="020F0502020204030204" pitchFamily="34" charset="0"/>
-              </a:rPr>
-              <a:t>0.999 </a:t>
-            </a:r>
-            <a:r>
-              <a:rPr lang="en-US" sz="800" dirty="0">
-                <a:latin typeface="Calibri" panose="020F0502020204030204" pitchFamily="34" charset="0"/>
-                <a:ea typeface="Calibri" panose="020F0502020204030204" pitchFamily="34" charset="0"/>
-                <a:cs typeface="Calibri" panose="020F0502020204030204" pitchFamily="34" charset="0"/>
-              </a:rPr>
-              <a:t>Å)</a:t>
-            </a:r>
-          </a:p>
-        </p:txBody>
-      </p:sp>
-      <p:pic>
-        <p:nvPicPr>
-          <p:cNvPr id="44" name="图片 43" descr="图片包含 游戏机, 链, 项链, 装饰品&#10;&#10;AI 生成的内容可能不正确。">
-            <a:extLst>
-              <a:ext uri="{FF2B5EF4-FFF2-40B4-BE49-F238E27FC236}">
-                <a16:creationId xmlns:a16="http://schemas.microsoft.com/office/drawing/2014/main" id="{3358232C-066C-7EAA-AB14-2E057F18C2A2}"/>
-              </a:ext>
-            </a:extLst>
-          </p:cNvPr>
-          <p:cNvPicPr>
-            <a:picLocks noChangeAspect="1"/>
-          </p:cNvPicPr>
-          <p:nvPr/>
-        </p:nvPicPr>
-        <p:blipFill>
-          <a:blip r:embed="rId2">
-            <a:clrChange>
-              <a:clrFrom>
-                <a:srgbClr val="FFFFFF"/>
-              </a:clrFrom>
-              <a:clrTo>
-                <a:srgbClr val="FFFFFF">
-                  <a:alpha val="0"/>
-                </a:srgbClr>
-              </a:clrTo>
-            </a:clrChange>
-            <a:extLst>
-              <a:ext uri="{28A0092B-C50C-407E-A947-70E740481C1C}">
-                <a14:useLocalDpi xmlns:a14="http://schemas.microsoft.com/office/drawing/2010/main" val="0"/>
-              </a:ext>
-            </a:extLst>
-          </a:blip>
-          <a:srcRect l="19269" t="25006" b="44174"/>
-          <a:stretch/>
-        </p:blipFill>
-        <p:spPr>
-          <a:xfrm>
-            <a:off x="503392" y="5980347"/>
-            <a:ext cx="2686467" cy="1535923"/>
-          </a:xfrm>
-          <a:prstGeom prst="rect">
-            <a:avLst/>
-          </a:prstGeom>
-        </p:spPr>
-      </p:pic>
-      <p:pic>
-        <p:nvPicPr>
-          <p:cNvPr id="46" name="图片 45" descr="图片包含 游戏机, 链, 项链, 装饰品&#10;&#10;AI 生成的内容可能不正确。">
-            <a:extLst>
-              <a:ext uri="{FF2B5EF4-FFF2-40B4-BE49-F238E27FC236}">
-                <a16:creationId xmlns:a16="http://schemas.microsoft.com/office/drawing/2014/main" id="{9D1EFB9A-94F9-E68E-14C5-71A09EA6E6AA}"/>
-              </a:ext>
-            </a:extLst>
-          </p:cNvPr>
-          <p:cNvPicPr>
-            <a:picLocks noChangeAspect="1"/>
-          </p:cNvPicPr>
-          <p:nvPr/>
-        </p:nvPicPr>
-        <p:blipFill>
-          <a:blip r:embed="rId2">
-            <a:clrChange>
-              <a:clrFrom>
-                <a:srgbClr val="FFFFFF"/>
-              </a:clrFrom>
-              <a:clrTo>
-                <a:srgbClr val="FFFFFF">
-                  <a:alpha val="0"/>
-                </a:srgbClr>
-              </a:clrTo>
-            </a:clrChange>
-            <a:extLst>
-              <a:ext uri="{28A0092B-C50C-407E-A947-70E740481C1C}">
-                <a14:useLocalDpi xmlns:a14="http://schemas.microsoft.com/office/drawing/2010/main" val="0"/>
-              </a:ext>
-            </a:extLst>
-          </a:blip>
-          <a:srcRect l="19269" t="25006" b="44174"/>
-          <a:stretch/>
-        </p:blipFill>
-        <p:spPr>
-          <a:xfrm>
-            <a:off x="3429000" y="5980346"/>
-            <a:ext cx="2686467" cy="1535923"/>
-          </a:xfrm>
-          <a:prstGeom prst="rect">
-            <a:avLst/>
-          </a:prstGeom>
-        </p:spPr>
-      </p:pic>
-      <p:pic>
-        <p:nvPicPr>
-          <p:cNvPr id="6" name="图片 5">
-            <a:extLst>
-              <a:ext uri="{FF2B5EF4-FFF2-40B4-BE49-F238E27FC236}">
-                <a16:creationId xmlns:a16="http://schemas.microsoft.com/office/drawing/2014/main" id="{C0A1C0FB-159F-BDB4-1A50-64F2B404364D}"/>
-              </a:ext>
-            </a:extLst>
-          </p:cNvPr>
-          <p:cNvPicPr>
-            <a:picLocks noChangeAspect="1"/>
-          </p:cNvPicPr>
-          <p:nvPr/>
-        </p:nvPicPr>
-        <p:blipFill>
-          <a:blip r:embed="rId3">
-            <a:alphaModFix/>
-          </a:blip>
-          <a:stretch>
-            <a:fillRect/>
-          </a:stretch>
-        </p:blipFill>
-        <p:spPr>
-          <a:xfrm>
-            <a:off x="503392" y="655151"/>
-            <a:ext cx="2720654" cy="1661919"/>
-          </a:xfrm>
-          <a:prstGeom prst="rect">
-            <a:avLst/>
-          </a:prstGeom>
-        </p:spPr>
-      </p:pic>
-      <p:pic>
-        <p:nvPicPr>
-          <p:cNvPr id="4" name="图片 3">
-            <a:extLst>
-              <a:ext uri="{FF2B5EF4-FFF2-40B4-BE49-F238E27FC236}">
-                <a16:creationId xmlns:a16="http://schemas.microsoft.com/office/drawing/2014/main" id="{9484EFAC-FABB-0898-02EE-5C023C69EE26}"/>
-              </a:ext>
-            </a:extLst>
-          </p:cNvPr>
-          <p:cNvPicPr>
-            <a:picLocks noChangeAspect="1"/>
-          </p:cNvPicPr>
-          <p:nvPr/>
-        </p:nvPicPr>
-        <p:blipFill>
-          <a:blip r:embed="rId4">
-            <a:alphaModFix/>
-          </a:blip>
-          <a:stretch>
-            <a:fillRect/>
-          </a:stretch>
-        </p:blipFill>
-        <p:spPr>
-          <a:xfrm>
-            <a:off x="3264289" y="655150"/>
-            <a:ext cx="2729467" cy="1661919"/>
-          </a:xfrm>
-          <a:prstGeom prst="rect">
-            <a:avLst/>
-          </a:prstGeom>
-        </p:spPr>
-      </p:pic>
-      <p:pic>
-        <p:nvPicPr>
-          <p:cNvPr id="11" name="图片 10">
-            <a:extLst>
-              <a:ext uri="{FF2B5EF4-FFF2-40B4-BE49-F238E27FC236}">
-                <a16:creationId xmlns:a16="http://schemas.microsoft.com/office/drawing/2014/main" id="{7913CB78-F7C5-3D76-F502-66C8092B722C}"/>
-              </a:ext>
-            </a:extLst>
-          </p:cNvPr>
-          <p:cNvPicPr>
-            <a:picLocks noChangeAspect="1"/>
-          </p:cNvPicPr>
-          <p:nvPr/>
-        </p:nvPicPr>
-        <p:blipFill>
-          <a:blip r:embed="rId5"/>
-          <a:stretch>
-            <a:fillRect/>
-          </a:stretch>
-        </p:blipFill>
-        <p:spPr>
-          <a:xfrm>
-            <a:off x="985792" y="2335172"/>
-            <a:ext cx="4380373" cy="185690"/>
-          </a:xfrm>
-          <a:prstGeom prst="rect">
-            <a:avLst/>
-          </a:prstGeom>
-        </p:spPr>
-      </p:pic>
-      <p:pic>
-        <p:nvPicPr>
-          <p:cNvPr id="5" name="图片 4">
-            <a:extLst>
-              <a:ext uri="{FF2B5EF4-FFF2-40B4-BE49-F238E27FC236}">
-                <a16:creationId xmlns:a16="http://schemas.microsoft.com/office/drawing/2014/main" id="{451A51B6-83C3-18E3-A15B-9B49DA70CE95}"/>
+                <a16:creationId xmlns:a16="http://schemas.microsoft.com/office/drawing/2014/main" id="{585610AD-0DB5-69C6-4B98-3E6E2C158338}"/>
               </a:ext>
             </a:extLst>
           </p:cNvPr>
@@ -4482,8 +6521,8 @@
         </p:blipFill>
         <p:spPr>
           <a:xfrm>
-            <a:off x="377293" y="2590582"/>
-            <a:ext cx="2627310" cy="3007578"/>
+            <a:off x="321386" y="4430439"/>
+            <a:ext cx="2874751" cy="2445283"/>
           </a:xfrm>
           <a:prstGeom prst="rect">
             <a:avLst/>
@@ -4492,10 +6531,10 @@
       </p:pic>
       <p:pic>
         <p:nvPicPr>
-          <p:cNvPr id="10" name="图片 9">
+          <p:cNvPr id="117" name="图片 116">
             <a:extLst>
               <a:ext uri="{FF2B5EF4-FFF2-40B4-BE49-F238E27FC236}">
-                <a16:creationId xmlns:a16="http://schemas.microsoft.com/office/drawing/2014/main" id="{3EFAD3F1-4364-1C62-86CF-7086B9E1DECF}"/>
+                <a16:creationId xmlns:a16="http://schemas.microsoft.com/office/drawing/2014/main" id="{1C904531-3B4E-4B7F-F880-41380D90F6FB}"/>
               </a:ext>
             </a:extLst>
           </p:cNvPr>
@@ -4512,8 +6551,8 @@
         </p:blipFill>
         <p:spPr>
           <a:xfrm>
-            <a:off x="3153717" y="2590582"/>
-            <a:ext cx="2646707" cy="3053509"/>
+            <a:off x="3354058" y="4445313"/>
+            <a:ext cx="2874418" cy="2452225"/>
           </a:xfrm>
           <a:prstGeom prst="rect">
             <a:avLst/>
@@ -4522,10 +6561,10 @@
       </p:pic>
       <p:pic>
         <p:nvPicPr>
-          <p:cNvPr id="12" name="图片 11">
+          <p:cNvPr id="118" name="图片 117">
             <a:extLst>
               <a:ext uri="{FF2B5EF4-FFF2-40B4-BE49-F238E27FC236}">
-                <a16:creationId xmlns:a16="http://schemas.microsoft.com/office/drawing/2014/main" id="{18E25913-759B-A4A6-8D28-B1FF68C6B9DC}"/>
+                <a16:creationId xmlns:a16="http://schemas.microsoft.com/office/drawing/2014/main" id="{A96D4AC4-595E-C28E-206F-A7D63930C78B}"/>
               </a:ext>
             </a:extLst>
           </p:cNvPr>
@@ -4542,14 +6581,564 @@
         </p:blipFill>
         <p:spPr>
           <a:xfrm>
-            <a:off x="5766560" y="2590582"/>
-            <a:ext cx="430705" cy="2733258"/>
+            <a:off x="3453858" y="6939247"/>
+            <a:ext cx="2983224" cy="1540317"/>
           </a:xfrm>
           <a:prstGeom prst="rect">
             <a:avLst/>
           </a:prstGeom>
         </p:spPr>
       </p:pic>
+      <p:pic>
+        <p:nvPicPr>
+          <p:cNvPr id="119" name="图片 118">
+            <a:extLst>
+              <a:ext uri="{FF2B5EF4-FFF2-40B4-BE49-F238E27FC236}">
+                <a16:creationId xmlns:a16="http://schemas.microsoft.com/office/drawing/2014/main" id="{98071E0C-9D9B-87C4-E984-47BCBD02A394}"/>
+              </a:ext>
+            </a:extLst>
+          </p:cNvPr>
+          <p:cNvPicPr>
+            <a:picLocks noChangeAspect="1"/>
+          </p:cNvPicPr>
+          <p:nvPr/>
+        </p:nvPicPr>
+        <p:blipFill>
+          <a:blip r:embed="rId9"/>
+          <a:stretch>
+            <a:fillRect/>
+          </a:stretch>
+        </p:blipFill>
+        <p:spPr>
+          <a:xfrm>
+            <a:off x="425559" y="6941377"/>
+            <a:ext cx="2986396" cy="1537635"/>
+          </a:xfrm>
+          <a:prstGeom prst="rect">
+            <a:avLst/>
+          </a:prstGeom>
+        </p:spPr>
+      </p:pic>
+      <p:pic>
+        <p:nvPicPr>
+          <p:cNvPr id="120" name="图片 119">
+            <a:extLst>
+              <a:ext uri="{FF2B5EF4-FFF2-40B4-BE49-F238E27FC236}">
+                <a16:creationId xmlns:a16="http://schemas.microsoft.com/office/drawing/2014/main" id="{3C8112E3-7289-4A35-8C94-C31B2376D14D}"/>
+              </a:ext>
+            </a:extLst>
+          </p:cNvPr>
+          <p:cNvPicPr>
+            <a:picLocks noChangeAspect="1"/>
+          </p:cNvPicPr>
+          <p:nvPr/>
+        </p:nvPicPr>
+        <p:blipFill>
+          <a:blip r:embed="rId10"/>
+          <a:stretch>
+            <a:fillRect/>
+          </a:stretch>
+        </p:blipFill>
+        <p:spPr>
+          <a:xfrm>
+            <a:off x="6164564" y="4435785"/>
+            <a:ext cx="417983" cy="2197783"/>
+          </a:xfrm>
+          <a:prstGeom prst="rect">
+            <a:avLst/>
+          </a:prstGeom>
+        </p:spPr>
+      </p:pic>
+      <p:sp>
+        <p:nvSpPr>
+          <p:cNvPr id="121" name="文本框 120">
+            <a:extLst>
+              <a:ext uri="{FF2B5EF4-FFF2-40B4-BE49-F238E27FC236}">
+                <a16:creationId xmlns:a16="http://schemas.microsoft.com/office/drawing/2014/main" id="{5C44FD30-148C-9B80-B278-29A893DBCFD8}"/>
+              </a:ext>
+            </a:extLst>
+          </p:cNvPr>
+          <p:cNvSpPr txBox="1"/>
+          <p:nvPr/>
+        </p:nvSpPr>
+        <p:spPr>
+          <a:xfrm>
+            <a:off x="415985" y="751696"/>
+            <a:ext cx="307792" cy="230832"/>
+          </a:xfrm>
+          <a:prstGeom prst="rect">
+            <a:avLst/>
+          </a:prstGeom>
+          <a:noFill/>
+        </p:spPr>
+        <p:txBody>
+          <a:bodyPr wrap="square" rtlCol="0">
+            <a:spAutoFit/>
+          </a:bodyPr>
+          <a:lstStyle/>
+          <a:p>
+            <a:r>
+              <a:rPr lang="en-US" sz="900" b="1" dirty="0">
+                <a:latin typeface="Calibri" panose="020F0502020204030204" pitchFamily="34" charset="0"/>
+                <a:ea typeface="Calibri" panose="020F0502020204030204" pitchFamily="34" charset="0"/>
+                <a:cs typeface="Calibri" panose="020F0502020204030204" pitchFamily="34" charset="0"/>
+              </a:rPr>
+              <a:t>a)</a:t>
+            </a:r>
+            <a:endParaRPr lang="en-US" sz="900" i="1" dirty="0">
+              <a:latin typeface="Calibri" panose="020F0502020204030204" pitchFamily="34" charset="0"/>
+              <a:ea typeface="Calibri" panose="020F0502020204030204" pitchFamily="34" charset="0"/>
+              <a:cs typeface="Calibri" panose="020F0502020204030204" pitchFamily="34" charset="0"/>
+            </a:endParaRPr>
+          </a:p>
+        </p:txBody>
+      </p:sp>
+      <p:sp>
+        <p:nvSpPr>
+          <p:cNvPr id="122" name="文本框 121">
+            <a:extLst>
+              <a:ext uri="{FF2B5EF4-FFF2-40B4-BE49-F238E27FC236}">
+                <a16:creationId xmlns:a16="http://schemas.microsoft.com/office/drawing/2014/main" id="{BAE2F73B-FACF-3066-D543-813345471886}"/>
+              </a:ext>
+            </a:extLst>
+          </p:cNvPr>
+          <p:cNvSpPr txBox="1"/>
+          <p:nvPr/>
+        </p:nvSpPr>
+        <p:spPr>
+          <a:xfrm>
+            <a:off x="3426769" y="751696"/>
+            <a:ext cx="307792" cy="230832"/>
+          </a:xfrm>
+          <a:prstGeom prst="rect">
+            <a:avLst/>
+          </a:prstGeom>
+          <a:noFill/>
+        </p:spPr>
+        <p:txBody>
+          <a:bodyPr wrap="square" rtlCol="0">
+            <a:spAutoFit/>
+          </a:bodyPr>
+          <a:lstStyle/>
+          <a:p>
+            <a:r>
+              <a:rPr lang="en-US" sz="900" b="1" dirty="0">
+                <a:latin typeface="Calibri" panose="020F0502020204030204" pitchFamily="34" charset="0"/>
+                <a:ea typeface="Calibri" panose="020F0502020204030204" pitchFamily="34" charset="0"/>
+                <a:cs typeface="Calibri" panose="020F0502020204030204" pitchFamily="34" charset="0"/>
+              </a:rPr>
+              <a:t>b)</a:t>
+            </a:r>
+            <a:endParaRPr lang="en-US" sz="900" i="1" dirty="0">
+              <a:latin typeface="Calibri" panose="020F0502020204030204" pitchFamily="34" charset="0"/>
+              <a:ea typeface="Calibri" panose="020F0502020204030204" pitchFamily="34" charset="0"/>
+              <a:cs typeface="Calibri" panose="020F0502020204030204" pitchFamily="34" charset="0"/>
+            </a:endParaRPr>
+          </a:p>
+        </p:txBody>
+      </p:sp>
+      <p:sp>
+        <p:nvSpPr>
+          <p:cNvPr id="123" name="文本框 122">
+            <a:extLst>
+              <a:ext uri="{FF2B5EF4-FFF2-40B4-BE49-F238E27FC236}">
+                <a16:creationId xmlns:a16="http://schemas.microsoft.com/office/drawing/2014/main" id="{59F6A9AC-0C97-8D7F-65EA-57504E8B48DE}"/>
+              </a:ext>
+            </a:extLst>
+          </p:cNvPr>
+          <p:cNvSpPr txBox="1"/>
+          <p:nvPr/>
+        </p:nvSpPr>
+        <p:spPr>
+          <a:xfrm>
+            <a:off x="415985" y="2566849"/>
+            <a:ext cx="307792" cy="230832"/>
+          </a:xfrm>
+          <a:prstGeom prst="rect">
+            <a:avLst/>
+          </a:prstGeom>
+          <a:noFill/>
+        </p:spPr>
+        <p:txBody>
+          <a:bodyPr wrap="square" rtlCol="0">
+            <a:spAutoFit/>
+          </a:bodyPr>
+          <a:lstStyle/>
+          <a:p>
+            <a:r>
+              <a:rPr lang="en-US" sz="900" b="1" dirty="0">
+                <a:latin typeface="Calibri" panose="020F0502020204030204" pitchFamily="34" charset="0"/>
+                <a:ea typeface="Calibri" panose="020F0502020204030204" pitchFamily="34" charset="0"/>
+                <a:cs typeface="Calibri" panose="020F0502020204030204" pitchFamily="34" charset="0"/>
+              </a:rPr>
+              <a:t>c)</a:t>
+            </a:r>
+            <a:endParaRPr lang="en-US" sz="900" i="1" dirty="0">
+              <a:latin typeface="Calibri" panose="020F0502020204030204" pitchFamily="34" charset="0"/>
+              <a:ea typeface="Calibri" panose="020F0502020204030204" pitchFamily="34" charset="0"/>
+              <a:cs typeface="Calibri" panose="020F0502020204030204" pitchFamily="34" charset="0"/>
+            </a:endParaRPr>
+          </a:p>
+        </p:txBody>
+      </p:sp>
+      <p:sp>
+        <p:nvSpPr>
+          <p:cNvPr id="124" name="文本框 123">
+            <a:extLst>
+              <a:ext uri="{FF2B5EF4-FFF2-40B4-BE49-F238E27FC236}">
+                <a16:creationId xmlns:a16="http://schemas.microsoft.com/office/drawing/2014/main" id="{24E66614-4709-6F4B-8BDF-17D06AC92024}"/>
+              </a:ext>
+            </a:extLst>
+          </p:cNvPr>
+          <p:cNvSpPr txBox="1"/>
+          <p:nvPr/>
+        </p:nvSpPr>
+        <p:spPr>
+          <a:xfrm>
+            <a:off x="3426769" y="2566849"/>
+            <a:ext cx="307792" cy="230832"/>
+          </a:xfrm>
+          <a:prstGeom prst="rect">
+            <a:avLst/>
+          </a:prstGeom>
+          <a:noFill/>
+        </p:spPr>
+        <p:txBody>
+          <a:bodyPr wrap="square" rtlCol="0">
+            <a:spAutoFit/>
+          </a:bodyPr>
+          <a:lstStyle/>
+          <a:p>
+            <a:r>
+              <a:rPr lang="en-US" sz="900" b="1" dirty="0">
+                <a:latin typeface="Calibri" panose="020F0502020204030204" pitchFamily="34" charset="0"/>
+                <a:ea typeface="Calibri" panose="020F0502020204030204" pitchFamily="34" charset="0"/>
+                <a:cs typeface="Calibri" panose="020F0502020204030204" pitchFamily="34" charset="0"/>
+              </a:rPr>
+              <a:t>d)</a:t>
+            </a:r>
+            <a:endParaRPr lang="en-US" sz="900" i="1" dirty="0">
+              <a:latin typeface="Calibri" panose="020F0502020204030204" pitchFamily="34" charset="0"/>
+              <a:ea typeface="Calibri" panose="020F0502020204030204" pitchFamily="34" charset="0"/>
+              <a:cs typeface="Calibri" panose="020F0502020204030204" pitchFamily="34" charset="0"/>
+            </a:endParaRPr>
+          </a:p>
+        </p:txBody>
+      </p:sp>
+      <p:sp>
+        <p:nvSpPr>
+          <p:cNvPr id="125" name="文本框 124">
+            <a:extLst>
+              <a:ext uri="{FF2B5EF4-FFF2-40B4-BE49-F238E27FC236}">
+                <a16:creationId xmlns:a16="http://schemas.microsoft.com/office/drawing/2014/main" id="{7C616D76-403D-85D0-836B-63FB125E794A}"/>
+              </a:ext>
+            </a:extLst>
+          </p:cNvPr>
+          <p:cNvSpPr txBox="1"/>
+          <p:nvPr/>
+        </p:nvSpPr>
+        <p:spPr>
+          <a:xfrm>
+            <a:off x="400383" y="4243467"/>
+            <a:ext cx="408497" cy="230832"/>
+          </a:xfrm>
+          <a:prstGeom prst="rect">
+            <a:avLst/>
+          </a:prstGeom>
+          <a:noFill/>
+        </p:spPr>
+        <p:txBody>
+          <a:bodyPr wrap="square" rtlCol="0">
+            <a:spAutoFit/>
+          </a:bodyPr>
+          <a:lstStyle/>
+          <a:p>
+            <a:r>
+              <a:rPr lang="en-US" sz="900" b="1" dirty="0">
+                <a:latin typeface="Calibri" panose="020F0502020204030204" pitchFamily="34" charset="0"/>
+                <a:ea typeface="Calibri" panose="020F0502020204030204" pitchFamily="34" charset="0"/>
+                <a:cs typeface="Calibri" panose="020F0502020204030204" pitchFamily="34" charset="0"/>
+              </a:rPr>
+              <a:t>e)</a:t>
+            </a:r>
+            <a:endParaRPr lang="en-US" sz="900" i="1" dirty="0">
+              <a:latin typeface="Calibri" panose="020F0502020204030204" pitchFamily="34" charset="0"/>
+              <a:ea typeface="Calibri" panose="020F0502020204030204" pitchFamily="34" charset="0"/>
+              <a:cs typeface="Calibri" panose="020F0502020204030204" pitchFamily="34" charset="0"/>
+            </a:endParaRPr>
+          </a:p>
+        </p:txBody>
+      </p:sp>
+      <p:sp>
+        <p:nvSpPr>
+          <p:cNvPr id="126" name="文本框 125">
+            <a:extLst>
+              <a:ext uri="{FF2B5EF4-FFF2-40B4-BE49-F238E27FC236}">
+                <a16:creationId xmlns:a16="http://schemas.microsoft.com/office/drawing/2014/main" id="{CF549BCC-D3E2-6469-DE44-EC58B7A96BBC}"/>
+              </a:ext>
+            </a:extLst>
+          </p:cNvPr>
+          <p:cNvSpPr txBox="1"/>
+          <p:nvPr/>
+        </p:nvSpPr>
+        <p:spPr>
+          <a:xfrm>
+            <a:off x="3442826" y="4243102"/>
+            <a:ext cx="391711" cy="230832"/>
+          </a:xfrm>
+          <a:prstGeom prst="rect">
+            <a:avLst/>
+          </a:prstGeom>
+          <a:noFill/>
+        </p:spPr>
+        <p:txBody>
+          <a:bodyPr wrap="square" rtlCol="0">
+            <a:spAutoFit/>
+          </a:bodyPr>
+          <a:lstStyle/>
+          <a:p>
+            <a:r>
+              <a:rPr lang="en-US" sz="900" b="1" dirty="0">
+                <a:latin typeface="Calibri" panose="020F0502020204030204" pitchFamily="34" charset="0"/>
+                <a:ea typeface="Calibri" panose="020F0502020204030204" pitchFamily="34" charset="0"/>
+                <a:cs typeface="Calibri" panose="020F0502020204030204" pitchFamily="34" charset="0"/>
+              </a:rPr>
+              <a:t>f)</a:t>
+            </a:r>
+            <a:endParaRPr lang="en-US" sz="900" i="1" dirty="0">
+              <a:latin typeface="Calibri" panose="020F0502020204030204" pitchFamily="34" charset="0"/>
+              <a:ea typeface="Calibri" panose="020F0502020204030204" pitchFamily="34" charset="0"/>
+              <a:cs typeface="Calibri" panose="020F0502020204030204" pitchFamily="34" charset="0"/>
+            </a:endParaRPr>
+          </a:p>
+        </p:txBody>
+      </p:sp>
+      <p:sp>
+        <p:nvSpPr>
+          <p:cNvPr id="127" name="文本框 126">
+            <a:extLst>
+              <a:ext uri="{FF2B5EF4-FFF2-40B4-BE49-F238E27FC236}">
+                <a16:creationId xmlns:a16="http://schemas.microsoft.com/office/drawing/2014/main" id="{8002EC04-6633-C9AB-18A9-CAD06010EAE9}"/>
+              </a:ext>
+            </a:extLst>
+          </p:cNvPr>
+          <p:cNvSpPr txBox="1"/>
+          <p:nvPr/>
+        </p:nvSpPr>
+        <p:spPr>
+          <a:xfrm>
+            <a:off x="374983" y="6793280"/>
+            <a:ext cx="426672" cy="230832"/>
+          </a:xfrm>
+          <a:prstGeom prst="rect">
+            <a:avLst/>
+          </a:prstGeom>
+          <a:noFill/>
+        </p:spPr>
+        <p:txBody>
+          <a:bodyPr wrap="square" rtlCol="0">
+            <a:spAutoFit/>
+          </a:bodyPr>
+          <a:lstStyle/>
+          <a:p>
+            <a:r>
+              <a:rPr lang="en-US" sz="900" b="1" dirty="0">
+                <a:latin typeface="Calibri" panose="020F0502020204030204" pitchFamily="34" charset="0"/>
+                <a:ea typeface="Calibri" panose="020F0502020204030204" pitchFamily="34" charset="0"/>
+                <a:cs typeface="Calibri" panose="020F0502020204030204" pitchFamily="34" charset="0"/>
+              </a:rPr>
+              <a:t>g)</a:t>
+            </a:r>
+            <a:endParaRPr lang="en-US" sz="900" i="1" dirty="0">
+              <a:latin typeface="Calibri" panose="020F0502020204030204" pitchFamily="34" charset="0"/>
+              <a:ea typeface="Calibri" panose="020F0502020204030204" pitchFamily="34" charset="0"/>
+              <a:cs typeface="Calibri" panose="020F0502020204030204" pitchFamily="34" charset="0"/>
+            </a:endParaRPr>
+          </a:p>
+        </p:txBody>
+      </p:sp>
+      <p:sp>
+        <p:nvSpPr>
+          <p:cNvPr id="128" name="文本框 127">
+            <a:extLst>
+              <a:ext uri="{FF2B5EF4-FFF2-40B4-BE49-F238E27FC236}">
+                <a16:creationId xmlns:a16="http://schemas.microsoft.com/office/drawing/2014/main" id="{0DD9165D-3DAA-5CA1-F35F-E80961C9F3D4}"/>
+              </a:ext>
+            </a:extLst>
+          </p:cNvPr>
+          <p:cNvSpPr txBox="1"/>
+          <p:nvPr/>
+        </p:nvSpPr>
+        <p:spPr>
+          <a:xfrm>
+            <a:off x="3388596" y="6793280"/>
+            <a:ext cx="307793" cy="230832"/>
+          </a:xfrm>
+          <a:prstGeom prst="rect">
+            <a:avLst/>
+          </a:prstGeom>
+          <a:noFill/>
+        </p:spPr>
+        <p:txBody>
+          <a:bodyPr wrap="square" rtlCol="0">
+            <a:spAutoFit/>
+          </a:bodyPr>
+          <a:lstStyle/>
+          <a:p>
+            <a:r>
+              <a:rPr lang="en-US" sz="900" b="1" dirty="0">
+                <a:latin typeface="Calibri" panose="020F0502020204030204" pitchFamily="34" charset="0"/>
+                <a:ea typeface="Calibri" panose="020F0502020204030204" pitchFamily="34" charset="0"/>
+                <a:cs typeface="Calibri" panose="020F0502020204030204" pitchFamily="34" charset="0"/>
+              </a:rPr>
+              <a:t>h)</a:t>
+            </a:r>
+            <a:endParaRPr lang="en-US" sz="900" i="1" dirty="0">
+              <a:latin typeface="Calibri" panose="020F0502020204030204" pitchFamily="34" charset="0"/>
+              <a:ea typeface="Calibri" panose="020F0502020204030204" pitchFamily="34" charset="0"/>
+              <a:cs typeface="Calibri" panose="020F0502020204030204" pitchFamily="34" charset="0"/>
+            </a:endParaRPr>
+          </a:p>
+        </p:txBody>
+      </p:sp>
+      <p:pic>
+        <p:nvPicPr>
+          <p:cNvPr id="129" name="图片 128">
+            <a:extLst>
+              <a:ext uri="{FF2B5EF4-FFF2-40B4-BE49-F238E27FC236}">
+                <a16:creationId xmlns:a16="http://schemas.microsoft.com/office/drawing/2014/main" id="{7913CB78-F7C5-3D76-F502-66C8092B722C}"/>
+              </a:ext>
+            </a:extLst>
+          </p:cNvPr>
+          <p:cNvPicPr>
+            <a:picLocks noChangeAspect="1"/>
+          </p:cNvPicPr>
+          <p:nvPr/>
+        </p:nvPicPr>
+        <p:blipFill>
+          <a:blip r:embed="rId11"/>
+          <a:stretch>
+            <a:fillRect/>
+          </a:stretch>
+        </p:blipFill>
+        <p:spPr>
+          <a:xfrm>
+            <a:off x="1238813" y="8477159"/>
+            <a:ext cx="4380373" cy="185690"/>
+          </a:xfrm>
+          <a:prstGeom prst="rect">
+            <a:avLst/>
+          </a:prstGeom>
+        </p:spPr>
+      </p:pic>
+      <p:sp>
+        <p:nvSpPr>
+          <p:cNvPr id="130" name="文本框 129">
+            <a:extLst>
+              <a:ext uri="{FF2B5EF4-FFF2-40B4-BE49-F238E27FC236}">
+                <a16:creationId xmlns:a16="http://schemas.microsoft.com/office/drawing/2014/main" id="{74E538FA-13C5-419F-470D-AC31EAF63FBD}"/>
+              </a:ext>
+            </a:extLst>
+          </p:cNvPr>
+          <p:cNvSpPr txBox="1"/>
+          <p:nvPr/>
+        </p:nvSpPr>
+        <p:spPr>
+          <a:xfrm>
+            <a:off x="4414625" y="344013"/>
+            <a:ext cx="1053272" cy="276999"/>
+          </a:xfrm>
+          <a:prstGeom prst="rect">
+            <a:avLst/>
+          </a:prstGeom>
+          <a:noFill/>
+        </p:spPr>
+        <p:txBody>
+          <a:bodyPr wrap="square" rtlCol="0">
+            <a:spAutoFit/>
+          </a:bodyPr>
+          <a:lstStyle/>
+          <a:p>
+            <a:pPr algn="ctr"/>
+            <a:r>
+              <a:rPr lang="en-US" sz="1200" b="1" dirty="0">
+                <a:solidFill>
+                  <a:schemeClr val="tx2">
+                    <a:lumMod val="75000"/>
+                    <a:lumOff val="25000"/>
+                  </a:schemeClr>
+                </a:solidFill>
+                <a:latin typeface="Calibri" panose="020F0502020204030204" pitchFamily="34" charset="0"/>
+                <a:ea typeface="Calibri" panose="020F0502020204030204" pitchFamily="34" charset="0"/>
+                <a:cs typeface="Calibri" panose="020F0502020204030204" pitchFamily="34" charset="0"/>
+              </a:rPr>
+              <a:t>QTY Analog</a:t>
+            </a:r>
+            <a:endParaRPr lang="en-US" sz="1200" i="1" dirty="0">
+              <a:solidFill>
+                <a:schemeClr val="tx2">
+                  <a:lumMod val="75000"/>
+                  <a:lumOff val="25000"/>
+                </a:schemeClr>
+              </a:solidFill>
+              <a:latin typeface="Calibri" panose="020F0502020204030204" pitchFamily="34" charset="0"/>
+              <a:ea typeface="Calibri" panose="020F0502020204030204" pitchFamily="34" charset="0"/>
+              <a:cs typeface="Calibri" panose="020F0502020204030204" pitchFamily="34" charset="0"/>
+            </a:endParaRPr>
+          </a:p>
+        </p:txBody>
+      </p:sp>
+      <p:sp>
+        <p:nvSpPr>
+          <p:cNvPr id="131" name="文本框 130">
+            <a:extLst>
+              <a:ext uri="{FF2B5EF4-FFF2-40B4-BE49-F238E27FC236}">
+                <a16:creationId xmlns:a16="http://schemas.microsoft.com/office/drawing/2014/main" id="{A510FD20-F89C-677D-821F-396C412F52DB}"/>
+              </a:ext>
+            </a:extLst>
+          </p:cNvPr>
+          <p:cNvSpPr txBox="1"/>
+          <p:nvPr/>
+        </p:nvSpPr>
+        <p:spPr>
+          <a:xfrm>
+            <a:off x="1218987" y="346635"/>
+            <a:ext cx="1205230" cy="276999"/>
+          </a:xfrm>
+          <a:prstGeom prst="rect">
+            <a:avLst/>
+          </a:prstGeom>
+          <a:noFill/>
+        </p:spPr>
+        <p:txBody>
+          <a:bodyPr wrap="square" rtlCol="0">
+            <a:spAutoFit/>
+          </a:bodyPr>
+          <a:lstStyle/>
+          <a:p>
+            <a:pPr algn="ctr"/>
+            <a:r>
+              <a:rPr lang="en-US" sz="1200" b="1" dirty="0">
+                <a:solidFill>
+                  <a:schemeClr val="accent6"/>
+                </a:solidFill>
+                <a:latin typeface="Calibri" panose="020F0502020204030204" pitchFamily="34" charset="0"/>
+                <a:ea typeface="Calibri" panose="020F0502020204030204" pitchFamily="34" charset="0"/>
+                <a:cs typeface="Calibri" panose="020F0502020204030204" pitchFamily="34" charset="0"/>
+              </a:rPr>
+              <a:t>Native Protein</a:t>
+            </a:r>
+            <a:endParaRPr lang="en-US" sz="1200" i="1" dirty="0">
+              <a:solidFill>
+                <a:schemeClr val="accent6"/>
+              </a:solidFill>
+              <a:latin typeface="Calibri" panose="020F0502020204030204" pitchFamily="34" charset="0"/>
+              <a:ea typeface="Calibri" panose="020F0502020204030204" pitchFamily="34" charset="0"/>
+              <a:cs typeface="Calibri" panose="020F0502020204030204" pitchFamily="34" charset="0"/>
+            </a:endParaRPr>
+          </a:p>
+        </p:txBody>
+      </p:sp>
     </p:spTree>
     <p:extLst>
       <p:ext uri="{BB962C8B-B14F-4D97-AF65-F5344CB8AC3E}">

</xml_diff>

<commit_message>
Finalize first draft (except figure)
</commit_message>
<xml_diff>
--- a/Paper/Graphs.pptx
+++ b/Paper/Graphs.pptx
@@ -198,7 +198,7 @@
           <a:p>
             <a:fld id="{20AB75B4-5AF7-40C9-A887-703983D677AD}" type="datetimeFigureOut">
               <a:rPr lang="en-US" smtClean="0"/>
-              <a:t>5/9/2025</a:t>
+              <a:t>5/10/2025</a:t>
             </a:fld>
             <a:endParaRPr lang="en-US"/>
           </a:p>
@@ -597,7 +597,7 @@
           <a:p>
             <a:fld id="{8F861484-492D-4B5D-8452-A17120BA7A7E}" type="datetimeFigureOut">
               <a:rPr lang="en-US" smtClean="0"/>
-              <a:t>5/9/2025</a:t>
+              <a:t>5/10/2025</a:t>
             </a:fld>
             <a:endParaRPr lang="en-US"/>
           </a:p>
@@ -767,7 +767,7 @@
           <a:p>
             <a:fld id="{8F861484-492D-4B5D-8452-A17120BA7A7E}" type="datetimeFigureOut">
               <a:rPr lang="en-US" smtClean="0"/>
-              <a:t>5/9/2025</a:t>
+              <a:t>5/10/2025</a:t>
             </a:fld>
             <a:endParaRPr lang="en-US"/>
           </a:p>
@@ -947,7 +947,7 @@
           <a:p>
             <a:fld id="{8F861484-492D-4B5D-8452-A17120BA7A7E}" type="datetimeFigureOut">
               <a:rPr lang="en-US" smtClean="0"/>
-              <a:t>5/9/2025</a:t>
+              <a:t>5/10/2025</a:t>
             </a:fld>
             <a:endParaRPr lang="en-US"/>
           </a:p>
@@ -1117,7 +1117,7 @@
           <a:p>
             <a:fld id="{8F861484-492D-4B5D-8452-A17120BA7A7E}" type="datetimeFigureOut">
               <a:rPr lang="en-US" smtClean="0"/>
-              <a:t>5/9/2025</a:t>
+              <a:t>5/10/2025</a:t>
             </a:fld>
             <a:endParaRPr lang="en-US"/>
           </a:p>
@@ -1363,7 +1363,7 @@
           <a:p>
             <a:fld id="{8F861484-492D-4B5D-8452-A17120BA7A7E}" type="datetimeFigureOut">
               <a:rPr lang="en-US" smtClean="0"/>
-              <a:t>5/9/2025</a:t>
+              <a:t>5/10/2025</a:t>
             </a:fld>
             <a:endParaRPr lang="en-US"/>
           </a:p>
@@ -1595,7 +1595,7 @@
           <a:p>
             <a:fld id="{8F861484-492D-4B5D-8452-A17120BA7A7E}" type="datetimeFigureOut">
               <a:rPr lang="en-US" smtClean="0"/>
-              <a:t>5/9/2025</a:t>
+              <a:t>5/10/2025</a:t>
             </a:fld>
             <a:endParaRPr lang="en-US"/>
           </a:p>
@@ -1962,7 +1962,7 @@
           <a:p>
             <a:fld id="{8F861484-492D-4B5D-8452-A17120BA7A7E}" type="datetimeFigureOut">
               <a:rPr lang="en-US" smtClean="0"/>
-              <a:t>5/9/2025</a:t>
+              <a:t>5/10/2025</a:t>
             </a:fld>
             <a:endParaRPr lang="en-US"/>
           </a:p>
@@ -2080,7 +2080,7 @@
           <a:p>
             <a:fld id="{8F861484-492D-4B5D-8452-A17120BA7A7E}" type="datetimeFigureOut">
               <a:rPr lang="en-US" smtClean="0"/>
-              <a:t>5/9/2025</a:t>
+              <a:t>5/10/2025</a:t>
             </a:fld>
             <a:endParaRPr lang="en-US"/>
           </a:p>
@@ -2175,7 +2175,7 @@
           <a:p>
             <a:fld id="{8F861484-492D-4B5D-8452-A17120BA7A7E}" type="datetimeFigureOut">
               <a:rPr lang="en-US" smtClean="0"/>
-              <a:t>5/9/2025</a:t>
+              <a:t>5/10/2025</a:t>
             </a:fld>
             <a:endParaRPr lang="en-US"/>
           </a:p>
@@ -2452,7 +2452,7 @@
           <a:p>
             <a:fld id="{8F861484-492D-4B5D-8452-A17120BA7A7E}" type="datetimeFigureOut">
               <a:rPr lang="en-US" smtClean="0"/>
-              <a:t>5/9/2025</a:t>
+              <a:t>5/10/2025</a:t>
             </a:fld>
             <a:endParaRPr lang="en-US"/>
           </a:p>
@@ -2709,7 +2709,7 @@
           <a:p>
             <a:fld id="{8F861484-492D-4B5D-8452-A17120BA7A7E}" type="datetimeFigureOut">
               <a:rPr lang="en-US" smtClean="0"/>
-              <a:t>5/9/2025</a:t>
+              <a:t>5/10/2025</a:t>
             </a:fld>
             <a:endParaRPr lang="en-US"/>
           </a:p>
@@ -2922,7 +2922,7 @@
           <a:p>
             <a:fld id="{8F861484-492D-4B5D-8452-A17120BA7A7E}" type="datetimeFigureOut">
               <a:rPr lang="en-US" smtClean="0"/>
-              <a:t>5/9/2025</a:t>
+              <a:t>5/10/2025</a:t>
             </a:fld>
             <a:endParaRPr lang="en-US"/>
           </a:p>
@@ -5375,7 +5375,7 @@
         </p:nvGrpSpPr>
         <p:grpSpPr>
           <a:xfrm>
-            <a:off x="636270" y="2412778"/>
+            <a:off x="636270" y="2532048"/>
             <a:ext cx="2526298" cy="2043053"/>
             <a:chOff x="3534651" y="6723199"/>
             <a:chExt cx="2526298" cy="2043053"/>
@@ -5923,7 +5923,7 @@
         </p:nvGrpSpPr>
         <p:grpSpPr>
           <a:xfrm>
-            <a:off x="3594942" y="2450164"/>
+            <a:off x="3594942" y="2569434"/>
             <a:ext cx="2519517" cy="1853348"/>
             <a:chOff x="572640" y="6745919"/>
             <a:chExt cx="2519517" cy="1853348"/>
@@ -6521,7 +6521,7 @@
         </p:blipFill>
         <p:spPr>
           <a:xfrm>
-            <a:off x="321386" y="4430439"/>
+            <a:off x="321386" y="4686024"/>
             <a:ext cx="2874751" cy="2445283"/>
           </a:xfrm>
           <a:prstGeom prst="rect">
@@ -6551,7 +6551,7 @@
         </p:blipFill>
         <p:spPr>
           <a:xfrm>
-            <a:off x="3354058" y="4445313"/>
+            <a:off x="3354058" y="4700898"/>
             <a:ext cx="2874418" cy="2452225"/>
           </a:xfrm>
           <a:prstGeom prst="rect">
@@ -6581,7 +6581,7 @@
         </p:blipFill>
         <p:spPr>
           <a:xfrm>
-            <a:off x="3453858" y="6939247"/>
+            <a:off x="3453858" y="7370900"/>
             <a:ext cx="2983224" cy="1540317"/>
           </a:xfrm>
           <a:prstGeom prst="rect">
@@ -6611,7 +6611,7 @@
         </p:blipFill>
         <p:spPr>
           <a:xfrm>
-            <a:off x="425559" y="6941377"/>
+            <a:off x="425559" y="7373030"/>
             <a:ext cx="2986396" cy="1537635"/>
           </a:xfrm>
           <a:prstGeom prst="rect">
@@ -6641,7 +6641,7 @@
         </p:blipFill>
         <p:spPr>
           <a:xfrm>
-            <a:off x="6164564" y="4435785"/>
+            <a:off x="6164564" y="4691370"/>
             <a:ext cx="417983" cy="2197783"/>
           </a:xfrm>
           <a:prstGeom prst="rect">
@@ -6751,7 +6751,7 @@
         </p:nvSpPr>
         <p:spPr>
           <a:xfrm>
-            <a:off x="415985" y="2566849"/>
+            <a:off x="415985" y="2686119"/>
             <a:ext cx="307792" cy="230832"/>
           </a:xfrm>
           <a:prstGeom prst="rect">
@@ -6795,7 +6795,7 @@
         </p:nvSpPr>
         <p:spPr>
           <a:xfrm>
-            <a:off x="3426769" y="2566849"/>
+            <a:off x="3426769" y="2686119"/>
             <a:ext cx="307792" cy="230832"/>
           </a:xfrm>
           <a:prstGeom prst="rect">
@@ -6839,7 +6839,7 @@
         </p:nvSpPr>
         <p:spPr>
           <a:xfrm>
-            <a:off x="400383" y="4243467"/>
+            <a:off x="400383" y="4499052"/>
             <a:ext cx="408497" cy="230832"/>
           </a:xfrm>
           <a:prstGeom prst="rect">
@@ -6883,7 +6883,7 @@
         </p:nvSpPr>
         <p:spPr>
           <a:xfrm>
-            <a:off x="3442826" y="4243102"/>
+            <a:off x="3442826" y="4498687"/>
             <a:ext cx="391711" cy="230832"/>
           </a:xfrm>
           <a:prstGeom prst="rect">
@@ -6927,7 +6927,7 @@
         </p:nvSpPr>
         <p:spPr>
           <a:xfrm>
-            <a:off x="374983" y="6793280"/>
+            <a:off x="374983" y="7224933"/>
             <a:ext cx="426672" cy="230832"/>
           </a:xfrm>
           <a:prstGeom prst="rect">
@@ -6971,7 +6971,7 @@
         </p:nvSpPr>
         <p:spPr>
           <a:xfrm>
-            <a:off x="3388596" y="6793280"/>
+            <a:off x="3388596" y="7224933"/>
             <a:ext cx="307793" cy="230832"/>
           </a:xfrm>
           <a:prstGeom prst="rect">
@@ -7023,7 +7023,7 @@
         </p:blipFill>
         <p:spPr>
           <a:xfrm>
-            <a:off x="1238813" y="8477159"/>
+            <a:off x="1238813" y="8965612"/>
             <a:ext cx="4380373" cy="185690"/>
           </a:xfrm>
           <a:prstGeom prst="rect">
@@ -7045,7 +7045,7 @@
         </p:nvSpPr>
         <p:spPr>
           <a:xfrm>
-            <a:off x="4414625" y="344013"/>
+            <a:off x="4414625" y="315613"/>
             <a:ext cx="1053272" cy="276999"/>
           </a:xfrm>
           <a:prstGeom prst="rect">
@@ -7102,7 +7102,7 @@
         </p:nvSpPr>
         <p:spPr>
           <a:xfrm>
-            <a:off x="1218987" y="346635"/>
+            <a:off x="1218987" y="318235"/>
             <a:ext cx="1205230" cy="276999"/>
           </a:xfrm>
           <a:prstGeom prst="rect">

</xml_diff>